<commit_message>
html & css for History page along with working county metadata display.
</commit_message>
<xml_diff>
--- a/Margaret/Project Docs/CA Wildfire Dashboard Pres.pptx
+++ b/Margaret/Project Docs/CA Wildfire Dashboard Pres.pptx
@@ -5,13 +5,16 @@
     <p:sldMasterId id="2147483648" r:id="rId4"/>
   </p:sldMasterIdLst>
   <p:notesMasterIdLst>
-    <p:notesMasterId r:id="rId9"/>
+    <p:notesMasterId r:id="rId12"/>
   </p:notesMasterIdLst>
   <p:sldIdLst>
     <p:sldId id="266" r:id="rId5"/>
-    <p:sldId id="267" r:id="rId6"/>
-    <p:sldId id="268" r:id="rId7"/>
-    <p:sldId id="257" r:id="rId8"/>
+    <p:sldId id="257" r:id="rId6"/>
+    <p:sldId id="267" r:id="rId7"/>
+    <p:sldId id="271" r:id="rId8"/>
+    <p:sldId id="272" r:id="rId9"/>
+    <p:sldId id="270" r:id="rId10"/>
+    <p:sldId id="268" r:id="rId11"/>
   </p:sldIdLst>
   <p:sldSz cx="12192000" cy="6858000"/>
   <p:notesSz cx="6858000" cy="9144000"/>
@@ -904,6 +907,792 @@
 </dgm:colorsDef>
 </file>
 
+<file path=ppt/diagrams/colors2.xml><?xml version="1.0" encoding="utf-8"?>
+<dgm:colorsDef xmlns:dgm="http://schemas.openxmlformats.org/drawingml/2006/diagram" xmlns:a="http://schemas.openxmlformats.org/drawingml/2006/main" uniqueId="urn:microsoft.com/office/officeart/2018/5/colors/Iconchunking_coloredtext_colorful2">
+  <dgm:title val=""/>
+  <dgm:desc val=""/>
+  <dgm:catLst>
+    <dgm:cat type="colorful" pri="10200"/>
+  </dgm:catLst>
+  <dgm:styleLbl name="node0">
+    <dgm:fillClrLst meth="repeat">
+      <a:schemeClr val="accent1"/>
+    </dgm:fillClrLst>
+    <dgm:linClrLst meth="repeat">
+      <a:schemeClr val="lt1"/>
+    </dgm:linClrLst>
+    <dgm:effectClrLst/>
+    <dgm:txLinClrLst/>
+    <dgm:txFillClrLst/>
+    <dgm:txEffectClrLst/>
+  </dgm:styleLbl>
+  <dgm:styleLbl name="node1">
+    <dgm:fillClrLst meth="repeat">
+      <a:schemeClr val="bg1"/>
+    </dgm:fillClrLst>
+    <dgm:linClrLst meth="repeat">
+      <a:schemeClr val="lt1">
+        <a:alpha val="0"/>
+      </a:schemeClr>
+    </dgm:linClrLst>
+    <dgm:effectClrLst/>
+    <dgm:txLinClrLst/>
+    <dgm:txFillClrLst meth="repeat">
+      <a:schemeClr val="dk1"/>
+    </dgm:txFillClrLst>
+    <dgm:txEffectClrLst/>
+  </dgm:styleLbl>
+  <dgm:styleLbl name="alignNode1">
+    <dgm:fillClrLst>
+      <a:schemeClr val="accent2"/>
+      <a:schemeClr val="accent3"/>
+    </dgm:fillClrLst>
+    <dgm:linClrLst>
+      <a:schemeClr val="accent2"/>
+      <a:schemeClr val="accent3"/>
+    </dgm:linClrLst>
+    <dgm:effectClrLst/>
+    <dgm:txLinClrLst/>
+    <dgm:txFillClrLst/>
+    <dgm:txEffectClrLst/>
+  </dgm:styleLbl>
+  <dgm:styleLbl name="lnNode1">
+    <dgm:fillClrLst>
+      <a:schemeClr val="accent2"/>
+      <a:schemeClr val="accent3"/>
+    </dgm:fillClrLst>
+    <dgm:linClrLst meth="repeat">
+      <a:schemeClr val="lt1"/>
+    </dgm:linClrLst>
+    <dgm:effectClrLst/>
+    <dgm:txLinClrLst/>
+    <dgm:txFillClrLst/>
+    <dgm:txEffectClrLst/>
+  </dgm:styleLbl>
+  <dgm:styleLbl name="vennNode1">
+    <dgm:fillClrLst>
+      <a:schemeClr val="accent2">
+        <a:alpha val="50000"/>
+      </a:schemeClr>
+      <a:schemeClr val="accent3">
+        <a:alpha val="50000"/>
+      </a:schemeClr>
+    </dgm:fillClrLst>
+    <dgm:linClrLst meth="repeat">
+      <a:schemeClr val="lt1"/>
+    </dgm:linClrLst>
+    <dgm:effectClrLst/>
+    <dgm:txLinClrLst/>
+    <dgm:txFillClrLst/>
+    <dgm:txEffectClrLst/>
+  </dgm:styleLbl>
+  <dgm:styleLbl name="node2">
+    <dgm:fillClrLst>
+      <a:schemeClr val="accent3"/>
+    </dgm:fillClrLst>
+    <dgm:linClrLst meth="repeat">
+      <a:schemeClr val="lt1"/>
+    </dgm:linClrLst>
+    <dgm:effectClrLst/>
+    <dgm:txLinClrLst/>
+    <dgm:txFillClrLst/>
+    <dgm:txEffectClrLst/>
+  </dgm:styleLbl>
+  <dgm:styleLbl name="node3">
+    <dgm:fillClrLst>
+      <a:schemeClr val="accent4"/>
+    </dgm:fillClrLst>
+    <dgm:linClrLst meth="repeat">
+      <a:schemeClr val="lt1"/>
+    </dgm:linClrLst>
+    <dgm:effectClrLst/>
+    <dgm:txLinClrLst/>
+    <dgm:txFillClrLst/>
+    <dgm:txEffectClrLst/>
+  </dgm:styleLbl>
+  <dgm:styleLbl name="node4">
+    <dgm:fillClrLst>
+      <a:schemeClr val="accent5"/>
+    </dgm:fillClrLst>
+    <dgm:linClrLst meth="repeat">
+      <a:schemeClr val="lt1"/>
+    </dgm:linClrLst>
+    <dgm:effectClrLst/>
+    <dgm:txLinClrLst/>
+    <dgm:txFillClrLst/>
+    <dgm:txEffectClrLst/>
+  </dgm:styleLbl>
+  <dgm:styleLbl name="fgImgPlace1">
+    <dgm:fillClrLst>
+      <a:schemeClr val="accent2">
+        <a:tint val="50000"/>
+      </a:schemeClr>
+      <a:schemeClr val="accent3">
+        <a:tint val="50000"/>
+      </a:schemeClr>
+    </dgm:fillClrLst>
+    <dgm:linClrLst meth="repeat">
+      <a:schemeClr val="lt1"/>
+    </dgm:linClrLst>
+    <dgm:effectClrLst/>
+    <dgm:txLinClrLst/>
+    <dgm:txFillClrLst meth="repeat">
+      <a:schemeClr val="lt1"/>
+    </dgm:txFillClrLst>
+    <dgm:txEffectClrLst/>
+  </dgm:styleLbl>
+  <dgm:styleLbl name="alignImgPlace1">
+    <dgm:fillClrLst>
+      <a:schemeClr val="accent2">
+        <a:tint val="50000"/>
+      </a:schemeClr>
+      <a:schemeClr val="accent3">
+        <a:tint val="20000"/>
+      </a:schemeClr>
+    </dgm:fillClrLst>
+    <dgm:linClrLst meth="repeat">
+      <a:schemeClr val="lt1"/>
+    </dgm:linClrLst>
+    <dgm:effectClrLst/>
+    <dgm:txLinClrLst/>
+    <dgm:txFillClrLst meth="repeat">
+      <a:schemeClr val="lt1"/>
+    </dgm:txFillClrLst>
+    <dgm:txEffectClrLst/>
+  </dgm:styleLbl>
+  <dgm:styleLbl name="bgImgPlace1">
+    <dgm:fillClrLst>
+      <a:schemeClr val="accent2">
+        <a:tint val="50000"/>
+      </a:schemeClr>
+      <a:schemeClr val="accent3">
+        <a:tint val="20000"/>
+      </a:schemeClr>
+    </dgm:fillClrLst>
+    <dgm:linClrLst meth="repeat">
+      <a:schemeClr val="lt1"/>
+    </dgm:linClrLst>
+    <dgm:effectClrLst/>
+    <dgm:txLinClrLst/>
+    <dgm:txFillClrLst meth="repeat">
+      <a:schemeClr val="lt1"/>
+    </dgm:txFillClrLst>
+    <dgm:txEffectClrLst/>
+  </dgm:styleLbl>
+  <dgm:styleLbl name="sibTrans2D1">
+    <dgm:fillClrLst>
+      <a:schemeClr val="accent2"/>
+      <a:schemeClr val="accent3"/>
+    </dgm:fillClrLst>
+    <dgm:linClrLst meth="repeat">
+      <a:schemeClr val="lt1"/>
+    </dgm:linClrLst>
+    <dgm:effectClrLst/>
+    <dgm:txLinClrLst/>
+    <dgm:txFillClrLst/>
+    <dgm:txEffectClrLst/>
+  </dgm:styleLbl>
+  <dgm:styleLbl name="fgSibTrans2D1">
+    <dgm:fillClrLst>
+      <a:schemeClr val="accent2"/>
+      <a:schemeClr val="accent3"/>
+    </dgm:fillClrLst>
+    <dgm:linClrLst meth="repeat">
+      <a:schemeClr val="lt1"/>
+    </dgm:linClrLst>
+    <dgm:effectClrLst/>
+    <dgm:txLinClrLst/>
+    <dgm:txFillClrLst meth="repeat">
+      <a:schemeClr val="lt1"/>
+    </dgm:txFillClrLst>
+    <dgm:txEffectClrLst/>
+  </dgm:styleLbl>
+  <dgm:styleLbl name="bgSibTrans2D1">
+    <dgm:fillClrLst>
+      <a:schemeClr val="accent2"/>
+      <a:schemeClr val="accent3"/>
+    </dgm:fillClrLst>
+    <dgm:linClrLst meth="repeat">
+      <a:schemeClr val="lt1"/>
+    </dgm:linClrLst>
+    <dgm:effectClrLst/>
+    <dgm:txLinClrLst/>
+    <dgm:txFillClrLst meth="repeat">
+      <a:schemeClr val="lt1"/>
+    </dgm:txFillClrLst>
+    <dgm:txEffectClrLst/>
+  </dgm:styleLbl>
+  <dgm:styleLbl name="sibTrans1D1">
+    <dgm:fillClrLst/>
+    <dgm:linClrLst>
+      <a:schemeClr val="accent2"/>
+      <a:schemeClr val="accent3"/>
+    </dgm:linClrLst>
+    <dgm:effectClrLst/>
+    <dgm:txLinClrLst/>
+    <dgm:txFillClrLst meth="repeat">
+      <a:schemeClr val="tx1"/>
+    </dgm:txFillClrLst>
+    <dgm:txEffectClrLst/>
+  </dgm:styleLbl>
+  <dgm:styleLbl name="callout">
+    <dgm:fillClrLst meth="repeat">
+      <a:schemeClr val="accent2"/>
+    </dgm:fillClrLst>
+    <dgm:linClrLst meth="repeat">
+      <a:schemeClr val="accent2">
+        <a:tint val="50000"/>
+      </a:schemeClr>
+    </dgm:linClrLst>
+    <dgm:effectClrLst/>
+    <dgm:txLinClrLst/>
+    <dgm:txFillClrLst meth="repeat">
+      <a:schemeClr val="tx1"/>
+    </dgm:txFillClrLst>
+    <dgm:txEffectClrLst/>
+  </dgm:styleLbl>
+  <dgm:styleLbl name="asst0">
+    <dgm:fillClrLst meth="repeat">
+      <a:schemeClr val="accent2"/>
+    </dgm:fillClrLst>
+    <dgm:linClrLst meth="repeat">
+      <a:schemeClr val="lt1">
+        <a:shade val="80000"/>
+      </a:schemeClr>
+    </dgm:linClrLst>
+    <dgm:effectClrLst/>
+    <dgm:txLinClrLst/>
+    <dgm:txFillClrLst/>
+    <dgm:txEffectClrLst/>
+  </dgm:styleLbl>
+  <dgm:styleLbl name="asst1">
+    <dgm:fillClrLst meth="repeat">
+      <a:schemeClr val="accent3"/>
+    </dgm:fillClrLst>
+    <dgm:linClrLst meth="repeat">
+      <a:schemeClr val="lt1">
+        <a:shade val="80000"/>
+      </a:schemeClr>
+    </dgm:linClrLst>
+    <dgm:effectClrLst/>
+    <dgm:txLinClrLst/>
+    <dgm:txFillClrLst/>
+    <dgm:txEffectClrLst/>
+  </dgm:styleLbl>
+  <dgm:styleLbl name="asst2">
+    <dgm:fillClrLst>
+      <a:schemeClr val="accent4"/>
+    </dgm:fillClrLst>
+    <dgm:linClrLst meth="repeat">
+      <a:schemeClr val="lt1"/>
+    </dgm:linClrLst>
+    <dgm:effectClrLst/>
+    <dgm:txLinClrLst/>
+    <dgm:txFillClrLst/>
+    <dgm:txEffectClrLst/>
+  </dgm:styleLbl>
+  <dgm:styleLbl name="asst3">
+    <dgm:fillClrLst>
+      <a:schemeClr val="accent5"/>
+    </dgm:fillClrLst>
+    <dgm:linClrLst meth="repeat">
+      <a:schemeClr val="lt1"/>
+    </dgm:linClrLst>
+    <dgm:effectClrLst/>
+    <dgm:txLinClrLst/>
+    <dgm:txFillClrLst/>
+    <dgm:txEffectClrLst/>
+  </dgm:styleLbl>
+  <dgm:styleLbl name="asst4">
+    <dgm:fillClrLst>
+      <a:schemeClr val="accent6"/>
+    </dgm:fillClrLst>
+    <dgm:linClrLst meth="repeat">
+      <a:schemeClr val="lt1"/>
+    </dgm:linClrLst>
+    <dgm:effectClrLst/>
+    <dgm:txLinClrLst/>
+    <dgm:txFillClrLst/>
+    <dgm:txEffectClrLst/>
+  </dgm:styleLbl>
+  <dgm:styleLbl name="parChTrans2D1">
+    <dgm:fillClrLst meth="repeat">
+      <a:schemeClr val="accent2"/>
+    </dgm:fillClrLst>
+    <dgm:linClrLst meth="repeat">
+      <a:schemeClr val="lt1"/>
+    </dgm:linClrLst>
+    <dgm:effectClrLst/>
+    <dgm:txLinClrLst/>
+    <dgm:txFillClrLst meth="repeat">
+      <a:schemeClr val="lt1"/>
+    </dgm:txFillClrLst>
+    <dgm:txEffectClrLst/>
+  </dgm:styleLbl>
+  <dgm:styleLbl name="parChTrans2D2">
+    <dgm:fillClrLst meth="repeat">
+      <a:schemeClr val="accent3"/>
+    </dgm:fillClrLst>
+    <dgm:linClrLst meth="repeat">
+      <a:schemeClr val="lt1"/>
+    </dgm:linClrLst>
+    <dgm:effectClrLst/>
+    <dgm:txLinClrLst/>
+    <dgm:txFillClrLst/>
+    <dgm:txEffectClrLst/>
+  </dgm:styleLbl>
+  <dgm:styleLbl name="parChTrans2D3">
+    <dgm:fillClrLst meth="repeat">
+      <a:schemeClr val="accent4"/>
+    </dgm:fillClrLst>
+    <dgm:linClrLst meth="repeat">
+      <a:schemeClr val="lt1"/>
+    </dgm:linClrLst>
+    <dgm:effectClrLst/>
+    <dgm:txLinClrLst/>
+    <dgm:txFillClrLst/>
+    <dgm:txEffectClrLst/>
+  </dgm:styleLbl>
+  <dgm:styleLbl name="parChTrans2D4">
+    <dgm:fillClrLst meth="repeat">
+      <a:schemeClr val="accent5"/>
+    </dgm:fillClrLst>
+    <dgm:linClrLst meth="repeat">
+      <a:schemeClr val="lt1"/>
+    </dgm:linClrLst>
+    <dgm:effectClrLst/>
+    <dgm:txLinClrLst/>
+    <dgm:txFillClrLst meth="repeat">
+      <a:schemeClr val="lt1"/>
+    </dgm:txFillClrLst>
+    <dgm:txEffectClrLst/>
+  </dgm:styleLbl>
+  <dgm:styleLbl name="parChTrans1D1">
+    <dgm:fillClrLst meth="repeat">
+      <a:schemeClr val="accent2"/>
+    </dgm:fillClrLst>
+    <dgm:linClrLst meth="repeat">
+      <a:schemeClr val="accent2"/>
+    </dgm:linClrLst>
+    <dgm:effectClrLst/>
+    <dgm:txLinClrLst/>
+    <dgm:txFillClrLst meth="repeat">
+      <a:schemeClr val="tx1"/>
+    </dgm:txFillClrLst>
+    <dgm:txEffectClrLst/>
+  </dgm:styleLbl>
+  <dgm:styleLbl name="parChTrans1D2">
+    <dgm:fillClrLst meth="repeat">
+      <a:schemeClr val="accent2">
+        <a:tint val="90000"/>
+      </a:schemeClr>
+    </dgm:fillClrLst>
+    <dgm:linClrLst meth="repeat">
+      <a:schemeClr val="accent3"/>
+    </dgm:linClrLst>
+    <dgm:effectClrLst/>
+    <dgm:txLinClrLst/>
+    <dgm:txFillClrLst meth="repeat">
+      <a:schemeClr val="tx1"/>
+    </dgm:txFillClrLst>
+    <dgm:txEffectClrLst/>
+  </dgm:styleLbl>
+  <dgm:styleLbl name="parChTrans1D3">
+    <dgm:fillClrLst meth="repeat">
+      <a:schemeClr val="accent2">
+        <a:tint val="70000"/>
+      </a:schemeClr>
+    </dgm:fillClrLst>
+    <dgm:linClrLst meth="repeat">
+      <a:schemeClr val="accent4"/>
+    </dgm:linClrLst>
+    <dgm:effectClrLst/>
+    <dgm:txLinClrLst/>
+    <dgm:txFillClrLst meth="repeat">
+      <a:schemeClr val="tx1"/>
+    </dgm:txFillClrLst>
+    <dgm:txEffectClrLst/>
+  </dgm:styleLbl>
+  <dgm:styleLbl name="parChTrans1D4">
+    <dgm:fillClrLst meth="repeat">
+      <a:schemeClr val="accent2">
+        <a:tint val="50000"/>
+      </a:schemeClr>
+    </dgm:fillClrLst>
+    <dgm:linClrLst meth="repeat">
+      <a:schemeClr val="accent5"/>
+    </dgm:linClrLst>
+    <dgm:effectClrLst/>
+    <dgm:txLinClrLst/>
+    <dgm:txFillClrLst meth="repeat">
+      <a:schemeClr val="tx1"/>
+    </dgm:txFillClrLst>
+    <dgm:txEffectClrLst/>
+  </dgm:styleLbl>
+  <dgm:styleLbl name="fgAcc1">
+    <dgm:fillClrLst meth="repeat">
+      <a:schemeClr val="lt1">
+        <a:alpha val="90000"/>
+      </a:schemeClr>
+    </dgm:fillClrLst>
+    <dgm:linClrLst>
+      <a:schemeClr val="accent2"/>
+      <a:schemeClr val="accent3"/>
+    </dgm:linClrLst>
+    <dgm:effectClrLst/>
+    <dgm:txLinClrLst/>
+    <dgm:txFillClrLst meth="repeat">
+      <a:schemeClr val="dk1"/>
+    </dgm:txFillClrLst>
+    <dgm:txEffectClrLst/>
+  </dgm:styleLbl>
+  <dgm:styleLbl name="conFgAcc1">
+    <dgm:fillClrLst meth="repeat">
+      <a:schemeClr val="lt1">
+        <a:alpha val="90000"/>
+      </a:schemeClr>
+    </dgm:fillClrLst>
+    <dgm:linClrLst>
+      <a:schemeClr val="accent2"/>
+      <a:schemeClr val="accent3"/>
+    </dgm:linClrLst>
+    <dgm:effectClrLst/>
+    <dgm:txLinClrLst/>
+    <dgm:txFillClrLst meth="repeat">
+      <a:schemeClr val="dk1"/>
+    </dgm:txFillClrLst>
+    <dgm:txEffectClrLst/>
+  </dgm:styleLbl>
+  <dgm:styleLbl name="alignAcc1">
+    <dgm:fillClrLst meth="repeat">
+      <a:schemeClr val="lt1">
+        <a:alpha val="90000"/>
+      </a:schemeClr>
+    </dgm:fillClrLst>
+    <dgm:linClrLst>
+      <a:schemeClr val="accent2"/>
+      <a:schemeClr val="accent3"/>
+    </dgm:linClrLst>
+    <dgm:effectClrLst/>
+    <dgm:txLinClrLst/>
+    <dgm:txFillClrLst meth="repeat">
+      <a:schemeClr val="dk1"/>
+    </dgm:txFillClrLst>
+    <dgm:txEffectClrLst/>
+  </dgm:styleLbl>
+  <dgm:styleLbl name="trAlignAcc1">
+    <dgm:fillClrLst meth="repeat">
+      <a:schemeClr val="lt1">
+        <a:alpha val="0"/>
+      </a:schemeClr>
+    </dgm:fillClrLst>
+    <dgm:linClrLst>
+      <a:schemeClr val="accent2"/>
+      <a:schemeClr val="accent3"/>
+    </dgm:linClrLst>
+    <dgm:effectClrLst/>
+    <dgm:txLinClrLst/>
+    <dgm:txFillClrLst meth="repeat">
+      <a:schemeClr val="dk1"/>
+    </dgm:txFillClrLst>
+    <dgm:txEffectClrLst/>
+  </dgm:styleLbl>
+  <dgm:styleLbl name="bgAcc1">
+    <dgm:fillClrLst meth="repeat">
+      <a:schemeClr val="lt1">
+        <a:alpha val="90000"/>
+      </a:schemeClr>
+    </dgm:fillClrLst>
+    <dgm:linClrLst>
+      <a:schemeClr val="accent2"/>
+      <a:schemeClr val="accent3"/>
+    </dgm:linClrLst>
+    <dgm:effectClrLst/>
+    <dgm:txLinClrLst/>
+    <dgm:txFillClrLst meth="repeat">
+      <a:schemeClr val="dk1"/>
+    </dgm:txFillClrLst>
+    <dgm:txEffectClrLst/>
+  </dgm:styleLbl>
+  <dgm:styleLbl name="solidFgAcc1">
+    <dgm:fillClrLst meth="repeat">
+      <a:schemeClr val="lt1"/>
+    </dgm:fillClrLst>
+    <dgm:linClrLst>
+      <a:schemeClr val="accent2"/>
+      <a:schemeClr val="accent3"/>
+    </dgm:linClrLst>
+    <dgm:effectClrLst/>
+    <dgm:txLinClrLst/>
+    <dgm:txFillClrLst meth="repeat">
+      <a:schemeClr val="dk1"/>
+    </dgm:txFillClrLst>
+    <dgm:txEffectClrLst/>
+  </dgm:styleLbl>
+  <dgm:styleLbl name="solidAlignAcc1">
+    <dgm:fillClrLst meth="repeat">
+      <a:schemeClr val="lt1"/>
+    </dgm:fillClrLst>
+    <dgm:linClrLst>
+      <a:schemeClr val="accent2"/>
+      <a:schemeClr val="accent3"/>
+    </dgm:linClrLst>
+    <dgm:effectClrLst/>
+    <dgm:txLinClrLst/>
+    <dgm:txFillClrLst meth="repeat">
+      <a:schemeClr val="dk1"/>
+    </dgm:txFillClrLst>
+    <dgm:txEffectClrLst/>
+  </dgm:styleLbl>
+  <dgm:styleLbl name="solidBgAcc1">
+    <dgm:fillClrLst meth="repeat">
+      <a:schemeClr val="lt1"/>
+    </dgm:fillClrLst>
+    <dgm:linClrLst>
+      <a:schemeClr val="accent2"/>
+      <a:schemeClr val="accent3"/>
+    </dgm:linClrLst>
+    <dgm:effectClrLst/>
+    <dgm:txLinClrLst/>
+    <dgm:txFillClrLst meth="repeat">
+      <a:schemeClr val="dk1"/>
+    </dgm:txFillClrLst>
+    <dgm:txEffectClrLst/>
+  </dgm:styleLbl>
+  <dgm:styleLbl name="fgAccFollowNode1">
+    <dgm:fillClrLst>
+      <a:schemeClr val="accent2">
+        <a:tint val="40000"/>
+        <a:alpha val="90000"/>
+      </a:schemeClr>
+      <a:schemeClr val="accent3">
+        <a:tint val="40000"/>
+        <a:alpha val="90000"/>
+      </a:schemeClr>
+    </dgm:fillClrLst>
+    <dgm:linClrLst>
+      <a:schemeClr val="accent2">
+        <a:tint val="40000"/>
+        <a:alpha val="90000"/>
+      </a:schemeClr>
+      <a:schemeClr val="accent3">
+        <a:tint val="40000"/>
+        <a:alpha val="90000"/>
+      </a:schemeClr>
+    </dgm:linClrLst>
+    <dgm:effectClrLst/>
+    <dgm:txLinClrLst/>
+    <dgm:txFillClrLst meth="repeat">
+      <a:schemeClr val="dk1"/>
+    </dgm:txFillClrLst>
+    <dgm:txEffectClrLst/>
+  </dgm:styleLbl>
+  <dgm:styleLbl name="alignAccFollowNode1">
+    <dgm:fillClrLst>
+      <a:schemeClr val="accent2">
+        <a:tint val="40000"/>
+        <a:alpha val="90000"/>
+      </a:schemeClr>
+      <a:schemeClr val="accent3">
+        <a:tint val="40000"/>
+        <a:alpha val="90000"/>
+      </a:schemeClr>
+    </dgm:fillClrLst>
+    <dgm:linClrLst>
+      <a:schemeClr val="accent2">
+        <a:tint val="40000"/>
+        <a:alpha val="90000"/>
+      </a:schemeClr>
+      <a:schemeClr val="accent3">
+        <a:tint val="40000"/>
+        <a:alpha val="90000"/>
+      </a:schemeClr>
+    </dgm:linClrLst>
+    <dgm:effectClrLst/>
+    <dgm:txLinClrLst/>
+    <dgm:txFillClrLst meth="repeat">
+      <a:schemeClr val="dk1"/>
+    </dgm:txFillClrLst>
+    <dgm:txEffectClrLst/>
+  </dgm:styleLbl>
+  <dgm:styleLbl name="bgAccFollowNode1">
+    <dgm:fillClrLst>
+      <a:schemeClr val="accent2">
+        <a:tint val="40000"/>
+        <a:alpha val="90000"/>
+      </a:schemeClr>
+      <a:schemeClr val="accent3">
+        <a:tint val="40000"/>
+        <a:alpha val="90000"/>
+      </a:schemeClr>
+    </dgm:fillClrLst>
+    <dgm:linClrLst>
+      <a:schemeClr val="accent2">
+        <a:tint val="40000"/>
+        <a:alpha val="90000"/>
+      </a:schemeClr>
+      <a:schemeClr val="accent3">
+        <a:tint val="40000"/>
+        <a:alpha val="90000"/>
+      </a:schemeClr>
+    </dgm:linClrLst>
+    <dgm:effectClrLst/>
+    <dgm:txLinClrLst/>
+    <dgm:txFillClrLst meth="repeat">
+      <a:schemeClr val="dk1"/>
+    </dgm:txFillClrLst>
+    <dgm:txEffectClrLst/>
+  </dgm:styleLbl>
+  <dgm:styleLbl name="fgAcc0">
+    <dgm:fillClrLst meth="repeat">
+      <a:schemeClr val="lt1">
+        <a:alpha val="90000"/>
+      </a:schemeClr>
+    </dgm:fillClrLst>
+    <dgm:linClrLst>
+      <a:schemeClr val="accent1"/>
+    </dgm:linClrLst>
+    <dgm:effectClrLst/>
+    <dgm:txLinClrLst/>
+    <dgm:txFillClrLst meth="repeat">
+      <a:schemeClr val="dk1"/>
+    </dgm:txFillClrLst>
+    <dgm:txEffectClrLst/>
+  </dgm:styleLbl>
+  <dgm:styleLbl name="fgAcc2">
+    <dgm:fillClrLst meth="repeat">
+      <a:schemeClr val="lt1">
+        <a:alpha val="90000"/>
+      </a:schemeClr>
+    </dgm:fillClrLst>
+    <dgm:linClrLst>
+      <a:schemeClr val="accent3"/>
+    </dgm:linClrLst>
+    <dgm:effectClrLst/>
+    <dgm:txLinClrLst/>
+    <dgm:txFillClrLst meth="repeat">
+      <a:schemeClr val="dk1"/>
+    </dgm:txFillClrLst>
+    <dgm:txEffectClrLst/>
+  </dgm:styleLbl>
+  <dgm:styleLbl name="fgAcc3">
+    <dgm:fillClrLst meth="repeat">
+      <a:schemeClr val="lt1">
+        <a:alpha val="90000"/>
+      </a:schemeClr>
+    </dgm:fillClrLst>
+    <dgm:linClrLst>
+      <a:schemeClr val="accent4"/>
+    </dgm:linClrLst>
+    <dgm:effectClrLst/>
+    <dgm:txLinClrLst/>
+    <dgm:txFillClrLst meth="repeat">
+      <a:schemeClr val="dk1"/>
+    </dgm:txFillClrLst>
+    <dgm:txEffectClrLst/>
+  </dgm:styleLbl>
+  <dgm:styleLbl name="fgAcc4">
+    <dgm:fillClrLst meth="repeat">
+      <a:schemeClr val="lt1">
+        <a:alpha val="90000"/>
+      </a:schemeClr>
+    </dgm:fillClrLst>
+    <dgm:linClrLst>
+      <a:schemeClr val="accent5"/>
+    </dgm:linClrLst>
+    <dgm:effectClrLst/>
+    <dgm:txLinClrLst/>
+    <dgm:txFillClrLst meth="repeat">
+      <a:schemeClr val="dk1"/>
+    </dgm:txFillClrLst>
+    <dgm:txEffectClrLst/>
+  </dgm:styleLbl>
+  <dgm:styleLbl name="bgShp">
+    <dgm:fillClrLst>
+      <a:schemeClr val="accent2"/>
+      <a:schemeClr val="accent3"/>
+    </dgm:fillClrLst>
+    <dgm:linClrLst meth="repeat">
+      <a:schemeClr val="lt1">
+        <a:alpha val="0"/>
+      </a:schemeClr>
+    </dgm:linClrLst>
+    <dgm:effectClrLst/>
+    <dgm:txLinClrLst/>
+    <dgm:txFillClrLst/>
+    <dgm:txEffectClrLst/>
+  </dgm:styleLbl>
+  <dgm:styleLbl name="dkBgShp">
+    <dgm:fillClrLst meth="repeat">
+      <a:schemeClr val="accent2">
+        <a:shade val="90000"/>
+      </a:schemeClr>
+    </dgm:fillClrLst>
+    <dgm:linClrLst meth="repeat">
+      <a:schemeClr val="dk1"/>
+    </dgm:linClrLst>
+    <dgm:effectClrLst/>
+    <dgm:txLinClrLst/>
+    <dgm:txFillClrLst meth="repeat">
+      <a:schemeClr val="lt1"/>
+    </dgm:txFillClrLst>
+    <dgm:txEffectClrLst/>
+  </dgm:styleLbl>
+  <dgm:styleLbl name="trBgShp">
+    <dgm:fillClrLst meth="repeat">
+      <a:schemeClr val="accent2">
+        <a:tint val="50000"/>
+        <a:alpha val="40000"/>
+      </a:schemeClr>
+    </dgm:fillClrLst>
+    <dgm:linClrLst meth="repeat">
+      <a:schemeClr val="accent2"/>
+    </dgm:linClrLst>
+    <dgm:effectClrLst/>
+    <dgm:txLinClrLst/>
+    <dgm:txFillClrLst meth="repeat">
+      <a:schemeClr val="lt1"/>
+    </dgm:txFillClrLst>
+    <dgm:txEffectClrLst/>
+  </dgm:styleLbl>
+  <dgm:styleLbl name="fgShp">
+    <dgm:fillClrLst meth="repeat">
+      <a:schemeClr val="accent2">
+        <a:tint val="40000"/>
+      </a:schemeClr>
+    </dgm:fillClrLst>
+    <dgm:linClrLst meth="repeat">
+      <a:schemeClr val="lt1"/>
+    </dgm:linClrLst>
+    <dgm:effectClrLst/>
+    <dgm:txLinClrLst/>
+    <dgm:txFillClrLst meth="repeat">
+      <a:schemeClr val="dk1"/>
+    </dgm:txFillClrLst>
+    <dgm:txEffectClrLst/>
+  </dgm:styleLbl>
+  <dgm:styleLbl name="revTx">
+    <dgm:fillClrLst meth="repeat">
+      <a:schemeClr val="accent2">
+        <a:alpha val="0"/>
+      </a:schemeClr>
+    </dgm:fillClrLst>
+    <dgm:linClrLst meth="repeat">
+      <a:schemeClr val="accent2">
+        <a:alpha val="0"/>
+      </a:schemeClr>
+    </dgm:linClrLst>
+    <dgm:effectClrLst/>
+    <dgm:txLinClrLst/>
+    <dgm:txFillClrLst>
+      <a:schemeClr val="accent2"/>
+      <a:schemeClr val="accent3"/>
+    </dgm:txFillClrLst>
+    <dgm:txEffectClrLst/>
+  </dgm:styleLbl>
+</dgm:colorsDef>
+</file>
+
 <file path=ppt/diagrams/data1.xml><?xml version="1.0" encoding="utf-8"?>
 <dgm:dataModel xmlns:dgm="http://schemas.openxmlformats.org/drawingml/2006/diagram" xmlns:a="http://schemas.openxmlformats.org/drawingml/2006/main">
   <dgm:ptLst>
@@ -933,9 +1722,8 @@
           </a:pPr>
           <a:r>
             <a:rPr lang="en-US"/>
-            <a:t>Lorem ipsum dolor sit amet, consectetuer adipiscing elit. Maecenas</a:t>
+            <a:t>Have California wildfires becomes more frequent?</a:t>
           </a:r>
-          <a:endParaRPr lang="en-US" dirty="0"/>
         </a:p>
       </dgm:t>
     </dgm:pt>
@@ -976,9 +1764,8 @@
           </a:pPr>
           <a:r>
             <a:rPr lang="en-US"/>
-            <a:t>Nunc viverra imperdiet enim. Fusce est. Vivamus a tellus.</a:t>
+            <a:t>Have California wildfires become larger?</a:t>
           </a:r>
-          <a:endParaRPr lang="en-US" dirty="0"/>
         </a:p>
       </dgm:t>
     </dgm:pt>
@@ -1019,9 +1806,8 @@
           </a:pPr>
           <a:r>
             <a:rPr lang="en-US"/>
-            <a:t>Pellentesque habitant morbi tristique senectus et netus et malesuada fames.</a:t>
+            <a:t>Have California wildfires become more destructive?.</a:t>
           </a:r>
-          <a:endParaRPr lang="en-US" dirty="0"/>
         </a:p>
       </dgm:t>
     </dgm:pt>
@@ -1078,7 +1864,6 @@
               </a:ext>
             </a:extLst>
           </a:blip>
-          <a:srcRect/>
           <a:stretch>
             <a:fillRect/>
           </a:stretch>
@@ -1089,7 +1874,7 @@
       </dgm:spPr>
       <dgm:extLst>
         <a:ext uri="{E40237B7-FDA0-4F09-8148-C483321AD2D9}">
-          <dgm14:cNvPr xmlns:dgm14="http://schemas.microsoft.com/office/drawing/2010/diagram" id="0" name="" descr="Train"/>
+          <dgm14:cNvPr xmlns:dgm14="http://schemas.microsoft.com/office/drawing/2010/diagram" id="0" name="" descr="Fire"/>
         </a:ext>
       </dgm:extLst>
     </dgm:pt>
@@ -1124,9 +1909,6 @@
         <a:blipFill>
           <a:blip xmlns:r="http://schemas.openxmlformats.org/officeDocument/2006/relationships" r:embed="rId3">
             <a:extLst>
-              <a:ext uri="{28A0092B-C50C-407E-A947-70E740481C1C}">
-                <a14:useLocalDpi xmlns:a14="http://schemas.microsoft.com/office/drawing/2010/main" val="0"/>
-              </a:ext>
               <a:ext uri="{96DAC541-7B7A-43D3-8B79-37D633B846F1}">
                 <asvg:svgBlip xmlns:asvg="http://schemas.microsoft.com/office/drawing/2016/SVG/main" r:embed="rId4"/>
               </a:ext>
@@ -1143,7 +1925,7 @@
       </dgm:spPr>
       <dgm:extLst>
         <a:ext uri="{E40237B7-FDA0-4F09-8148-C483321AD2D9}">
-          <dgm14:cNvPr xmlns:dgm14="http://schemas.microsoft.com/office/drawing/2010/diagram" id="0" name="" descr="Taxi"/>
+          <dgm14:cNvPr xmlns:dgm14="http://schemas.microsoft.com/office/drawing/2010/diagram" id="0" name="" descr="Forest scene with solid fill"/>
         </a:ext>
       </dgm:extLst>
     </dgm:pt>
@@ -1178,9 +1960,6 @@
         <a:blipFill>
           <a:blip xmlns:r="http://schemas.openxmlformats.org/officeDocument/2006/relationships" r:embed="rId5">
             <a:extLst>
-              <a:ext uri="{28A0092B-C50C-407E-A947-70E740481C1C}">
-                <a14:useLocalDpi xmlns:a14="http://schemas.microsoft.com/office/drawing/2010/main" val="0"/>
-              </a:ext>
               <a:ext uri="{96DAC541-7B7A-43D3-8B79-37D633B846F1}">
                 <asvg:svgBlip xmlns:asvg="http://schemas.microsoft.com/office/drawing/2016/SVG/main" r:embed="rId6"/>
               </a:ext>
@@ -1197,7 +1976,344 @@
       </dgm:spPr>
       <dgm:extLst>
         <a:ext uri="{E40237B7-FDA0-4F09-8148-C483321AD2D9}">
-          <dgm14:cNvPr xmlns:dgm14="http://schemas.microsoft.com/office/drawing/2010/diagram" id="0" name="" descr="Cement truck"/>
+          <dgm14:cNvPr xmlns:dgm14="http://schemas.microsoft.com/office/drawing/2010/diagram" id="0" name="" descr="Firefighter male with solid fill"/>
+        </a:ext>
+      </dgm:extLst>
+    </dgm:pt>
+    <dgm:pt modelId="{D9FC7078-E5C7-42A7-BC95-B26AC3AB61F2}" type="pres">
+      <dgm:prSet presAssocID="{9EF41CC5-EF3B-4A6D-8229-3F1333EADFB3}" presName="spaceRect" presStyleCnt="0"/>
+      <dgm:spPr/>
+    </dgm:pt>
+    <dgm:pt modelId="{B7DEF6C5-8837-48BB-9ADC-2C179D03188A}" type="pres">
+      <dgm:prSet presAssocID="{9EF41CC5-EF3B-4A6D-8229-3F1333EADFB3}" presName="textRect" presStyleLbl="revTx" presStyleIdx="2" presStyleCnt="3">
+        <dgm:presLayoutVars>
+          <dgm:chMax val="1"/>
+          <dgm:chPref val="1"/>
+        </dgm:presLayoutVars>
+      </dgm:prSet>
+      <dgm:spPr/>
+    </dgm:pt>
+  </dgm:ptLst>
+  <dgm:cxnLst>
+    <dgm:cxn modelId="{AA0DB929-CA03-4CAB-BF46-2A9AEA5606A4}" type="presOf" srcId="{9EF41CC5-EF3B-4A6D-8229-3F1333EADFB3}" destId="{B7DEF6C5-8837-48BB-9ADC-2C179D03188A}" srcOrd="0" destOrd="0" presId="urn:microsoft.com/office/officeart/2018/5/layout/IconCircleLabelList"/>
+    <dgm:cxn modelId="{79317871-3EE9-4050-AFEE-40465C74A523}" type="presOf" srcId="{DC13AB6D-DEA2-4CBB-AC69-1EF1A6AD1512}" destId="{A2F8B06C-1613-4059-8CA9-4B585B75CD83}" srcOrd="0" destOrd="0" presId="urn:microsoft.com/office/officeart/2018/5/layout/IconCircleLabelList"/>
+    <dgm:cxn modelId="{4B888393-351D-4489-90C9-5A68061AB236}" srcId="{8AA20905-3954-474B-A606-562BCA026DC1}" destId="{DC13AB6D-DEA2-4CBB-AC69-1EF1A6AD1512}" srcOrd="0" destOrd="0" parTransId="{2C752582-D9FF-4E04-A92F-827DB4BB5C48}" sibTransId="{9C64CC83-643C-4E12-8F97-BC19DC031190}"/>
+    <dgm:cxn modelId="{770840AE-977B-4559-B2E8-9C1511C8970A}" type="presOf" srcId="{8AA20905-3954-474B-A606-562BCA026DC1}" destId="{F1F413A5-77DF-4C06-8100-118334054132}" srcOrd="0" destOrd="0" presId="urn:microsoft.com/office/officeart/2018/5/layout/IconCircleLabelList"/>
+    <dgm:cxn modelId="{E476EEBC-7C9F-4E07-BD58-1044B9769B64}" srcId="{8AA20905-3954-474B-A606-562BCA026DC1}" destId="{9EF41CC5-EF3B-4A6D-8229-3F1333EADFB3}" srcOrd="2" destOrd="0" parTransId="{DAEF1C7D-B0C5-46FA-BED3-8A54E918D3E0}" sibTransId="{98E6DD7C-B953-4119-9F64-9914E467ECBF}"/>
+    <dgm:cxn modelId="{F226B1C2-5D99-403A-8240-EAD6BD4D8534}" srcId="{8AA20905-3954-474B-A606-562BCA026DC1}" destId="{53742231-981F-480A-940F-203EC2F7423F}" srcOrd="1" destOrd="0" parTransId="{2FC75195-FBA1-43DE-85DD-40B4B3A2F1F3}" sibTransId="{EF449C32-A7AE-4099-9E9B-9E2F736A89CE}"/>
+    <dgm:cxn modelId="{9E3C5CD0-88A2-4BC1-8C44-099512B5DD5C}" type="presOf" srcId="{53742231-981F-480A-940F-203EC2F7423F}" destId="{5C5DF5E2-29DF-4330-A157-BCD37FD12928}" srcOrd="0" destOrd="0" presId="urn:microsoft.com/office/officeart/2018/5/layout/IconCircleLabelList"/>
+    <dgm:cxn modelId="{9880626F-782F-4801-8C11-D2989B07EF01}" type="presParOf" srcId="{F1F413A5-77DF-4C06-8100-118334054132}" destId="{AC1929A9-5981-4A32-9C0D-4B197E67AD0B}" srcOrd="0" destOrd="0" presId="urn:microsoft.com/office/officeart/2018/5/layout/IconCircleLabelList"/>
+    <dgm:cxn modelId="{D5B13D2E-0665-4DF1-8DE7-D3C35B89EFD1}" type="presParOf" srcId="{AC1929A9-5981-4A32-9C0D-4B197E67AD0B}" destId="{6A089DC9-F967-46A6-B07A-5A52552B5111}" srcOrd="0" destOrd="0" presId="urn:microsoft.com/office/officeart/2018/5/layout/IconCircleLabelList"/>
+    <dgm:cxn modelId="{D8D7F3A1-843A-47C1-BD72-C4108FDC2DC6}" type="presParOf" srcId="{AC1929A9-5981-4A32-9C0D-4B197E67AD0B}" destId="{E3F362C5-CA6A-4AE7-BE60-021A02C58117}" srcOrd="1" destOrd="0" presId="urn:microsoft.com/office/officeart/2018/5/layout/IconCircleLabelList"/>
+    <dgm:cxn modelId="{4657DAB4-ACB5-4843-9934-57D90F25ED8C}" type="presParOf" srcId="{AC1929A9-5981-4A32-9C0D-4B197E67AD0B}" destId="{A98D5481-822A-4C7B-9317-BF8F1EB3B576}" srcOrd="2" destOrd="0" presId="urn:microsoft.com/office/officeart/2018/5/layout/IconCircleLabelList"/>
+    <dgm:cxn modelId="{FC8BAAB9-B3FD-47FF-86AC-05996A0C6C83}" type="presParOf" srcId="{AC1929A9-5981-4A32-9C0D-4B197E67AD0B}" destId="{A2F8B06C-1613-4059-8CA9-4B585B75CD83}" srcOrd="3" destOrd="0" presId="urn:microsoft.com/office/officeart/2018/5/layout/IconCircleLabelList"/>
+    <dgm:cxn modelId="{B46ED258-83E4-4071-B686-545365C66042}" type="presParOf" srcId="{F1F413A5-77DF-4C06-8100-118334054132}" destId="{583E4C28-A976-4978-B6B4-7E07AC9A7EEE}" srcOrd="1" destOrd="0" presId="urn:microsoft.com/office/officeart/2018/5/layout/IconCircleLabelList"/>
+    <dgm:cxn modelId="{1E6F4865-06E5-4DAE-A889-616AE23B8CD9}" type="presParOf" srcId="{F1F413A5-77DF-4C06-8100-118334054132}" destId="{C074913D-DA51-4E4C-874B-92237D81E8D6}" srcOrd="2" destOrd="0" presId="urn:microsoft.com/office/officeart/2018/5/layout/IconCircleLabelList"/>
+    <dgm:cxn modelId="{B0E92A13-3D23-4E90-A7BA-2C1E0D11ECBA}" type="presParOf" srcId="{C074913D-DA51-4E4C-874B-92237D81E8D6}" destId="{324840A6-FF0C-43D5-90C5-D5A3F9B0AE25}" srcOrd="0" destOrd="0" presId="urn:microsoft.com/office/officeart/2018/5/layout/IconCircleLabelList"/>
+    <dgm:cxn modelId="{CD126122-EDEF-4FC8-89E3-3BC5A6981A00}" type="presParOf" srcId="{C074913D-DA51-4E4C-874B-92237D81E8D6}" destId="{59BA8133-B518-4537-9881-3822CD7CAD06}" srcOrd="1" destOrd="0" presId="urn:microsoft.com/office/officeart/2018/5/layout/IconCircleLabelList"/>
+    <dgm:cxn modelId="{01576A5D-7849-4BBD-86FB-7BC7EDAB9B54}" type="presParOf" srcId="{C074913D-DA51-4E4C-874B-92237D81E8D6}" destId="{F00EB37F-BC7D-408A-BE83-38FAA3918931}" srcOrd="2" destOrd="0" presId="urn:microsoft.com/office/officeart/2018/5/layout/IconCircleLabelList"/>
+    <dgm:cxn modelId="{1214F2CE-25D9-4DC7-BAD3-B9DE32F466C9}" type="presParOf" srcId="{C074913D-DA51-4E4C-874B-92237D81E8D6}" destId="{5C5DF5E2-29DF-4330-A157-BCD37FD12928}" srcOrd="3" destOrd="0" presId="urn:microsoft.com/office/officeart/2018/5/layout/IconCircleLabelList"/>
+    <dgm:cxn modelId="{269963D8-549A-4EDF-A645-6F49567E29A2}" type="presParOf" srcId="{F1F413A5-77DF-4C06-8100-118334054132}" destId="{EC52957E-7412-4C7A-8984-5745F0EEAC1C}" srcOrd="3" destOrd="0" presId="urn:microsoft.com/office/officeart/2018/5/layout/IconCircleLabelList"/>
+    <dgm:cxn modelId="{C0AEFFC9-27CD-4823-AA13-6DB59120B797}" type="presParOf" srcId="{F1F413A5-77DF-4C06-8100-118334054132}" destId="{7C11A057-D867-4C6B-ADFD-9CD34202F348}" srcOrd="4" destOrd="0" presId="urn:microsoft.com/office/officeart/2018/5/layout/IconCircleLabelList"/>
+    <dgm:cxn modelId="{74F1415B-3379-4E89-9634-18FD71F31A2A}" type="presParOf" srcId="{7C11A057-D867-4C6B-ADFD-9CD34202F348}" destId="{8A9D0615-74BE-404B-8F88-7FCE70F9CA5E}" srcOrd="0" destOrd="0" presId="urn:microsoft.com/office/officeart/2018/5/layout/IconCircleLabelList"/>
+    <dgm:cxn modelId="{A055007E-E8DA-4888-8928-46C450DEC359}" type="presParOf" srcId="{7C11A057-D867-4C6B-ADFD-9CD34202F348}" destId="{5FF658BC-830B-42C7-99ED-06DBBA838B7B}" srcOrd="1" destOrd="0" presId="urn:microsoft.com/office/officeart/2018/5/layout/IconCircleLabelList"/>
+    <dgm:cxn modelId="{94DDDBF2-D417-4A29-89E4-0E51359EA0A9}" type="presParOf" srcId="{7C11A057-D867-4C6B-ADFD-9CD34202F348}" destId="{D9FC7078-E5C7-42A7-BC95-B26AC3AB61F2}" srcOrd="2" destOrd="0" presId="urn:microsoft.com/office/officeart/2018/5/layout/IconCircleLabelList"/>
+    <dgm:cxn modelId="{22DF79BE-5F8F-4FDC-A59B-B9BFB3A63264}" type="presParOf" srcId="{7C11A057-D867-4C6B-ADFD-9CD34202F348}" destId="{B7DEF6C5-8837-48BB-9ADC-2C179D03188A}" srcOrd="3" destOrd="0" presId="urn:microsoft.com/office/officeart/2018/5/layout/IconCircleLabelList"/>
+  </dgm:cxnLst>
+  <dgm:bg/>
+  <dgm:whole/>
+  <dgm:extLst>
+    <a:ext uri="http://schemas.microsoft.com/office/drawing/2008/diagram">
+      <dsp:dataModelExt xmlns:dsp="http://schemas.microsoft.com/office/drawing/2008/diagram" relId="rId6" minVer="http://schemas.openxmlformats.org/drawingml/2006/diagram"/>
+    </a:ext>
+  </dgm:extLst>
+</dgm:dataModel>
+</file>
+
+<file path=ppt/diagrams/data2.xml><?xml version="1.0" encoding="utf-8"?>
+<dgm:dataModel xmlns:dgm="http://schemas.openxmlformats.org/drawingml/2006/diagram" xmlns:a="http://schemas.openxmlformats.org/drawingml/2006/main">
+  <dgm:ptLst>
+    <dgm:pt modelId="{8AA20905-3954-474B-A606-562BCA026DC1}" type="doc">
+      <dgm:prSet loTypeId="urn:microsoft.com/office/officeart/2018/5/layout/IconCircleLabelList" loCatId="icon" qsTypeId="urn:microsoft.com/office/officeart/2005/8/quickstyle/simple1" qsCatId="simple" csTypeId="urn:microsoft.com/office/officeart/2018/5/colors/Iconchunking_coloredtext_colorful2" csCatId="colorful" phldr="1"/>
+      <dgm:spPr/>
+      <dgm:t>
+        <a:bodyPr/>
+        <a:lstStyle/>
+        <a:p>
+          <a:endParaRPr lang="en-US"/>
+        </a:p>
+      </dgm:t>
+    </dgm:pt>
+    <dgm:pt modelId="{DC13AB6D-DEA2-4CBB-AC69-1EF1A6AD1512}">
+      <dgm:prSet/>
+      <dgm:spPr/>
+      <dgm:t>
+        <a:bodyPr/>
+        <a:lstStyle/>
+        <a:p>
+          <a:pPr>
+            <a:lnSpc>
+              <a:spcPct val="100000"/>
+            </a:lnSpc>
+            <a:defRPr cap="all"/>
+          </a:pPr>
+          <a:r>
+            <a:rPr lang="en-US"/>
+            <a:t>Have California wildfires becomes more frequent?</a:t>
+          </a:r>
+        </a:p>
+      </dgm:t>
+    </dgm:pt>
+    <dgm:pt modelId="{2C752582-D9FF-4E04-A92F-827DB4BB5C48}" type="parTrans" cxnId="{4B888393-351D-4489-90C9-5A68061AB236}">
+      <dgm:prSet/>
+      <dgm:spPr/>
+      <dgm:t>
+        <a:bodyPr/>
+        <a:lstStyle/>
+        <a:p>
+          <a:endParaRPr lang="en-US"/>
+        </a:p>
+      </dgm:t>
+    </dgm:pt>
+    <dgm:pt modelId="{9C64CC83-643C-4E12-8F97-BC19DC031190}" type="sibTrans" cxnId="{4B888393-351D-4489-90C9-5A68061AB236}">
+      <dgm:prSet/>
+      <dgm:spPr/>
+      <dgm:t>
+        <a:bodyPr/>
+        <a:lstStyle/>
+        <a:p>
+          <a:endParaRPr lang="en-US"/>
+        </a:p>
+      </dgm:t>
+    </dgm:pt>
+    <dgm:pt modelId="{53742231-981F-480A-940F-203EC2F7423F}">
+      <dgm:prSet/>
+      <dgm:spPr/>
+      <dgm:t>
+        <a:bodyPr/>
+        <a:lstStyle/>
+        <a:p>
+          <a:pPr>
+            <a:lnSpc>
+              <a:spcPct val="100000"/>
+            </a:lnSpc>
+            <a:defRPr cap="all"/>
+          </a:pPr>
+          <a:r>
+            <a:rPr lang="en-US"/>
+            <a:t>Have California wildfires become larger?</a:t>
+          </a:r>
+        </a:p>
+      </dgm:t>
+    </dgm:pt>
+    <dgm:pt modelId="{2FC75195-FBA1-43DE-85DD-40B4B3A2F1F3}" type="parTrans" cxnId="{F226B1C2-5D99-403A-8240-EAD6BD4D8534}">
+      <dgm:prSet/>
+      <dgm:spPr/>
+      <dgm:t>
+        <a:bodyPr/>
+        <a:lstStyle/>
+        <a:p>
+          <a:endParaRPr lang="en-US"/>
+        </a:p>
+      </dgm:t>
+    </dgm:pt>
+    <dgm:pt modelId="{EF449C32-A7AE-4099-9E9B-9E2F736A89CE}" type="sibTrans" cxnId="{F226B1C2-5D99-403A-8240-EAD6BD4D8534}">
+      <dgm:prSet/>
+      <dgm:spPr/>
+      <dgm:t>
+        <a:bodyPr/>
+        <a:lstStyle/>
+        <a:p>
+          <a:endParaRPr lang="en-US"/>
+        </a:p>
+      </dgm:t>
+    </dgm:pt>
+    <dgm:pt modelId="{9EF41CC5-EF3B-4A6D-8229-3F1333EADFB3}">
+      <dgm:prSet/>
+      <dgm:spPr/>
+      <dgm:t>
+        <a:bodyPr/>
+        <a:lstStyle/>
+        <a:p>
+          <a:pPr>
+            <a:lnSpc>
+              <a:spcPct val="100000"/>
+            </a:lnSpc>
+            <a:defRPr cap="all"/>
+          </a:pPr>
+          <a:r>
+            <a:rPr lang="en-US"/>
+            <a:t>Have California wildfires become more destructive?.</a:t>
+          </a:r>
+        </a:p>
+      </dgm:t>
+    </dgm:pt>
+    <dgm:pt modelId="{DAEF1C7D-B0C5-46FA-BED3-8A54E918D3E0}" type="parTrans" cxnId="{E476EEBC-7C9F-4E07-BD58-1044B9769B64}">
+      <dgm:prSet/>
+      <dgm:spPr/>
+      <dgm:t>
+        <a:bodyPr/>
+        <a:lstStyle/>
+        <a:p>
+          <a:endParaRPr lang="en-US"/>
+        </a:p>
+      </dgm:t>
+    </dgm:pt>
+    <dgm:pt modelId="{98E6DD7C-B953-4119-9F64-9914E467ECBF}" type="sibTrans" cxnId="{E476EEBC-7C9F-4E07-BD58-1044B9769B64}">
+      <dgm:prSet/>
+      <dgm:spPr/>
+      <dgm:t>
+        <a:bodyPr/>
+        <a:lstStyle/>
+        <a:p>
+          <a:endParaRPr lang="en-US"/>
+        </a:p>
+      </dgm:t>
+    </dgm:pt>
+    <dgm:pt modelId="{F1F413A5-77DF-4C06-8100-118334054132}" type="pres">
+      <dgm:prSet presAssocID="{8AA20905-3954-474B-A606-562BCA026DC1}" presName="root" presStyleCnt="0">
+        <dgm:presLayoutVars>
+          <dgm:dir/>
+          <dgm:resizeHandles val="exact"/>
+        </dgm:presLayoutVars>
+      </dgm:prSet>
+      <dgm:spPr/>
+    </dgm:pt>
+    <dgm:pt modelId="{AC1929A9-5981-4A32-9C0D-4B197E67AD0B}" type="pres">
+      <dgm:prSet presAssocID="{DC13AB6D-DEA2-4CBB-AC69-1EF1A6AD1512}" presName="compNode" presStyleCnt="0"/>
+      <dgm:spPr/>
+    </dgm:pt>
+    <dgm:pt modelId="{6A089DC9-F967-46A6-B07A-5A52552B5111}" type="pres">
+      <dgm:prSet presAssocID="{DC13AB6D-DEA2-4CBB-AC69-1EF1A6AD1512}" presName="iconBgRect" presStyleLbl="bgShp" presStyleIdx="0" presStyleCnt="3"/>
+      <dgm:spPr/>
+    </dgm:pt>
+    <dgm:pt modelId="{E3F362C5-CA6A-4AE7-BE60-021A02C58117}" type="pres">
+      <dgm:prSet presAssocID="{DC13AB6D-DEA2-4CBB-AC69-1EF1A6AD1512}" presName="iconRect" presStyleLbl="node1" presStyleIdx="0" presStyleCnt="3"/>
+      <dgm:spPr>
+        <a:blipFill>
+          <a:blip xmlns:r="http://schemas.openxmlformats.org/officeDocument/2006/relationships" r:embed="rId1">
+            <a:extLst>
+              <a:ext uri="{28A0092B-C50C-407E-A947-70E740481C1C}">
+                <a14:useLocalDpi xmlns:a14="http://schemas.microsoft.com/office/drawing/2010/main" val="0"/>
+              </a:ext>
+              <a:ext uri="{96DAC541-7B7A-43D3-8B79-37D633B846F1}">
+                <asvg:svgBlip xmlns:asvg="http://schemas.microsoft.com/office/drawing/2016/SVG/main" r:embed="rId2"/>
+              </a:ext>
+            </a:extLst>
+          </a:blip>
+          <a:stretch>
+            <a:fillRect/>
+          </a:stretch>
+        </a:blipFill>
+        <a:ln>
+          <a:noFill/>
+        </a:ln>
+      </dgm:spPr>
+      <dgm:extLst>
+        <a:ext uri="{E40237B7-FDA0-4F09-8148-C483321AD2D9}">
+          <dgm14:cNvPr xmlns:dgm14="http://schemas.microsoft.com/office/drawing/2010/diagram" id="0" name="" descr="Fire"/>
+        </a:ext>
+      </dgm:extLst>
+    </dgm:pt>
+    <dgm:pt modelId="{A98D5481-822A-4C7B-9317-BF8F1EB3B576}" type="pres">
+      <dgm:prSet presAssocID="{DC13AB6D-DEA2-4CBB-AC69-1EF1A6AD1512}" presName="spaceRect" presStyleCnt="0"/>
+      <dgm:spPr/>
+    </dgm:pt>
+    <dgm:pt modelId="{A2F8B06C-1613-4059-8CA9-4B585B75CD83}" type="pres">
+      <dgm:prSet presAssocID="{DC13AB6D-DEA2-4CBB-AC69-1EF1A6AD1512}" presName="textRect" presStyleLbl="revTx" presStyleIdx="0" presStyleCnt="3">
+        <dgm:presLayoutVars>
+          <dgm:chMax val="1"/>
+          <dgm:chPref val="1"/>
+        </dgm:presLayoutVars>
+      </dgm:prSet>
+      <dgm:spPr/>
+    </dgm:pt>
+    <dgm:pt modelId="{583E4C28-A976-4978-B6B4-7E07AC9A7EEE}" type="pres">
+      <dgm:prSet presAssocID="{9C64CC83-643C-4E12-8F97-BC19DC031190}" presName="sibTrans" presStyleCnt="0"/>
+      <dgm:spPr/>
+    </dgm:pt>
+    <dgm:pt modelId="{C074913D-DA51-4E4C-874B-92237D81E8D6}" type="pres">
+      <dgm:prSet presAssocID="{53742231-981F-480A-940F-203EC2F7423F}" presName="compNode" presStyleCnt="0"/>
+      <dgm:spPr/>
+    </dgm:pt>
+    <dgm:pt modelId="{324840A6-FF0C-43D5-90C5-D5A3F9B0AE25}" type="pres">
+      <dgm:prSet presAssocID="{53742231-981F-480A-940F-203EC2F7423F}" presName="iconBgRect" presStyleLbl="bgShp" presStyleIdx="1" presStyleCnt="3"/>
+      <dgm:spPr/>
+    </dgm:pt>
+    <dgm:pt modelId="{59BA8133-B518-4537-9881-3822CD7CAD06}" type="pres">
+      <dgm:prSet presAssocID="{53742231-981F-480A-940F-203EC2F7423F}" presName="iconRect" presStyleLbl="node1" presStyleIdx="1" presStyleCnt="3"/>
+      <dgm:spPr>
+        <a:blipFill>
+          <a:blip xmlns:r="http://schemas.openxmlformats.org/officeDocument/2006/relationships" r:embed="rId3">
+            <a:extLst>
+              <a:ext uri="{96DAC541-7B7A-43D3-8B79-37D633B846F1}">
+                <asvg:svgBlip xmlns:asvg="http://schemas.microsoft.com/office/drawing/2016/SVG/main" r:embed="rId4"/>
+              </a:ext>
+            </a:extLst>
+          </a:blip>
+          <a:srcRect/>
+          <a:stretch>
+            <a:fillRect/>
+          </a:stretch>
+        </a:blipFill>
+        <a:ln>
+          <a:noFill/>
+        </a:ln>
+      </dgm:spPr>
+      <dgm:extLst>
+        <a:ext uri="{E40237B7-FDA0-4F09-8148-C483321AD2D9}">
+          <dgm14:cNvPr xmlns:dgm14="http://schemas.microsoft.com/office/drawing/2010/diagram" id="0" name="" descr="Forest scene with solid fill"/>
+        </a:ext>
+      </dgm:extLst>
+    </dgm:pt>
+    <dgm:pt modelId="{F00EB37F-BC7D-408A-BE83-38FAA3918931}" type="pres">
+      <dgm:prSet presAssocID="{53742231-981F-480A-940F-203EC2F7423F}" presName="spaceRect" presStyleCnt="0"/>
+      <dgm:spPr/>
+    </dgm:pt>
+    <dgm:pt modelId="{5C5DF5E2-29DF-4330-A157-BCD37FD12928}" type="pres">
+      <dgm:prSet presAssocID="{53742231-981F-480A-940F-203EC2F7423F}" presName="textRect" presStyleLbl="revTx" presStyleIdx="1" presStyleCnt="3">
+        <dgm:presLayoutVars>
+          <dgm:chMax val="1"/>
+          <dgm:chPref val="1"/>
+        </dgm:presLayoutVars>
+      </dgm:prSet>
+      <dgm:spPr/>
+    </dgm:pt>
+    <dgm:pt modelId="{EC52957E-7412-4C7A-8984-5745F0EEAC1C}" type="pres">
+      <dgm:prSet presAssocID="{EF449C32-A7AE-4099-9E9B-9E2F736A89CE}" presName="sibTrans" presStyleCnt="0"/>
+      <dgm:spPr/>
+    </dgm:pt>
+    <dgm:pt modelId="{7C11A057-D867-4C6B-ADFD-9CD34202F348}" type="pres">
+      <dgm:prSet presAssocID="{9EF41CC5-EF3B-4A6D-8229-3F1333EADFB3}" presName="compNode" presStyleCnt="0"/>
+      <dgm:spPr/>
+    </dgm:pt>
+    <dgm:pt modelId="{8A9D0615-74BE-404B-8F88-7FCE70F9CA5E}" type="pres">
+      <dgm:prSet presAssocID="{9EF41CC5-EF3B-4A6D-8229-3F1333EADFB3}" presName="iconBgRect" presStyleLbl="bgShp" presStyleIdx="2" presStyleCnt="3"/>
+      <dgm:spPr/>
+    </dgm:pt>
+    <dgm:pt modelId="{5FF658BC-830B-42C7-99ED-06DBBA838B7B}" type="pres">
+      <dgm:prSet presAssocID="{9EF41CC5-EF3B-4A6D-8229-3F1333EADFB3}" presName="iconRect" presStyleLbl="node1" presStyleIdx="2" presStyleCnt="3"/>
+      <dgm:spPr>
+        <a:blipFill>
+          <a:blip xmlns:r="http://schemas.openxmlformats.org/officeDocument/2006/relationships" r:embed="rId5">
+            <a:extLst>
+              <a:ext uri="{96DAC541-7B7A-43D3-8B79-37D633B846F1}">
+                <asvg:svgBlip xmlns:asvg="http://schemas.microsoft.com/office/drawing/2016/SVG/main" r:embed="rId6"/>
+              </a:ext>
+            </a:extLst>
+          </a:blip>
+          <a:srcRect/>
+          <a:stretch>
+            <a:fillRect/>
+          </a:stretch>
+        </a:blipFill>
+        <a:ln>
+          <a:noFill/>
+        </a:ln>
+      </dgm:spPr>
+      <dgm:extLst>
+        <a:ext uri="{E40237B7-FDA0-4F09-8148-C483321AD2D9}">
+          <dgm14:cNvPr xmlns:dgm14="http://schemas.microsoft.com/office/drawing/2010/diagram" id="0" name="" descr="Firefighter male with solid fill"/>
         </a:ext>
       </dgm:extLst>
     </dgm:pt>
@@ -1322,7 +2438,6 @@
               </a:ext>
             </a:extLst>
           </a:blip>
-          <a:srcRect/>
           <a:stretch>
             <a:fillRect/>
           </a:stretch>
@@ -1385,7 +2500,7 @@
         </a:bodyPr>
         <a:lstStyle/>
         <a:p>
-          <a:pPr marL="0" lvl="0" indent="0" algn="ctr" defTabSz="488950">
+          <a:pPr marL="0" lvl="0" indent="0" algn="ctr" defTabSz="666750">
             <a:lnSpc>
               <a:spcPct val="100000"/>
             </a:lnSpc>
@@ -1399,10 +2514,9 @@
             <a:defRPr cap="all"/>
           </a:pPr>
           <a:r>
-            <a:rPr lang="en-US" sz="1100" kern="1200"/>
-            <a:t>Lorem ipsum dolor sit amet, consectetuer adipiscing elit. Maecenas</a:t>
+            <a:rPr lang="en-US" sz="1500" kern="1200"/>
+            <a:t>Have California wildfires becomes more frequent?</a:t>
           </a:r>
-          <a:endParaRPr lang="en-US" sz="1100" kern="1200" dirty="0"/>
         </a:p>
       </dsp:txBody>
       <dsp:txXfrm>
@@ -1465,9 +2579,6 @@
         <a:blipFill>
           <a:blip xmlns:r="http://schemas.openxmlformats.org/officeDocument/2006/relationships" r:embed="rId3">
             <a:extLst>
-              <a:ext uri="{28A0092B-C50C-407E-A947-70E740481C1C}">
-                <a14:useLocalDpi xmlns:a14="http://schemas.microsoft.com/office/drawing/2010/main" val="0"/>
-              </a:ext>
               <a:ext uri="{96DAC541-7B7A-43D3-8B79-37D633B846F1}">
                 <asvg:svgBlip xmlns:asvg="http://schemas.microsoft.com/office/drawing/2016/SVG/main" r:embed="rId4"/>
               </a:ext>
@@ -1536,7 +2647,7 @@
         </a:bodyPr>
         <a:lstStyle/>
         <a:p>
-          <a:pPr marL="0" lvl="0" indent="0" algn="ctr" defTabSz="488950">
+          <a:pPr marL="0" lvl="0" indent="0" algn="ctr" defTabSz="666750">
             <a:lnSpc>
               <a:spcPct val="100000"/>
             </a:lnSpc>
@@ -1550,10 +2661,9 @@
             <a:defRPr cap="all"/>
           </a:pPr>
           <a:r>
-            <a:rPr lang="en-US" sz="1100" kern="1200"/>
-            <a:t>Nunc viverra imperdiet enim. Fusce est. Vivamus a tellus.</a:t>
+            <a:rPr lang="en-US" sz="1500" kern="1200"/>
+            <a:t>Have California wildfires become larger?</a:t>
           </a:r>
-          <a:endParaRPr lang="en-US" sz="1100" kern="1200" dirty="0"/>
         </a:p>
       </dsp:txBody>
       <dsp:txXfrm>
@@ -1616,9 +2726,6 @@
         <a:blipFill>
           <a:blip xmlns:r="http://schemas.openxmlformats.org/officeDocument/2006/relationships" r:embed="rId5">
             <a:extLst>
-              <a:ext uri="{28A0092B-C50C-407E-A947-70E740481C1C}">
-                <a14:useLocalDpi xmlns:a14="http://schemas.microsoft.com/office/drawing/2010/main" val="0"/>
-              </a:ext>
               <a:ext uri="{96DAC541-7B7A-43D3-8B79-37D633B846F1}">
                 <asvg:svgBlip xmlns:asvg="http://schemas.microsoft.com/office/drawing/2016/SVG/main" r:embed="rId6"/>
               </a:ext>
@@ -1687,7 +2794,7 @@
         </a:bodyPr>
         <a:lstStyle/>
         <a:p>
-          <a:pPr marL="0" lvl="0" indent="0" algn="ctr" defTabSz="488950">
+          <a:pPr marL="0" lvl="0" indent="0" algn="ctr" defTabSz="666750">
             <a:lnSpc>
               <a:spcPct val="100000"/>
             </a:lnSpc>
@@ -1701,10 +2808,464 @@
             <a:defRPr cap="all"/>
           </a:pPr>
           <a:r>
-            <a:rPr lang="en-US" sz="1100" kern="1200"/>
-            <a:t>Pellentesque habitant morbi tristique senectus et netus et malesuada fames.</a:t>
+            <a:rPr lang="en-US" sz="1500" kern="1200"/>
+            <a:t>Have California wildfires become more destructive?.</a:t>
           </a:r>
-          <a:endParaRPr lang="en-US" sz="1100" kern="1200" dirty="0"/>
+        </a:p>
+      </dsp:txBody>
+      <dsp:txXfrm>
+        <a:off x="4437039" y="2217590"/>
+        <a:ext cx="1856250" cy="720000"/>
+      </dsp:txXfrm>
+    </dsp:sp>
+  </dsp:spTree>
+</dsp:drawing>
+</file>
+
+<file path=ppt/diagrams/drawing2.xml><?xml version="1.0" encoding="utf-8"?>
+<dsp:drawing xmlns:dgm="http://schemas.openxmlformats.org/drawingml/2006/diagram" xmlns:dsp="http://schemas.microsoft.com/office/drawing/2008/diagram" xmlns:a="http://schemas.openxmlformats.org/drawingml/2006/main">
+  <dsp:spTree>
+    <dsp:nvGrpSpPr>
+      <dsp:cNvPr id="0" name=""/>
+      <dsp:cNvGrpSpPr/>
+    </dsp:nvGrpSpPr>
+    <dsp:grpSpPr/>
+    <dsp:sp modelId="{6A089DC9-F967-46A6-B07A-5A52552B5111}">
+      <dsp:nvSpPr>
+        <dsp:cNvPr id="0" name=""/>
+        <dsp:cNvSpPr/>
+      </dsp:nvSpPr>
+      <dsp:spPr>
+        <a:xfrm>
+          <a:off x="436820" y="732589"/>
+          <a:ext cx="1132312" cy="1132312"/>
+        </a:xfrm>
+        <a:prstGeom prst="ellipse">
+          <a:avLst/>
+        </a:prstGeom>
+        <a:solidFill>
+          <a:schemeClr val="accent2">
+            <a:hueOff val="0"/>
+            <a:satOff val="0"/>
+            <a:lumOff val="0"/>
+            <a:alphaOff val="0"/>
+          </a:schemeClr>
+        </a:solidFill>
+        <a:ln>
+          <a:noFill/>
+        </a:ln>
+        <a:effectLst/>
+      </dsp:spPr>
+      <dsp:style>
+        <a:lnRef idx="0">
+          <a:scrgbClr r="0" g="0" b="0"/>
+        </a:lnRef>
+        <a:fillRef idx="1">
+          <a:scrgbClr r="0" g="0" b="0"/>
+        </a:fillRef>
+        <a:effectRef idx="0">
+          <a:scrgbClr r="0" g="0" b="0"/>
+        </a:effectRef>
+        <a:fontRef idx="minor"/>
+      </dsp:style>
+    </dsp:sp>
+    <dsp:sp modelId="{E3F362C5-CA6A-4AE7-BE60-021A02C58117}">
+      <dsp:nvSpPr>
+        <dsp:cNvPr id="0" name=""/>
+        <dsp:cNvSpPr/>
+      </dsp:nvSpPr>
+      <dsp:spPr>
+        <a:xfrm>
+          <a:off x="678133" y="973902"/>
+          <a:ext cx="649687" cy="649687"/>
+        </a:xfrm>
+        <a:prstGeom prst="rect">
+          <a:avLst/>
+        </a:prstGeom>
+        <a:blipFill>
+          <a:blip xmlns:r="http://schemas.openxmlformats.org/officeDocument/2006/relationships" r:embed="rId1">
+            <a:extLst>
+              <a:ext uri="{28A0092B-C50C-407E-A947-70E740481C1C}">
+                <a14:useLocalDpi xmlns:a14="http://schemas.microsoft.com/office/drawing/2010/main" val="0"/>
+              </a:ext>
+              <a:ext uri="{96DAC541-7B7A-43D3-8B79-37D633B846F1}">
+                <asvg:svgBlip xmlns:asvg="http://schemas.microsoft.com/office/drawing/2016/SVG/main" r:embed="rId2"/>
+              </a:ext>
+            </a:extLst>
+          </a:blip>
+          <a:stretch>
+            <a:fillRect/>
+          </a:stretch>
+        </a:blipFill>
+        <a:ln w="15875" cap="flat" cmpd="sng" algn="ctr">
+          <a:noFill/>
+          <a:prstDash val="solid"/>
+        </a:ln>
+        <a:effectLst/>
+      </dsp:spPr>
+      <dsp:style>
+        <a:lnRef idx="2">
+          <a:scrgbClr r="0" g="0" b="0"/>
+        </a:lnRef>
+        <a:fillRef idx="1">
+          <a:scrgbClr r="0" g="0" b="0"/>
+        </a:fillRef>
+        <a:effectRef idx="0">
+          <a:scrgbClr r="0" g="0" b="0"/>
+        </a:effectRef>
+        <a:fontRef idx="minor">
+          <a:schemeClr val="lt1"/>
+        </a:fontRef>
+      </dsp:style>
+    </dsp:sp>
+    <dsp:sp modelId="{A2F8B06C-1613-4059-8CA9-4B585B75CD83}">
+      <dsp:nvSpPr>
+        <dsp:cNvPr id="0" name=""/>
+        <dsp:cNvSpPr/>
+      </dsp:nvSpPr>
+      <dsp:spPr>
+        <a:xfrm>
+          <a:off x="74852" y="2217590"/>
+          <a:ext cx="1856250" cy="720000"/>
+        </a:xfrm>
+        <a:prstGeom prst="rect">
+          <a:avLst/>
+        </a:prstGeom>
+        <a:noFill/>
+        <a:ln>
+          <a:noFill/>
+        </a:ln>
+        <a:effectLst/>
+      </dsp:spPr>
+      <dsp:style>
+        <a:lnRef idx="0">
+          <a:scrgbClr r="0" g="0" b="0"/>
+        </a:lnRef>
+        <a:fillRef idx="0">
+          <a:scrgbClr r="0" g="0" b="0"/>
+        </a:fillRef>
+        <a:effectRef idx="0">
+          <a:scrgbClr r="0" g="0" b="0"/>
+        </a:effectRef>
+        <a:fontRef idx="minor"/>
+      </dsp:style>
+      <dsp:txBody>
+        <a:bodyPr spcFirstLastPara="0" vert="horz" wrap="square" lIns="0" tIns="0" rIns="0" bIns="0" numCol="1" spcCol="1270" anchor="t" anchorCtr="0">
+          <a:noAutofit/>
+        </a:bodyPr>
+        <a:lstStyle/>
+        <a:p>
+          <a:pPr marL="0" lvl="0" indent="0" algn="ctr" defTabSz="666750">
+            <a:lnSpc>
+              <a:spcPct val="100000"/>
+            </a:lnSpc>
+            <a:spcBef>
+              <a:spcPct val="0"/>
+            </a:spcBef>
+            <a:spcAft>
+              <a:spcPct val="35000"/>
+            </a:spcAft>
+            <a:buNone/>
+            <a:defRPr cap="all"/>
+          </a:pPr>
+          <a:r>
+            <a:rPr lang="en-US" sz="1500" kern="1200"/>
+            <a:t>Have California wildfires becomes more frequent?</a:t>
+          </a:r>
+        </a:p>
+      </dsp:txBody>
+      <dsp:txXfrm>
+        <a:off x="74852" y="2217590"/>
+        <a:ext cx="1856250" cy="720000"/>
+      </dsp:txXfrm>
+    </dsp:sp>
+    <dsp:sp modelId="{324840A6-FF0C-43D5-90C5-D5A3F9B0AE25}">
+      <dsp:nvSpPr>
+        <dsp:cNvPr id="0" name=""/>
+        <dsp:cNvSpPr/>
+      </dsp:nvSpPr>
+      <dsp:spPr>
+        <a:xfrm>
+          <a:off x="2617914" y="732589"/>
+          <a:ext cx="1132312" cy="1132312"/>
+        </a:xfrm>
+        <a:prstGeom prst="ellipse">
+          <a:avLst/>
+        </a:prstGeom>
+        <a:solidFill>
+          <a:schemeClr val="accent2">
+            <a:hueOff val="19519"/>
+            <a:satOff val="-13438"/>
+            <a:lumOff val="-3431"/>
+            <a:alphaOff val="0"/>
+          </a:schemeClr>
+        </a:solidFill>
+        <a:ln>
+          <a:noFill/>
+        </a:ln>
+        <a:effectLst/>
+      </dsp:spPr>
+      <dsp:style>
+        <a:lnRef idx="0">
+          <a:scrgbClr r="0" g="0" b="0"/>
+        </a:lnRef>
+        <a:fillRef idx="1">
+          <a:scrgbClr r="0" g="0" b="0"/>
+        </a:fillRef>
+        <a:effectRef idx="0">
+          <a:scrgbClr r="0" g="0" b="0"/>
+        </a:effectRef>
+        <a:fontRef idx="minor"/>
+      </dsp:style>
+    </dsp:sp>
+    <dsp:sp modelId="{59BA8133-B518-4537-9881-3822CD7CAD06}">
+      <dsp:nvSpPr>
+        <dsp:cNvPr id="0" name=""/>
+        <dsp:cNvSpPr/>
+      </dsp:nvSpPr>
+      <dsp:spPr>
+        <a:xfrm>
+          <a:off x="2859227" y="973902"/>
+          <a:ext cx="649687" cy="649687"/>
+        </a:xfrm>
+        <a:prstGeom prst="rect">
+          <a:avLst/>
+        </a:prstGeom>
+        <a:blipFill>
+          <a:blip xmlns:r="http://schemas.openxmlformats.org/officeDocument/2006/relationships" r:embed="rId3">
+            <a:extLst>
+              <a:ext uri="{96DAC541-7B7A-43D3-8B79-37D633B846F1}">
+                <asvg:svgBlip xmlns:asvg="http://schemas.microsoft.com/office/drawing/2016/SVG/main" r:embed="rId4"/>
+              </a:ext>
+            </a:extLst>
+          </a:blip>
+          <a:srcRect/>
+          <a:stretch>
+            <a:fillRect/>
+          </a:stretch>
+        </a:blipFill>
+        <a:ln w="15875" cap="flat" cmpd="sng" algn="ctr">
+          <a:noFill/>
+          <a:prstDash val="solid"/>
+        </a:ln>
+        <a:effectLst/>
+      </dsp:spPr>
+      <dsp:style>
+        <a:lnRef idx="2">
+          <a:scrgbClr r="0" g="0" b="0"/>
+        </a:lnRef>
+        <a:fillRef idx="1">
+          <a:scrgbClr r="0" g="0" b="0"/>
+        </a:fillRef>
+        <a:effectRef idx="0">
+          <a:scrgbClr r="0" g="0" b="0"/>
+        </a:effectRef>
+        <a:fontRef idx="minor">
+          <a:schemeClr val="lt1"/>
+        </a:fontRef>
+      </dsp:style>
+    </dsp:sp>
+    <dsp:sp modelId="{5C5DF5E2-29DF-4330-A157-BCD37FD12928}">
+      <dsp:nvSpPr>
+        <dsp:cNvPr id="0" name=""/>
+        <dsp:cNvSpPr/>
+      </dsp:nvSpPr>
+      <dsp:spPr>
+        <a:xfrm>
+          <a:off x="2255946" y="2217590"/>
+          <a:ext cx="1856250" cy="720000"/>
+        </a:xfrm>
+        <a:prstGeom prst="rect">
+          <a:avLst/>
+        </a:prstGeom>
+        <a:noFill/>
+        <a:ln>
+          <a:noFill/>
+        </a:ln>
+        <a:effectLst/>
+      </dsp:spPr>
+      <dsp:style>
+        <a:lnRef idx="0">
+          <a:scrgbClr r="0" g="0" b="0"/>
+        </a:lnRef>
+        <a:fillRef idx="0">
+          <a:scrgbClr r="0" g="0" b="0"/>
+        </a:fillRef>
+        <a:effectRef idx="0">
+          <a:scrgbClr r="0" g="0" b="0"/>
+        </a:effectRef>
+        <a:fontRef idx="minor"/>
+      </dsp:style>
+      <dsp:txBody>
+        <a:bodyPr spcFirstLastPara="0" vert="horz" wrap="square" lIns="0" tIns="0" rIns="0" bIns="0" numCol="1" spcCol="1270" anchor="t" anchorCtr="0">
+          <a:noAutofit/>
+        </a:bodyPr>
+        <a:lstStyle/>
+        <a:p>
+          <a:pPr marL="0" lvl="0" indent="0" algn="ctr" defTabSz="666750">
+            <a:lnSpc>
+              <a:spcPct val="100000"/>
+            </a:lnSpc>
+            <a:spcBef>
+              <a:spcPct val="0"/>
+            </a:spcBef>
+            <a:spcAft>
+              <a:spcPct val="35000"/>
+            </a:spcAft>
+            <a:buNone/>
+            <a:defRPr cap="all"/>
+          </a:pPr>
+          <a:r>
+            <a:rPr lang="en-US" sz="1500" kern="1200"/>
+            <a:t>Have California wildfires become larger?</a:t>
+          </a:r>
+        </a:p>
+      </dsp:txBody>
+      <dsp:txXfrm>
+        <a:off x="2255946" y="2217590"/>
+        <a:ext cx="1856250" cy="720000"/>
+      </dsp:txXfrm>
+    </dsp:sp>
+    <dsp:sp modelId="{8A9D0615-74BE-404B-8F88-7FCE70F9CA5E}">
+      <dsp:nvSpPr>
+        <dsp:cNvPr id="0" name=""/>
+        <dsp:cNvSpPr/>
+      </dsp:nvSpPr>
+      <dsp:spPr>
+        <a:xfrm>
+          <a:off x="4799008" y="732589"/>
+          <a:ext cx="1132312" cy="1132312"/>
+        </a:xfrm>
+        <a:prstGeom prst="ellipse">
+          <a:avLst/>
+        </a:prstGeom>
+        <a:solidFill>
+          <a:schemeClr val="accent2">
+            <a:hueOff val="39038"/>
+            <a:satOff val="-26876"/>
+            <a:lumOff val="-6863"/>
+            <a:alphaOff val="0"/>
+          </a:schemeClr>
+        </a:solidFill>
+        <a:ln>
+          <a:noFill/>
+        </a:ln>
+        <a:effectLst/>
+      </dsp:spPr>
+      <dsp:style>
+        <a:lnRef idx="0">
+          <a:scrgbClr r="0" g="0" b="0"/>
+        </a:lnRef>
+        <a:fillRef idx="1">
+          <a:scrgbClr r="0" g="0" b="0"/>
+        </a:fillRef>
+        <a:effectRef idx="0">
+          <a:scrgbClr r="0" g="0" b="0"/>
+        </a:effectRef>
+        <a:fontRef idx="minor"/>
+      </dsp:style>
+    </dsp:sp>
+    <dsp:sp modelId="{5FF658BC-830B-42C7-99ED-06DBBA838B7B}">
+      <dsp:nvSpPr>
+        <dsp:cNvPr id="0" name=""/>
+        <dsp:cNvSpPr/>
+      </dsp:nvSpPr>
+      <dsp:spPr>
+        <a:xfrm>
+          <a:off x="5040321" y="973902"/>
+          <a:ext cx="649687" cy="649687"/>
+        </a:xfrm>
+        <a:prstGeom prst="rect">
+          <a:avLst/>
+        </a:prstGeom>
+        <a:blipFill>
+          <a:blip xmlns:r="http://schemas.openxmlformats.org/officeDocument/2006/relationships" r:embed="rId5">
+            <a:extLst>
+              <a:ext uri="{96DAC541-7B7A-43D3-8B79-37D633B846F1}">
+                <asvg:svgBlip xmlns:asvg="http://schemas.microsoft.com/office/drawing/2016/SVG/main" r:embed="rId6"/>
+              </a:ext>
+            </a:extLst>
+          </a:blip>
+          <a:srcRect/>
+          <a:stretch>
+            <a:fillRect/>
+          </a:stretch>
+        </a:blipFill>
+        <a:ln w="15875" cap="flat" cmpd="sng" algn="ctr">
+          <a:noFill/>
+          <a:prstDash val="solid"/>
+        </a:ln>
+        <a:effectLst/>
+      </dsp:spPr>
+      <dsp:style>
+        <a:lnRef idx="2">
+          <a:scrgbClr r="0" g="0" b="0"/>
+        </a:lnRef>
+        <a:fillRef idx="1">
+          <a:scrgbClr r="0" g="0" b="0"/>
+        </a:fillRef>
+        <a:effectRef idx="0">
+          <a:scrgbClr r="0" g="0" b="0"/>
+        </a:effectRef>
+        <a:fontRef idx="minor">
+          <a:schemeClr val="lt1"/>
+        </a:fontRef>
+      </dsp:style>
+    </dsp:sp>
+    <dsp:sp modelId="{B7DEF6C5-8837-48BB-9ADC-2C179D03188A}">
+      <dsp:nvSpPr>
+        <dsp:cNvPr id="0" name=""/>
+        <dsp:cNvSpPr/>
+      </dsp:nvSpPr>
+      <dsp:spPr>
+        <a:xfrm>
+          <a:off x="4437039" y="2217590"/>
+          <a:ext cx="1856250" cy="720000"/>
+        </a:xfrm>
+        <a:prstGeom prst="rect">
+          <a:avLst/>
+        </a:prstGeom>
+        <a:noFill/>
+        <a:ln>
+          <a:noFill/>
+        </a:ln>
+        <a:effectLst/>
+      </dsp:spPr>
+      <dsp:style>
+        <a:lnRef idx="0">
+          <a:scrgbClr r="0" g="0" b="0"/>
+        </a:lnRef>
+        <a:fillRef idx="0">
+          <a:scrgbClr r="0" g="0" b="0"/>
+        </a:fillRef>
+        <a:effectRef idx="0">
+          <a:scrgbClr r="0" g="0" b="0"/>
+        </a:effectRef>
+        <a:fontRef idx="minor"/>
+      </dsp:style>
+      <dsp:txBody>
+        <a:bodyPr spcFirstLastPara="0" vert="horz" wrap="square" lIns="0" tIns="0" rIns="0" bIns="0" numCol="1" spcCol="1270" anchor="t" anchorCtr="0">
+          <a:noAutofit/>
+        </a:bodyPr>
+        <a:lstStyle/>
+        <a:p>
+          <a:pPr marL="0" lvl="0" indent="0" algn="ctr" defTabSz="666750">
+            <a:lnSpc>
+              <a:spcPct val="100000"/>
+            </a:lnSpc>
+            <a:spcBef>
+              <a:spcPct val="0"/>
+            </a:spcBef>
+            <a:spcAft>
+              <a:spcPct val="35000"/>
+            </a:spcAft>
+            <a:buNone/>
+            <a:defRPr cap="all"/>
+          </a:pPr>
+          <a:r>
+            <a:rPr lang="en-US" sz="1500" kern="1200"/>
+            <a:t>Have California wildfires become more destructive?.</a:t>
+          </a:r>
         </a:p>
       </dsp:txBody>
       <dsp:txXfrm>
@@ -1717,6 +3278,221 @@
 </file>
 
 <file path=ppt/diagrams/layout1.xml><?xml version="1.0" encoding="utf-8"?>
+<dgm:layoutDef xmlns:dgm="http://schemas.openxmlformats.org/drawingml/2006/diagram" xmlns:a="http://schemas.openxmlformats.org/drawingml/2006/main" uniqueId="urn:microsoft.com/office/officeart/2018/5/layout/IconCircleLabelList">
+  <dgm:title val="Icon Circle Label List"/>
+  <dgm:desc val="Use to show non-sequential or grouped chunks of information accompanied by a related visuals. Works best with icons or small pictures with short text captions."/>
+  <dgm:catLst>
+    <dgm:cat type="icon" pri="500"/>
+  </dgm:catLst>
+  <dgm:sampData useDef="1">
+    <dgm:dataModel>
+      <dgm:ptLst/>
+      <dgm:bg/>
+      <dgm:whole/>
+    </dgm:dataModel>
+  </dgm:sampData>
+  <dgm:styleData useDef="1">
+    <dgm:dataModel>
+      <dgm:ptLst/>
+      <dgm:bg/>
+      <dgm:whole/>
+    </dgm:dataModel>
+  </dgm:styleData>
+  <dgm:clrData useDef="1">
+    <dgm:dataModel>
+      <dgm:ptLst/>
+      <dgm:bg/>
+      <dgm:whole/>
+    </dgm:dataModel>
+  </dgm:clrData>
+  <dgm:layoutNode name="root">
+    <dgm:varLst>
+      <dgm:dir/>
+      <dgm:resizeHandles val="exact"/>
+    </dgm:varLst>
+    <dgm:choose name="Name0">
+      <dgm:if name="Name1" axis="self" func="var" arg="dir" op="equ" val="norm">
+        <dgm:alg type="snake">
+          <dgm:param type="grDir" val="tL"/>
+          <dgm:param type="flowDir" val="row"/>
+          <dgm:param type="contDir" val="sameDir"/>
+          <dgm:param type="off" val="ctr"/>
+          <dgm:param type="vertAlign" val="mid"/>
+          <dgm:param type="horzAlign" val="ctr"/>
+        </dgm:alg>
+      </dgm:if>
+      <dgm:else name="Name2">
+        <dgm:alg type="snake">
+          <dgm:param type="grDir" val="tR"/>
+          <dgm:param type="flowDir" val="row"/>
+          <dgm:param type="contDir" val="sameDir"/>
+          <dgm:param type="off" val="ctr"/>
+          <dgm:param type="vertAlign" val="mid"/>
+          <dgm:param type="horzAlign" val="ctr"/>
+        </dgm:alg>
+      </dgm:else>
+    </dgm:choose>
+    <dgm:shape xmlns:r="http://schemas.openxmlformats.org/officeDocument/2006/relationships" r:blip="">
+      <dgm:adjLst/>
+    </dgm:shape>
+    <dgm:presOf/>
+    <dgm:choose name="Name3">
+      <dgm:if name="Name4" axis="ch" ptType="node" func="cnt" op="lte" val="2">
+        <dgm:constrLst>
+          <dgm:constr type="h" for="ch" forName="compNode" refType="h" fact="0.4"/>
+          <dgm:constr type="w" for="ch" forName="compNode" val="100"/>
+          <dgm:constr type="w" for="ch" forName="sibTrans" refType="w" refFor="ch" refForName="compNode" fact="0.175"/>
+          <dgm:constr type="sp" refType="w" refFor="ch" refForName="compNode" op="equ" fact="0.25"/>
+          <dgm:constr type="primFontSz" for="des" ptType="node" op="equ" val="44"/>
+          <dgm:constr type="h" for="des" forName="compNode" op="equ"/>
+          <dgm:constr type="h" for="des" forName="textRect" op="equ"/>
+        </dgm:constrLst>
+      </dgm:if>
+      <dgm:if name="Name5" axis="ch" ptType="node" func="cnt" op="lte" val="3">
+        <dgm:constrLst>
+          <dgm:constr type="h" for="ch" forName="compNode" refType="h" fact="0.4"/>
+          <dgm:constr type="w" for="ch" forName="compNode" val="100"/>
+          <dgm:constr type="w" for="ch" forName="sibTrans" refType="w" refFor="ch" refForName="compNode" fact="0.175"/>
+          <dgm:constr type="sp" refType="w" refFor="ch" refForName="compNode" op="equ" fact="0.25"/>
+          <dgm:constr type="primFontSz" for="des" ptType="node" op="equ" val="40"/>
+          <dgm:constr type="h" for="des" forName="compNode" op="equ"/>
+          <dgm:constr type="h" for="des" forName="textRect" op="equ"/>
+        </dgm:constrLst>
+      </dgm:if>
+      <dgm:if name="Name6" axis="ch" ptType="node" func="cnt" op="lte" val="4">
+        <dgm:constrLst>
+          <dgm:constr type="h" for="ch" forName="compNode" refType="h" fact="0.4"/>
+          <dgm:constr type="w" for="ch" forName="compNode" refType="w"/>
+          <dgm:constr type="w" for="ch" forName="sibTrans" refType="w" refFor="ch" refForName="compNode" fact="0.175"/>
+          <dgm:constr type="sp" refType="w" refFor="ch" refForName="compNode" op="equ" fact="0.25"/>
+          <dgm:constr type="primFontSz" for="des" ptType="node" op="equ" val="32"/>
+          <dgm:constr type="h" for="des" forName="compNode" op="equ"/>
+          <dgm:constr type="h" for="des" forName="textRect" op="equ"/>
+        </dgm:constrLst>
+      </dgm:if>
+      <dgm:else name="Name7">
+        <dgm:constrLst>
+          <dgm:constr type="h" for="ch" forName="compNode" refType="h" fact="0.4"/>
+          <dgm:constr type="w" for="ch" forName="compNode" refType="w"/>
+          <dgm:constr type="w" for="ch" forName="sibTrans" refType="w" refFor="ch" refForName="compNode" fact="0.175"/>
+          <dgm:constr type="sp" refType="w" refFor="ch" refForName="compNode" op="equ" fact="0.25"/>
+          <dgm:constr type="primFontSz" for="des" ptType="node" op="equ" val="24"/>
+          <dgm:constr type="h" for="des" forName="compNode" op="equ"/>
+          <dgm:constr type="h" for="des" forName="textRect" op="equ"/>
+        </dgm:constrLst>
+      </dgm:else>
+    </dgm:choose>
+    <dgm:ruleLst>
+      <dgm:rule type="w" for="ch" forName="compNode" val="50" fact="NaN" max="NaN"/>
+    </dgm:ruleLst>
+    <dgm:forEach name="Name8" axis="ch" ptType="node">
+      <dgm:layoutNode name="compNode">
+        <dgm:alg type="composite"/>
+        <dgm:shape xmlns:r="http://schemas.openxmlformats.org/officeDocument/2006/relationships" r:blip="">
+          <dgm:adjLst/>
+        </dgm:shape>
+        <dgm:presOf axis="self"/>
+        <dgm:constrLst>
+          <dgm:constr type="w" for="ch" forName="iconBgRect" refType="w" fact="0.61"/>
+          <dgm:constr type="h" for="ch" forName="iconBgRect" refType="w" refFor="ch" refForName="iconBgRect"/>
+          <dgm:constr type="t" for="ch" forName="iconBgRect"/>
+          <dgm:constr type="ctrX" for="ch" forName="iconBgRect" refType="w" fact="0.5"/>
+          <dgm:constr type="w" for="ch" forName="iconRect" refType="w" fact="0.35"/>
+          <dgm:constr type="h" for="ch" forName="iconRect" refType="w" refFor="ch" refForName="iconRect"/>
+          <dgm:constr type="ctrX" for="ch" forName="iconRect" refType="ctrX" refFor="ch" refForName="iconBgRect"/>
+          <dgm:constr type="ctrY" for="ch" forName="iconRect" refType="ctrY" refFor="ch" refForName="iconBgRect"/>
+          <dgm:constr type="h" for="ch" forName="spaceRect" refType="w" fact="0.19"/>
+          <dgm:constr type="w" for="ch" forName="spaceRect" refType="w"/>
+          <dgm:constr type="l" for="ch" forName="spaceRect"/>
+          <dgm:constr type="t" for="ch" forName="spaceRect" refType="b" refFor="ch" refForName="iconBgRect"/>
+          <dgm:constr type="h" for="ch" forName="textRect" val="20"/>
+          <dgm:constr type="w" for="ch" forName="textRect" refType="w"/>
+          <dgm:constr type="l" for="ch" forName="textRect"/>
+          <dgm:constr type="t" for="ch" forName="textRect" refType="b" refFor="ch" refForName="spaceRect"/>
+        </dgm:constrLst>
+        <dgm:ruleLst>
+          <dgm:rule type="h" val="INF" fact="NaN" max="NaN"/>
+        </dgm:ruleLst>
+        <dgm:layoutNode name="iconBgRect" styleLbl="bgShp">
+          <dgm:alg type="sp"/>
+          <dgm:shape xmlns:r="http://schemas.openxmlformats.org/officeDocument/2006/relationships" type="ellipse" r:blip="">
+            <dgm:adjLst/>
+          </dgm:shape>
+          <dgm:presOf/>
+          <dgm:constrLst/>
+          <dgm:ruleLst/>
+        </dgm:layoutNode>
+        <dgm:layoutNode name="iconRect" styleLbl="node1">
+          <dgm:alg type="sp"/>
+          <dgm:shape xmlns:r="http://schemas.openxmlformats.org/officeDocument/2006/relationships" type="rect" r:blip="" blipPhldr="1">
+            <dgm:adjLst/>
+          </dgm:shape>
+          <dgm:presOf/>
+          <dgm:constrLst/>
+          <dgm:ruleLst/>
+        </dgm:layoutNode>
+        <dgm:layoutNode name="spaceRect">
+          <dgm:alg type="sp"/>
+          <dgm:shape xmlns:r="http://schemas.openxmlformats.org/officeDocument/2006/relationships" r:blip="">
+            <dgm:adjLst/>
+          </dgm:shape>
+          <dgm:presOf/>
+          <dgm:constrLst/>
+          <dgm:ruleLst/>
+        </dgm:layoutNode>
+        <dgm:layoutNode name="textRect" styleLbl="revTx">
+          <dgm:varLst>
+            <dgm:chMax val="1"/>
+            <dgm:chPref val="1"/>
+          </dgm:varLst>
+          <dgm:alg type="tx">
+            <dgm:param type="txAnchorVert" val="t"/>
+          </dgm:alg>
+          <dgm:shape xmlns:r="http://schemas.openxmlformats.org/officeDocument/2006/relationships" type="rect" r:blip="">
+            <dgm:adjLst/>
+          </dgm:shape>
+          <dgm:presOf axis="self" ptType="node"/>
+          <dgm:constrLst>
+            <dgm:constr type="lMarg"/>
+            <dgm:constr type="rMarg"/>
+            <dgm:constr type="tMarg"/>
+            <dgm:constr type="bMarg"/>
+          </dgm:constrLst>
+          <dgm:ruleLst>
+            <dgm:rule type="primFontSz" val="11" fact="NaN" max="NaN"/>
+            <dgm:rule type="h" val="INF" fact="NaN" max="NaN"/>
+          </dgm:ruleLst>
+        </dgm:layoutNode>
+      </dgm:layoutNode>
+      <dgm:forEach name="Name9" axis="followSib" ptType="sibTrans" cnt="1">
+        <dgm:layoutNode name="sibTrans">
+          <dgm:alg type="sp"/>
+          <dgm:shape xmlns:r="http://schemas.openxmlformats.org/officeDocument/2006/relationships" r:blip="">
+            <dgm:adjLst/>
+          </dgm:shape>
+          <dgm:presOf axis="self"/>
+          <dgm:constrLst/>
+          <dgm:ruleLst/>
+        </dgm:layoutNode>
+      </dgm:forEach>
+    </dgm:forEach>
+  </dgm:layoutNode>
+  <dgm:extLst>
+    <a:ext uri="{68A01E43-0DF5-4B5B-8FA6-DAF915123BFB}">
+      <dgm1612:lstStyle xmlns:dgm1612="http://schemas.microsoft.com/office/drawing/2016/12/diagram">
+        <a:lvl1pPr>
+          <a:lnSpc>
+            <a:spcPct val="100000"/>
+          </a:lnSpc>
+          <a:defRPr cap="all"/>
+        </a:lvl1pPr>
+      </dgm1612:lstStyle>
+    </a:ext>
+  </dgm:extLst>
+</dgm:layoutDef>
+</file>
+
+<file path=ppt/diagrams/layout2.xml><?xml version="1.0" encoding="utf-8"?>
 <dgm:layoutDef xmlns:dgm="http://schemas.openxmlformats.org/drawingml/2006/diagram" xmlns:a="http://schemas.openxmlformats.org/drawingml/2006/main" uniqueId="urn:microsoft.com/office/officeart/2018/5/layout/IconCircleLabelList">
   <dgm:title val="Icon Circle Label List"/>
   <dgm:desc val="Use to show non-sequential or grouped chunks of information accompanied by a related visuals. Works best with icons or small pictures with short text captions."/>
@@ -2965,6 +4741,1040 @@
 </dgm:styleDef>
 </file>
 
+<file path=ppt/diagrams/quickStyle2.xml><?xml version="1.0" encoding="utf-8"?>
+<dgm:styleDef xmlns:dgm="http://schemas.openxmlformats.org/drawingml/2006/diagram" xmlns:a="http://schemas.openxmlformats.org/drawingml/2006/main" uniqueId="urn:microsoft.com/office/officeart/2005/8/quickstyle/simple1">
+  <dgm:title val=""/>
+  <dgm:desc val=""/>
+  <dgm:catLst>
+    <dgm:cat type="simple" pri="10100"/>
+  </dgm:catLst>
+  <dgm:scene3d>
+    <a:camera prst="orthographicFront"/>
+    <a:lightRig rig="threePt" dir="t"/>
+  </dgm:scene3d>
+  <dgm:styleLbl name="node0">
+    <dgm:scene3d>
+      <a:camera prst="orthographicFront"/>
+      <a:lightRig rig="threePt" dir="t"/>
+    </dgm:scene3d>
+    <dgm:sp3d/>
+    <dgm:txPr/>
+    <dgm:style>
+      <a:lnRef idx="2">
+        <a:scrgbClr r="0" g="0" b="0"/>
+      </a:lnRef>
+      <a:fillRef idx="1">
+        <a:scrgbClr r="0" g="0" b="0"/>
+      </a:fillRef>
+      <a:effectRef idx="0">
+        <a:scrgbClr r="0" g="0" b="0"/>
+      </a:effectRef>
+      <a:fontRef idx="minor">
+        <a:schemeClr val="lt1"/>
+      </a:fontRef>
+    </dgm:style>
+  </dgm:styleLbl>
+  <dgm:styleLbl name="lnNode1">
+    <dgm:scene3d>
+      <a:camera prst="orthographicFront"/>
+      <a:lightRig rig="threePt" dir="t"/>
+    </dgm:scene3d>
+    <dgm:sp3d/>
+    <dgm:txPr/>
+    <dgm:style>
+      <a:lnRef idx="2">
+        <a:scrgbClr r="0" g="0" b="0"/>
+      </a:lnRef>
+      <a:fillRef idx="1">
+        <a:scrgbClr r="0" g="0" b="0"/>
+      </a:fillRef>
+      <a:effectRef idx="0">
+        <a:scrgbClr r="0" g="0" b="0"/>
+      </a:effectRef>
+      <a:fontRef idx="minor">
+        <a:schemeClr val="lt1"/>
+      </a:fontRef>
+    </dgm:style>
+  </dgm:styleLbl>
+  <dgm:styleLbl name="vennNode1">
+    <dgm:scene3d>
+      <a:camera prst="orthographicFront"/>
+      <a:lightRig rig="threePt" dir="t"/>
+    </dgm:scene3d>
+    <dgm:sp3d/>
+    <dgm:txPr/>
+    <dgm:style>
+      <a:lnRef idx="2">
+        <a:scrgbClr r="0" g="0" b="0"/>
+      </a:lnRef>
+      <a:fillRef idx="1">
+        <a:scrgbClr r="0" g="0" b="0"/>
+      </a:fillRef>
+      <a:effectRef idx="0">
+        <a:scrgbClr r="0" g="0" b="0"/>
+      </a:effectRef>
+      <a:fontRef idx="minor">
+        <a:schemeClr val="tx1"/>
+      </a:fontRef>
+    </dgm:style>
+  </dgm:styleLbl>
+  <dgm:styleLbl name="alignNode1">
+    <dgm:scene3d>
+      <a:camera prst="orthographicFront"/>
+      <a:lightRig rig="threePt" dir="t"/>
+    </dgm:scene3d>
+    <dgm:sp3d/>
+    <dgm:txPr/>
+    <dgm:style>
+      <a:lnRef idx="2">
+        <a:scrgbClr r="0" g="0" b="0"/>
+      </a:lnRef>
+      <a:fillRef idx="1">
+        <a:scrgbClr r="0" g="0" b="0"/>
+      </a:fillRef>
+      <a:effectRef idx="0">
+        <a:scrgbClr r="0" g="0" b="0"/>
+      </a:effectRef>
+      <a:fontRef idx="minor">
+        <a:schemeClr val="lt1"/>
+      </a:fontRef>
+    </dgm:style>
+  </dgm:styleLbl>
+  <dgm:styleLbl name="node1">
+    <dgm:scene3d>
+      <a:camera prst="orthographicFront"/>
+      <a:lightRig rig="threePt" dir="t"/>
+    </dgm:scene3d>
+    <dgm:sp3d/>
+    <dgm:txPr/>
+    <dgm:style>
+      <a:lnRef idx="2">
+        <a:scrgbClr r="0" g="0" b="0"/>
+      </a:lnRef>
+      <a:fillRef idx="1">
+        <a:scrgbClr r="0" g="0" b="0"/>
+      </a:fillRef>
+      <a:effectRef idx="0">
+        <a:scrgbClr r="0" g="0" b="0"/>
+      </a:effectRef>
+      <a:fontRef idx="minor">
+        <a:schemeClr val="lt1"/>
+      </a:fontRef>
+    </dgm:style>
+  </dgm:styleLbl>
+  <dgm:styleLbl name="node2">
+    <dgm:scene3d>
+      <a:camera prst="orthographicFront"/>
+      <a:lightRig rig="threePt" dir="t"/>
+    </dgm:scene3d>
+    <dgm:sp3d/>
+    <dgm:txPr/>
+    <dgm:style>
+      <a:lnRef idx="2">
+        <a:scrgbClr r="0" g="0" b="0"/>
+      </a:lnRef>
+      <a:fillRef idx="1">
+        <a:scrgbClr r="0" g="0" b="0"/>
+      </a:fillRef>
+      <a:effectRef idx="0">
+        <a:scrgbClr r="0" g="0" b="0"/>
+      </a:effectRef>
+      <a:fontRef idx="minor">
+        <a:schemeClr val="lt1"/>
+      </a:fontRef>
+    </dgm:style>
+  </dgm:styleLbl>
+  <dgm:styleLbl name="node3">
+    <dgm:scene3d>
+      <a:camera prst="orthographicFront"/>
+      <a:lightRig rig="threePt" dir="t"/>
+    </dgm:scene3d>
+    <dgm:sp3d/>
+    <dgm:txPr/>
+    <dgm:style>
+      <a:lnRef idx="2">
+        <a:scrgbClr r="0" g="0" b="0"/>
+      </a:lnRef>
+      <a:fillRef idx="1">
+        <a:scrgbClr r="0" g="0" b="0"/>
+      </a:fillRef>
+      <a:effectRef idx="0">
+        <a:scrgbClr r="0" g="0" b="0"/>
+      </a:effectRef>
+      <a:fontRef idx="minor">
+        <a:schemeClr val="lt1"/>
+      </a:fontRef>
+    </dgm:style>
+  </dgm:styleLbl>
+  <dgm:styleLbl name="node4">
+    <dgm:scene3d>
+      <a:camera prst="orthographicFront"/>
+      <a:lightRig rig="threePt" dir="t"/>
+    </dgm:scene3d>
+    <dgm:sp3d/>
+    <dgm:txPr/>
+    <dgm:style>
+      <a:lnRef idx="2">
+        <a:scrgbClr r="0" g="0" b="0"/>
+      </a:lnRef>
+      <a:fillRef idx="1">
+        <a:scrgbClr r="0" g="0" b="0"/>
+      </a:fillRef>
+      <a:effectRef idx="0">
+        <a:scrgbClr r="0" g="0" b="0"/>
+      </a:effectRef>
+      <a:fontRef idx="minor">
+        <a:schemeClr val="lt1"/>
+      </a:fontRef>
+    </dgm:style>
+  </dgm:styleLbl>
+  <dgm:styleLbl name="fgImgPlace1">
+    <dgm:scene3d>
+      <a:camera prst="orthographicFront"/>
+      <a:lightRig rig="threePt" dir="t"/>
+    </dgm:scene3d>
+    <dgm:sp3d/>
+    <dgm:txPr/>
+    <dgm:style>
+      <a:lnRef idx="2">
+        <a:scrgbClr r="0" g="0" b="0"/>
+      </a:lnRef>
+      <a:fillRef idx="1">
+        <a:scrgbClr r="0" g="0" b="0"/>
+      </a:fillRef>
+      <a:effectRef idx="0">
+        <a:scrgbClr r="0" g="0" b="0"/>
+      </a:effectRef>
+      <a:fontRef idx="minor"/>
+    </dgm:style>
+  </dgm:styleLbl>
+  <dgm:styleLbl name="alignImgPlace1">
+    <dgm:scene3d>
+      <a:camera prst="orthographicFront"/>
+      <a:lightRig rig="threePt" dir="t"/>
+    </dgm:scene3d>
+    <dgm:sp3d/>
+    <dgm:txPr/>
+    <dgm:style>
+      <a:lnRef idx="2">
+        <a:scrgbClr r="0" g="0" b="0"/>
+      </a:lnRef>
+      <a:fillRef idx="1">
+        <a:scrgbClr r="0" g="0" b="0"/>
+      </a:fillRef>
+      <a:effectRef idx="0">
+        <a:scrgbClr r="0" g="0" b="0"/>
+      </a:effectRef>
+      <a:fontRef idx="minor"/>
+    </dgm:style>
+  </dgm:styleLbl>
+  <dgm:styleLbl name="bgImgPlace1">
+    <dgm:scene3d>
+      <a:camera prst="orthographicFront"/>
+      <a:lightRig rig="threePt" dir="t"/>
+    </dgm:scene3d>
+    <dgm:sp3d/>
+    <dgm:txPr/>
+    <dgm:style>
+      <a:lnRef idx="2">
+        <a:scrgbClr r="0" g="0" b="0"/>
+      </a:lnRef>
+      <a:fillRef idx="1">
+        <a:scrgbClr r="0" g="0" b="0"/>
+      </a:fillRef>
+      <a:effectRef idx="0">
+        <a:scrgbClr r="0" g="0" b="0"/>
+      </a:effectRef>
+      <a:fontRef idx="minor"/>
+    </dgm:style>
+  </dgm:styleLbl>
+  <dgm:styleLbl name="sibTrans2D1">
+    <dgm:scene3d>
+      <a:camera prst="orthographicFront"/>
+      <a:lightRig rig="threePt" dir="t"/>
+    </dgm:scene3d>
+    <dgm:sp3d/>
+    <dgm:txPr/>
+    <dgm:style>
+      <a:lnRef idx="0">
+        <a:scrgbClr r="0" g="0" b="0"/>
+      </a:lnRef>
+      <a:fillRef idx="1">
+        <a:scrgbClr r="0" g="0" b="0"/>
+      </a:fillRef>
+      <a:effectRef idx="0">
+        <a:scrgbClr r="0" g="0" b="0"/>
+      </a:effectRef>
+      <a:fontRef idx="minor">
+        <a:schemeClr val="lt1"/>
+      </a:fontRef>
+    </dgm:style>
+  </dgm:styleLbl>
+  <dgm:styleLbl name="fgSibTrans2D1">
+    <dgm:scene3d>
+      <a:camera prst="orthographicFront"/>
+      <a:lightRig rig="threePt" dir="t"/>
+    </dgm:scene3d>
+    <dgm:sp3d/>
+    <dgm:txPr/>
+    <dgm:style>
+      <a:lnRef idx="0">
+        <a:scrgbClr r="0" g="0" b="0"/>
+      </a:lnRef>
+      <a:fillRef idx="1">
+        <a:scrgbClr r="0" g="0" b="0"/>
+      </a:fillRef>
+      <a:effectRef idx="0">
+        <a:scrgbClr r="0" g="0" b="0"/>
+      </a:effectRef>
+      <a:fontRef idx="minor">
+        <a:schemeClr val="lt1"/>
+      </a:fontRef>
+    </dgm:style>
+  </dgm:styleLbl>
+  <dgm:styleLbl name="bgSibTrans2D1">
+    <dgm:scene3d>
+      <a:camera prst="orthographicFront"/>
+      <a:lightRig rig="threePt" dir="t"/>
+    </dgm:scene3d>
+    <dgm:sp3d/>
+    <dgm:txPr/>
+    <dgm:style>
+      <a:lnRef idx="0">
+        <a:scrgbClr r="0" g="0" b="0"/>
+      </a:lnRef>
+      <a:fillRef idx="1">
+        <a:scrgbClr r="0" g="0" b="0"/>
+      </a:fillRef>
+      <a:effectRef idx="0">
+        <a:scrgbClr r="0" g="0" b="0"/>
+      </a:effectRef>
+      <a:fontRef idx="minor">
+        <a:schemeClr val="lt1"/>
+      </a:fontRef>
+    </dgm:style>
+  </dgm:styleLbl>
+  <dgm:styleLbl name="sibTrans1D1">
+    <dgm:scene3d>
+      <a:camera prst="orthographicFront"/>
+      <a:lightRig rig="threePt" dir="t"/>
+    </dgm:scene3d>
+    <dgm:sp3d/>
+    <dgm:txPr/>
+    <dgm:style>
+      <a:lnRef idx="1">
+        <a:scrgbClr r="0" g="0" b="0"/>
+      </a:lnRef>
+      <a:fillRef idx="0">
+        <a:scrgbClr r="0" g="0" b="0"/>
+      </a:fillRef>
+      <a:effectRef idx="0">
+        <a:scrgbClr r="0" g="0" b="0"/>
+      </a:effectRef>
+      <a:fontRef idx="minor"/>
+    </dgm:style>
+  </dgm:styleLbl>
+  <dgm:styleLbl name="callout">
+    <dgm:scene3d>
+      <a:camera prst="orthographicFront"/>
+      <a:lightRig rig="threePt" dir="t"/>
+    </dgm:scene3d>
+    <dgm:sp3d/>
+    <dgm:txPr/>
+    <dgm:style>
+      <a:lnRef idx="2">
+        <a:scrgbClr r="0" g="0" b="0"/>
+      </a:lnRef>
+      <a:fillRef idx="1">
+        <a:scrgbClr r="0" g="0" b="0"/>
+      </a:fillRef>
+      <a:effectRef idx="0">
+        <a:scrgbClr r="0" g="0" b="0"/>
+      </a:effectRef>
+      <a:fontRef idx="minor"/>
+    </dgm:style>
+  </dgm:styleLbl>
+  <dgm:styleLbl name="asst0">
+    <dgm:scene3d>
+      <a:camera prst="orthographicFront"/>
+      <a:lightRig rig="threePt" dir="t"/>
+    </dgm:scene3d>
+    <dgm:sp3d/>
+    <dgm:txPr/>
+    <dgm:style>
+      <a:lnRef idx="2">
+        <a:scrgbClr r="0" g="0" b="0"/>
+      </a:lnRef>
+      <a:fillRef idx="1">
+        <a:scrgbClr r="0" g="0" b="0"/>
+      </a:fillRef>
+      <a:effectRef idx="0">
+        <a:scrgbClr r="0" g="0" b="0"/>
+      </a:effectRef>
+      <a:fontRef idx="minor">
+        <a:schemeClr val="lt1"/>
+      </a:fontRef>
+    </dgm:style>
+  </dgm:styleLbl>
+  <dgm:styleLbl name="asst1">
+    <dgm:scene3d>
+      <a:camera prst="orthographicFront"/>
+      <a:lightRig rig="threePt" dir="t"/>
+    </dgm:scene3d>
+    <dgm:sp3d/>
+    <dgm:txPr/>
+    <dgm:style>
+      <a:lnRef idx="2">
+        <a:scrgbClr r="0" g="0" b="0"/>
+      </a:lnRef>
+      <a:fillRef idx="1">
+        <a:scrgbClr r="0" g="0" b="0"/>
+      </a:fillRef>
+      <a:effectRef idx="0">
+        <a:scrgbClr r="0" g="0" b="0"/>
+      </a:effectRef>
+      <a:fontRef idx="minor">
+        <a:schemeClr val="lt1"/>
+      </a:fontRef>
+    </dgm:style>
+  </dgm:styleLbl>
+  <dgm:styleLbl name="asst2">
+    <dgm:scene3d>
+      <a:camera prst="orthographicFront"/>
+      <a:lightRig rig="threePt" dir="t"/>
+    </dgm:scene3d>
+    <dgm:sp3d/>
+    <dgm:txPr/>
+    <dgm:style>
+      <a:lnRef idx="2">
+        <a:scrgbClr r="0" g="0" b="0"/>
+      </a:lnRef>
+      <a:fillRef idx="1">
+        <a:scrgbClr r="0" g="0" b="0"/>
+      </a:fillRef>
+      <a:effectRef idx="0">
+        <a:scrgbClr r="0" g="0" b="0"/>
+      </a:effectRef>
+      <a:fontRef idx="minor">
+        <a:schemeClr val="lt1"/>
+      </a:fontRef>
+    </dgm:style>
+  </dgm:styleLbl>
+  <dgm:styleLbl name="asst3">
+    <dgm:scene3d>
+      <a:camera prst="orthographicFront"/>
+      <a:lightRig rig="threePt" dir="t"/>
+    </dgm:scene3d>
+    <dgm:sp3d/>
+    <dgm:txPr/>
+    <dgm:style>
+      <a:lnRef idx="2">
+        <a:scrgbClr r="0" g="0" b="0"/>
+      </a:lnRef>
+      <a:fillRef idx="1">
+        <a:scrgbClr r="0" g="0" b="0"/>
+      </a:fillRef>
+      <a:effectRef idx="0">
+        <a:scrgbClr r="0" g="0" b="0"/>
+      </a:effectRef>
+      <a:fontRef idx="minor">
+        <a:schemeClr val="lt1"/>
+      </a:fontRef>
+    </dgm:style>
+  </dgm:styleLbl>
+  <dgm:styleLbl name="asst4">
+    <dgm:scene3d>
+      <a:camera prst="orthographicFront"/>
+      <a:lightRig rig="threePt" dir="t"/>
+    </dgm:scene3d>
+    <dgm:sp3d/>
+    <dgm:txPr/>
+    <dgm:style>
+      <a:lnRef idx="2">
+        <a:scrgbClr r="0" g="0" b="0"/>
+      </a:lnRef>
+      <a:fillRef idx="1">
+        <a:scrgbClr r="0" g="0" b="0"/>
+      </a:fillRef>
+      <a:effectRef idx="0">
+        <a:scrgbClr r="0" g="0" b="0"/>
+      </a:effectRef>
+      <a:fontRef idx="minor">
+        <a:schemeClr val="lt1"/>
+      </a:fontRef>
+    </dgm:style>
+  </dgm:styleLbl>
+  <dgm:styleLbl name="parChTrans2D1">
+    <dgm:scene3d>
+      <a:camera prst="orthographicFront"/>
+      <a:lightRig rig="threePt" dir="t"/>
+    </dgm:scene3d>
+    <dgm:sp3d/>
+    <dgm:txPr/>
+    <dgm:style>
+      <a:lnRef idx="2">
+        <a:scrgbClr r="0" g="0" b="0"/>
+      </a:lnRef>
+      <a:fillRef idx="1">
+        <a:scrgbClr r="0" g="0" b="0"/>
+      </a:fillRef>
+      <a:effectRef idx="0">
+        <a:scrgbClr r="0" g="0" b="0"/>
+      </a:effectRef>
+      <a:fontRef idx="minor">
+        <a:schemeClr val="lt1"/>
+      </a:fontRef>
+    </dgm:style>
+  </dgm:styleLbl>
+  <dgm:styleLbl name="parChTrans2D2">
+    <dgm:scene3d>
+      <a:camera prst="orthographicFront"/>
+      <a:lightRig rig="threePt" dir="t"/>
+    </dgm:scene3d>
+    <dgm:sp3d/>
+    <dgm:txPr/>
+    <dgm:style>
+      <a:lnRef idx="2">
+        <a:scrgbClr r="0" g="0" b="0"/>
+      </a:lnRef>
+      <a:fillRef idx="1">
+        <a:scrgbClr r="0" g="0" b="0"/>
+      </a:fillRef>
+      <a:effectRef idx="0">
+        <a:scrgbClr r="0" g="0" b="0"/>
+      </a:effectRef>
+      <a:fontRef idx="minor">
+        <a:schemeClr val="lt1"/>
+      </a:fontRef>
+    </dgm:style>
+  </dgm:styleLbl>
+  <dgm:styleLbl name="parChTrans2D3">
+    <dgm:scene3d>
+      <a:camera prst="orthographicFront"/>
+      <a:lightRig rig="threePt" dir="t"/>
+    </dgm:scene3d>
+    <dgm:sp3d/>
+    <dgm:txPr/>
+    <dgm:style>
+      <a:lnRef idx="2">
+        <a:scrgbClr r="0" g="0" b="0"/>
+      </a:lnRef>
+      <a:fillRef idx="1">
+        <a:scrgbClr r="0" g="0" b="0"/>
+      </a:fillRef>
+      <a:effectRef idx="0">
+        <a:scrgbClr r="0" g="0" b="0"/>
+      </a:effectRef>
+      <a:fontRef idx="minor">
+        <a:schemeClr val="lt1"/>
+      </a:fontRef>
+    </dgm:style>
+  </dgm:styleLbl>
+  <dgm:styleLbl name="parChTrans2D4">
+    <dgm:scene3d>
+      <a:camera prst="orthographicFront"/>
+      <a:lightRig rig="threePt" dir="t"/>
+    </dgm:scene3d>
+    <dgm:sp3d/>
+    <dgm:txPr/>
+    <dgm:style>
+      <a:lnRef idx="2">
+        <a:scrgbClr r="0" g="0" b="0"/>
+      </a:lnRef>
+      <a:fillRef idx="1">
+        <a:scrgbClr r="0" g="0" b="0"/>
+      </a:fillRef>
+      <a:effectRef idx="0">
+        <a:scrgbClr r="0" g="0" b="0"/>
+      </a:effectRef>
+      <a:fontRef idx="minor">
+        <a:schemeClr val="lt1"/>
+      </a:fontRef>
+    </dgm:style>
+  </dgm:styleLbl>
+  <dgm:styleLbl name="parChTrans1D1">
+    <dgm:scene3d>
+      <a:camera prst="orthographicFront"/>
+      <a:lightRig rig="threePt" dir="t"/>
+    </dgm:scene3d>
+    <dgm:sp3d/>
+    <dgm:txPr/>
+    <dgm:style>
+      <a:lnRef idx="2">
+        <a:scrgbClr r="0" g="0" b="0"/>
+      </a:lnRef>
+      <a:fillRef idx="0">
+        <a:scrgbClr r="0" g="0" b="0"/>
+      </a:fillRef>
+      <a:effectRef idx="0">
+        <a:scrgbClr r="0" g="0" b="0"/>
+      </a:effectRef>
+      <a:fontRef idx="minor"/>
+    </dgm:style>
+  </dgm:styleLbl>
+  <dgm:styleLbl name="parChTrans1D2">
+    <dgm:scene3d>
+      <a:camera prst="orthographicFront"/>
+      <a:lightRig rig="threePt" dir="t"/>
+    </dgm:scene3d>
+    <dgm:sp3d/>
+    <dgm:txPr/>
+    <dgm:style>
+      <a:lnRef idx="2">
+        <a:scrgbClr r="0" g="0" b="0"/>
+      </a:lnRef>
+      <a:fillRef idx="0">
+        <a:scrgbClr r="0" g="0" b="0"/>
+      </a:fillRef>
+      <a:effectRef idx="0">
+        <a:scrgbClr r="0" g="0" b="0"/>
+      </a:effectRef>
+      <a:fontRef idx="minor"/>
+    </dgm:style>
+  </dgm:styleLbl>
+  <dgm:styleLbl name="parChTrans1D3">
+    <dgm:scene3d>
+      <a:camera prst="orthographicFront"/>
+      <a:lightRig rig="threePt" dir="t"/>
+    </dgm:scene3d>
+    <dgm:sp3d/>
+    <dgm:txPr/>
+    <dgm:style>
+      <a:lnRef idx="2">
+        <a:scrgbClr r="0" g="0" b="0"/>
+      </a:lnRef>
+      <a:fillRef idx="0">
+        <a:scrgbClr r="0" g="0" b="0"/>
+      </a:fillRef>
+      <a:effectRef idx="0">
+        <a:scrgbClr r="0" g="0" b="0"/>
+      </a:effectRef>
+      <a:fontRef idx="minor"/>
+    </dgm:style>
+  </dgm:styleLbl>
+  <dgm:styleLbl name="parChTrans1D4">
+    <dgm:scene3d>
+      <a:camera prst="orthographicFront"/>
+      <a:lightRig rig="threePt" dir="t"/>
+    </dgm:scene3d>
+    <dgm:sp3d/>
+    <dgm:txPr/>
+    <dgm:style>
+      <a:lnRef idx="2">
+        <a:scrgbClr r="0" g="0" b="0"/>
+      </a:lnRef>
+      <a:fillRef idx="0">
+        <a:scrgbClr r="0" g="0" b="0"/>
+      </a:fillRef>
+      <a:effectRef idx="0">
+        <a:scrgbClr r="0" g="0" b="0"/>
+      </a:effectRef>
+      <a:fontRef idx="minor"/>
+    </dgm:style>
+  </dgm:styleLbl>
+  <dgm:styleLbl name="fgAcc1">
+    <dgm:scene3d>
+      <a:camera prst="orthographicFront"/>
+      <a:lightRig rig="threePt" dir="t"/>
+    </dgm:scene3d>
+    <dgm:sp3d/>
+    <dgm:txPr/>
+    <dgm:style>
+      <a:lnRef idx="2">
+        <a:scrgbClr r="0" g="0" b="0"/>
+      </a:lnRef>
+      <a:fillRef idx="1">
+        <a:scrgbClr r="0" g="0" b="0"/>
+      </a:fillRef>
+      <a:effectRef idx="0">
+        <a:scrgbClr r="0" g="0" b="0"/>
+      </a:effectRef>
+      <a:fontRef idx="minor"/>
+    </dgm:style>
+  </dgm:styleLbl>
+  <dgm:styleLbl name="conFgAcc1">
+    <dgm:scene3d>
+      <a:camera prst="orthographicFront"/>
+      <a:lightRig rig="threePt" dir="t"/>
+    </dgm:scene3d>
+    <dgm:sp3d/>
+    <dgm:txPr/>
+    <dgm:style>
+      <a:lnRef idx="2">
+        <a:scrgbClr r="0" g="0" b="0"/>
+      </a:lnRef>
+      <a:fillRef idx="1">
+        <a:scrgbClr r="0" g="0" b="0"/>
+      </a:fillRef>
+      <a:effectRef idx="0">
+        <a:scrgbClr r="0" g="0" b="0"/>
+      </a:effectRef>
+      <a:fontRef idx="minor"/>
+    </dgm:style>
+  </dgm:styleLbl>
+  <dgm:styleLbl name="alignAcc1">
+    <dgm:scene3d>
+      <a:camera prst="orthographicFront"/>
+      <a:lightRig rig="threePt" dir="t"/>
+    </dgm:scene3d>
+    <dgm:sp3d/>
+    <dgm:txPr/>
+    <dgm:style>
+      <a:lnRef idx="2">
+        <a:scrgbClr r="0" g="0" b="0"/>
+      </a:lnRef>
+      <a:fillRef idx="1">
+        <a:scrgbClr r="0" g="0" b="0"/>
+      </a:fillRef>
+      <a:effectRef idx="0">
+        <a:scrgbClr r="0" g="0" b="0"/>
+      </a:effectRef>
+      <a:fontRef idx="minor"/>
+    </dgm:style>
+  </dgm:styleLbl>
+  <dgm:styleLbl name="trAlignAcc1">
+    <dgm:scene3d>
+      <a:camera prst="orthographicFront"/>
+      <a:lightRig rig="threePt" dir="t"/>
+    </dgm:scene3d>
+    <dgm:sp3d/>
+    <dgm:txPr/>
+    <dgm:style>
+      <a:lnRef idx="1">
+        <a:scrgbClr r="0" g="0" b="0"/>
+      </a:lnRef>
+      <a:fillRef idx="1">
+        <a:scrgbClr r="0" g="0" b="0"/>
+      </a:fillRef>
+      <a:effectRef idx="0">
+        <a:scrgbClr r="0" g="0" b="0"/>
+      </a:effectRef>
+      <a:fontRef idx="minor"/>
+    </dgm:style>
+  </dgm:styleLbl>
+  <dgm:styleLbl name="bgAcc1">
+    <dgm:scene3d>
+      <a:camera prst="orthographicFront"/>
+      <a:lightRig rig="threePt" dir="t"/>
+    </dgm:scene3d>
+    <dgm:sp3d/>
+    <dgm:txPr/>
+    <dgm:style>
+      <a:lnRef idx="2">
+        <a:scrgbClr r="0" g="0" b="0"/>
+      </a:lnRef>
+      <a:fillRef idx="1">
+        <a:scrgbClr r="0" g="0" b="0"/>
+      </a:fillRef>
+      <a:effectRef idx="0">
+        <a:scrgbClr r="0" g="0" b="0"/>
+      </a:effectRef>
+      <a:fontRef idx="minor"/>
+    </dgm:style>
+  </dgm:styleLbl>
+  <dgm:styleLbl name="solidFgAcc1">
+    <dgm:scene3d>
+      <a:camera prst="orthographicFront"/>
+      <a:lightRig rig="threePt" dir="t"/>
+    </dgm:scene3d>
+    <dgm:sp3d/>
+    <dgm:txPr/>
+    <dgm:style>
+      <a:lnRef idx="2">
+        <a:scrgbClr r="0" g="0" b="0"/>
+      </a:lnRef>
+      <a:fillRef idx="1">
+        <a:scrgbClr r="0" g="0" b="0"/>
+      </a:fillRef>
+      <a:effectRef idx="0">
+        <a:scrgbClr r="0" g="0" b="0"/>
+      </a:effectRef>
+      <a:fontRef idx="minor"/>
+    </dgm:style>
+  </dgm:styleLbl>
+  <dgm:styleLbl name="solidAlignAcc1">
+    <dgm:scene3d>
+      <a:camera prst="orthographicFront"/>
+      <a:lightRig rig="threePt" dir="t"/>
+    </dgm:scene3d>
+    <dgm:sp3d/>
+    <dgm:txPr/>
+    <dgm:style>
+      <a:lnRef idx="2">
+        <a:scrgbClr r="0" g="0" b="0"/>
+      </a:lnRef>
+      <a:fillRef idx="1">
+        <a:scrgbClr r="0" g="0" b="0"/>
+      </a:fillRef>
+      <a:effectRef idx="0">
+        <a:scrgbClr r="0" g="0" b="0"/>
+      </a:effectRef>
+      <a:fontRef idx="minor"/>
+    </dgm:style>
+  </dgm:styleLbl>
+  <dgm:styleLbl name="solidBgAcc1">
+    <dgm:scene3d>
+      <a:camera prst="orthographicFront"/>
+      <a:lightRig rig="threePt" dir="t"/>
+    </dgm:scene3d>
+    <dgm:sp3d/>
+    <dgm:txPr/>
+    <dgm:style>
+      <a:lnRef idx="2">
+        <a:scrgbClr r="0" g="0" b="0"/>
+      </a:lnRef>
+      <a:fillRef idx="1">
+        <a:scrgbClr r="0" g="0" b="0"/>
+      </a:fillRef>
+      <a:effectRef idx="0">
+        <a:scrgbClr r="0" g="0" b="0"/>
+      </a:effectRef>
+      <a:fontRef idx="minor"/>
+    </dgm:style>
+  </dgm:styleLbl>
+  <dgm:styleLbl name="fgAccFollowNode1">
+    <dgm:scene3d>
+      <a:camera prst="orthographicFront"/>
+      <a:lightRig rig="threePt" dir="t"/>
+    </dgm:scene3d>
+    <dgm:sp3d/>
+    <dgm:txPr/>
+    <dgm:style>
+      <a:lnRef idx="2">
+        <a:scrgbClr r="0" g="0" b="0"/>
+      </a:lnRef>
+      <a:fillRef idx="1">
+        <a:scrgbClr r="0" g="0" b="0"/>
+      </a:fillRef>
+      <a:effectRef idx="0">
+        <a:scrgbClr r="0" g="0" b="0"/>
+      </a:effectRef>
+      <a:fontRef idx="minor"/>
+    </dgm:style>
+  </dgm:styleLbl>
+  <dgm:styleLbl name="alignAccFollowNode1">
+    <dgm:scene3d>
+      <a:camera prst="orthographicFront"/>
+      <a:lightRig rig="threePt" dir="t"/>
+    </dgm:scene3d>
+    <dgm:sp3d/>
+    <dgm:txPr/>
+    <dgm:style>
+      <a:lnRef idx="2">
+        <a:scrgbClr r="0" g="0" b="0"/>
+      </a:lnRef>
+      <a:fillRef idx="1">
+        <a:scrgbClr r="0" g="0" b="0"/>
+      </a:fillRef>
+      <a:effectRef idx="0">
+        <a:scrgbClr r="0" g="0" b="0"/>
+      </a:effectRef>
+      <a:fontRef idx="minor"/>
+    </dgm:style>
+  </dgm:styleLbl>
+  <dgm:styleLbl name="bgAccFollowNode1">
+    <dgm:scene3d>
+      <a:camera prst="orthographicFront"/>
+      <a:lightRig rig="threePt" dir="t"/>
+    </dgm:scene3d>
+    <dgm:sp3d/>
+    <dgm:txPr/>
+    <dgm:style>
+      <a:lnRef idx="2">
+        <a:scrgbClr r="0" g="0" b="0"/>
+      </a:lnRef>
+      <a:fillRef idx="1">
+        <a:scrgbClr r="0" g="0" b="0"/>
+      </a:fillRef>
+      <a:effectRef idx="0">
+        <a:scrgbClr r="0" g="0" b="0"/>
+      </a:effectRef>
+      <a:fontRef idx="minor"/>
+    </dgm:style>
+  </dgm:styleLbl>
+  <dgm:styleLbl name="fgAcc0">
+    <dgm:scene3d>
+      <a:camera prst="orthographicFront"/>
+      <a:lightRig rig="threePt" dir="t"/>
+    </dgm:scene3d>
+    <dgm:sp3d/>
+    <dgm:txPr/>
+    <dgm:style>
+      <a:lnRef idx="2">
+        <a:scrgbClr r="0" g="0" b="0"/>
+      </a:lnRef>
+      <a:fillRef idx="1">
+        <a:scrgbClr r="0" g="0" b="0"/>
+      </a:fillRef>
+      <a:effectRef idx="0">
+        <a:scrgbClr r="0" g="0" b="0"/>
+      </a:effectRef>
+      <a:fontRef idx="minor"/>
+    </dgm:style>
+  </dgm:styleLbl>
+  <dgm:styleLbl name="fgAcc2">
+    <dgm:scene3d>
+      <a:camera prst="orthographicFront"/>
+      <a:lightRig rig="threePt" dir="t"/>
+    </dgm:scene3d>
+    <dgm:sp3d/>
+    <dgm:txPr/>
+    <dgm:style>
+      <a:lnRef idx="2">
+        <a:scrgbClr r="0" g="0" b="0"/>
+      </a:lnRef>
+      <a:fillRef idx="1">
+        <a:scrgbClr r="0" g="0" b="0"/>
+      </a:fillRef>
+      <a:effectRef idx="0">
+        <a:scrgbClr r="0" g="0" b="0"/>
+      </a:effectRef>
+      <a:fontRef idx="minor"/>
+    </dgm:style>
+  </dgm:styleLbl>
+  <dgm:styleLbl name="fgAcc3">
+    <dgm:scene3d>
+      <a:camera prst="orthographicFront"/>
+      <a:lightRig rig="threePt" dir="t"/>
+    </dgm:scene3d>
+    <dgm:sp3d/>
+    <dgm:txPr/>
+    <dgm:style>
+      <a:lnRef idx="2">
+        <a:scrgbClr r="0" g="0" b="0"/>
+      </a:lnRef>
+      <a:fillRef idx="1">
+        <a:scrgbClr r="0" g="0" b="0"/>
+      </a:fillRef>
+      <a:effectRef idx="0">
+        <a:scrgbClr r="0" g="0" b="0"/>
+      </a:effectRef>
+      <a:fontRef idx="minor"/>
+    </dgm:style>
+  </dgm:styleLbl>
+  <dgm:styleLbl name="fgAcc4">
+    <dgm:scene3d>
+      <a:camera prst="orthographicFront"/>
+      <a:lightRig rig="threePt" dir="t"/>
+    </dgm:scene3d>
+    <dgm:sp3d/>
+    <dgm:txPr/>
+    <dgm:style>
+      <a:lnRef idx="2">
+        <a:scrgbClr r="0" g="0" b="0"/>
+      </a:lnRef>
+      <a:fillRef idx="1">
+        <a:scrgbClr r="0" g="0" b="0"/>
+      </a:fillRef>
+      <a:effectRef idx="0">
+        <a:scrgbClr r="0" g="0" b="0"/>
+      </a:effectRef>
+      <a:fontRef idx="minor"/>
+    </dgm:style>
+  </dgm:styleLbl>
+  <dgm:styleLbl name="bgShp">
+    <dgm:scene3d>
+      <a:camera prst="orthographicFront"/>
+      <a:lightRig rig="threePt" dir="t"/>
+    </dgm:scene3d>
+    <dgm:sp3d/>
+    <dgm:txPr/>
+    <dgm:style>
+      <a:lnRef idx="0">
+        <a:scrgbClr r="0" g="0" b="0"/>
+      </a:lnRef>
+      <a:fillRef idx="1">
+        <a:scrgbClr r="0" g="0" b="0"/>
+      </a:fillRef>
+      <a:effectRef idx="0">
+        <a:scrgbClr r="0" g="0" b="0"/>
+      </a:effectRef>
+      <a:fontRef idx="minor"/>
+    </dgm:style>
+  </dgm:styleLbl>
+  <dgm:styleLbl name="dkBgShp">
+    <dgm:scene3d>
+      <a:camera prst="orthographicFront"/>
+      <a:lightRig rig="threePt" dir="t"/>
+    </dgm:scene3d>
+    <dgm:sp3d/>
+    <dgm:txPr/>
+    <dgm:style>
+      <a:lnRef idx="0">
+        <a:scrgbClr r="0" g="0" b="0"/>
+      </a:lnRef>
+      <a:fillRef idx="1">
+        <a:scrgbClr r="0" g="0" b="0"/>
+      </a:fillRef>
+      <a:effectRef idx="0">
+        <a:scrgbClr r="0" g="0" b="0"/>
+      </a:effectRef>
+      <a:fontRef idx="minor"/>
+    </dgm:style>
+  </dgm:styleLbl>
+  <dgm:styleLbl name="trBgShp">
+    <dgm:scene3d>
+      <a:camera prst="orthographicFront"/>
+      <a:lightRig rig="threePt" dir="t"/>
+    </dgm:scene3d>
+    <dgm:sp3d/>
+    <dgm:txPr/>
+    <dgm:style>
+      <a:lnRef idx="0">
+        <a:scrgbClr r="0" g="0" b="0"/>
+      </a:lnRef>
+      <a:fillRef idx="1">
+        <a:scrgbClr r="0" g="0" b="0"/>
+      </a:fillRef>
+      <a:effectRef idx="0">
+        <a:scrgbClr r="0" g="0" b="0"/>
+      </a:effectRef>
+      <a:fontRef idx="minor"/>
+    </dgm:style>
+  </dgm:styleLbl>
+  <dgm:styleLbl name="fgShp">
+    <dgm:scene3d>
+      <a:camera prst="orthographicFront"/>
+      <a:lightRig rig="threePt" dir="t"/>
+    </dgm:scene3d>
+    <dgm:sp3d/>
+    <dgm:txPr/>
+    <dgm:style>
+      <a:lnRef idx="2">
+        <a:scrgbClr r="0" g="0" b="0"/>
+      </a:lnRef>
+      <a:fillRef idx="1">
+        <a:scrgbClr r="0" g="0" b="0"/>
+      </a:fillRef>
+      <a:effectRef idx="0">
+        <a:scrgbClr r="0" g="0" b="0"/>
+      </a:effectRef>
+      <a:fontRef idx="minor"/>
+    </dgm:style>
+  </dgm:styleLbl>
+  <dgm:styleLbl name="revTx">
+    <dgm:scene3d>
+      <a:camera prst="orthographicFront"/>
+      <a:lightRig rig="threePt" dir="t"/>
+    </dgm:scene3d>
+    <dgm:sp3d/>
+    <dgm:txPr/>
+    <dgm:style>
+      <a:lnRef idx="0">
+        <a:scrgbClr r="0" g="0" b="0"/>
+      </a:lnRef>
+      <a:fillRef idx="0">
+        <a:scrgbClr r="0" g="0" b="0"/>
+      </a:fillRef>
+      <a:effectRef idx="0">
+        <a:scrgbClr r="0" g="0" b="0"/>
+      </a:effectRef>
+      <a:fontRef idx="minor"/>
+    </dgm:style>
+  </dgm:styleLbl>
+</dgm:styleDef>
+</file>
+
 <file path=ppt/notesMasters/notesMaster1.xml><?xml version="1.0" encoding="utf-8"?>
 <p:notesMaster xmlns:a="http://schemas.openxmlformats.org/drawingml/2006/main" xmlns:r="http://schemas.openxmlformats.org/officeDocument/2006/relationships" xmlns:p="http://schemas.openxmlformats.org/presentationml/2006/main">
   <p:cSld>
@@ -3047,7 +5857,7 @@
           <a:p>
             <a:fld id="{85DB6F77-31B3-44A6-9538-7D3B84B14A3E}" type="datetimeFigureOut">
               <a:rPr lang="en-US" smtClean="0"/>
-              <a:t>4/18/2021</a:t>
+              <a:t>4/24/2021</a:t>
             </a:fld>
             <a:endParaRPr lang="en-US" dirty="0"/>
           </a:p>
@@ -3540,7 +6350,7 @@
           <a:p>
             <a:fld id="{F7B24132-C908-474C-84C6-F33F0E9C2824}" type="datetime1">
               <a:rPr lang="en-US" smtClean="0"/>
-              <a:t>4/18/2021</a:t>
+              <a:t>4/24/2021</a:t>
             </a:fld>
             <a:endParaRPr lang="en-US" dirty="0"/>
           </a:p>
@@ -3743,7 +6553,7 @@
           <a:p>
             <a:fld id="{03A0D6BE-6A5B-4B1A-AB35-D5FFCCF5138B}" type="datetime1">
               <a:rPr lang="en-US" smtClean="0"/>
-              <a:t>4/18/2021</a:t>
+              <a:t>4/24/2021</a:t>
             </a:fld>
             <a:endParaRPr lang="en-US" dirty="0"/>
           </a:p>
@@ -3994,7 +6804,7 @@
           <a:p>
             <a:fld id="{F4E8BD5B-87CC-4318-9824-F4CA83CB0BAF}" type="datetime1">
               <a:rPr lang="en-US" smtClean="0"/>
-              <a:t>4/18/2021</a:t>
+              <a:t>4/24/2021</a:t>
             </a:fld>
             <a:endParaRPr lang="en-US" dirty="0"/>
           </a:p>
@@ -4163,7 +6973,7 @@
           <a:p>
             <a:fld id="{F5E2AA5E-62DB-4209-84D2-A3A9C66875BD}" type="datetime1">
               <a:rPr lang="en-US" smtClean="0"/>
-              <a:t>4/18/2021</a:t>
+              <a:t>4/24/2021</a:t>
             </a:fld>
             <a:endParaRPr lang="en-US" dirty="0"/>
           </a:p>
@@ -4501,7 +7311,7 @@
           <a:p>
             <a:fld id="{55B8EF27-61CD-4273-9CC6-8B5AB469D6E9}" type="datetime1">
               <a:rPr lang="en-US" smtClean="0"/>
-              <a:t>4/18/2021</a:t>
+              <a:t>4/24/2021</a:t>
             </a:fld>
             <a:endParaRPr lang="en-US" dirty="0"/>
           </a:p>
@@ -4771,7 +7581,7 @@
           <a:p>
             <a:fld id="{F0614D88-E4A3-4915-A946-C7B143E0147E}" type="datetime1">
               <a:rPr lang="en-US" smtClean="0"/>
-              <a:t>4/18/2021</a:t>
+              <a:t>4/24/2021</a:t>
             </a:fld>
             <a:endParaRPr lang="en-US" dirty="0"/>
           </a:p>
@@ -5145,7 +7955,7 @@
           <a:p>
             <a:fld id="{07C41193-F002-4F22-ACB4-105512D85B33}" type="datetime1">
               <a:rPr lang="en-US" smtClean="0"/>
-              <a:t>4/18/2021</a:t>
+              <a:t>4/24/2021</a:t>
             </a:fld>
             <a:endParaRPr lang="en-US" dirty="0"/>
           </a:p>
@@ -5258,7 +8068,7 @@
           <a:p>
             <a:fld id="{03B2B57F-0B3C-4FE7-8F56-8C4115027F2E}" type="datetime1">
               <a:rPr lang="en-US" smtClean="0"/>
-              <a:t>4/18/2021</a:t>
+              <a:t>4/24/2021</a:t>
             </a:fld>
             <a:endParaRPr lang="en-US" dirty="0"/>
           </a:p>
@@ -5424,7 +8234,7 @@
           <a:p>
             <a:fld id="{70E8098D-3BCA-4496-B67F-08ABED3A79F9}" type="datetime1">
               <a:rPr lang="en-US" smtClean="0"/>
-              <a:t>4/18/2021</a:t>
+              <a:t>4/24/2021</a:t>
             </a:fld>
             <a:endParaRPr lang="en-US" dirty="0"/>
           </a:p>
@@ -5774,7 +8584,7 @@
           <a:p>
             <a:fld id="{5F4F9A14-79CD-4DBB-8A95-93FAB90953CE}" type="datetime1">
               <a:rPr lang="en-US" smtClean="0"/>
-              <a:t>4/18/2021</a:t>
+              <a:t>4/24/2021</a:t>
             </a:fld>
             <a:endParaRPr lang="en-US" dirty="0"/>
           </a:p>
@@ -6152,7 +8962,7 @@
           <a:p>
             <a:fld id="{72FCCA62-85F4-4E91-8034-B3A4AEB2ACA5}" type="datetime1">
               <a:rPr lang="en-US" smtClean="0"/>
-              <a:t>4/18/2021</a:t>
+              <a:t>4/24/2021</a:t>
             </a:fld>
             <a:endParaRPr lang="en-US" dirty="0"/>
           </a:p>
@@ -6434,7 +9244,7 @@
           <a:p>
             <a:fld id="{77739FE2-C7BB-439D-8EFA-EB059A6AF0B6}" type="datetime1">
               <a:rPr lang="en-US" smtClean="0"/>
-              <a:t>4/18/2021</a:t>
+              <a:t>4/24/2021</a:t>
             </a:fld>
             <a:endParaRPr lang="en-US" dirty="0"/>
           </a:p>
@@ -7388,6 +10198,316 @@
 <file path=ppt/slides/slide2.xml><?xml version="1.0" encoding="utf-8"?>
 <p:sld xmlns:a="http://schemas.openxmlformats.org/drawingml/2006/main" xmlns:r="http://schemas.openxmlformats.org/officeDocument/2006/relationships" xmlns:p="http://schemas.openxmlformats.org/presentationml/2006/main">
   <p:cSld>
+    <p:bg>
+      <p:bgPr>
+        <a:solidFill>
+          <a:schemeClr val="bg1"/>
+        </a:solidFill>
+        <a:effectLst/>
+      </p:bgPr>
+    </p:bg>
+    <p:spTree>
+      <p:nvGrpSpPr>
+        <p:cNvPr id="1" name=""/>
+        <p:cNvGrpSpPr/>
+        <p:nvPr/>
+      </p:nvGrpSpPr>
+      <p:grpSpPr>
+        <a:xfrm>
+          <a:off x="0" y="0"/>
+          <a:ext cx="0" cy="0"/>
+          <a:chOff x="0" y="0"/>
+          <a:chExt cx="0" cy="0"/>
+        </a:xfrm>
+      </p:grpSpPr>
+      <p:sp useBgFill="1">
+        <p:nvSpPr>
+          <p:cNvPr id="11" name="Rectangle 10">
+            <a:extLst>
+              <a:ext uri="{FF2B5EF4-FFF2-40B4-BE49-F238E27FC236}">
+                <a16:creationId xmlns:a16="http://schemas.microsoft.com/office/drawing/2014/main" id="{311973C2-EB8B-452A-A698-4A252FD3AE28}"/>
+              </a:ext>
+              <a:ext uri="{C183D7F6-B498-43B3-948B-1728B52AA6E4}">
+                <adec:decorative xmlns:adec="http://schemas.microsoft.com/office/drawing/2017/decorative" val="1"/>
+              </a:ext>
+            </a:extLst>
+          </p:cNvPr>
+          <p:cNvSpPr>
+            <a:spLocks noGrp="1" noRot="1" noChangeAspect="1" noMove="1" noResize="1" noEditPoints="1" noAdjustHandles="1" noChangeArrowheads="1" noChangeShapeType="1" noTextEdit="1"/>
+          </p:cNvSpPr>
+          <p:nvPr>
+            <p:extLst>
+              <p:ext uri="{386F3935-93C4-4BCD-93E2-E3B085C9AB24}">
+                <p16:designElem xmlns:p16="http://schemas.microsoft.com/office/powerpoint/2015/main" val="1"/>
+              </p:ext>
+            </p:extLst>
+          </p:nvPr>
+        </p:nvSpPr>
+        <p:spPr>
+          <a:xfrm>
+            <a:off x="0" y="1"/>
+            <a:ext cx="12192000" cy="6857999"/>
+          </a:xfrm>
+          <a:prstGeom prst="rect">
+            <a:avLst/>
+          </a:prstGeom>
+          <a:ln>
+            <a:noFill/>
+          </a:ln>
+        </p:spPr>
+        <p:style>
+          <a:lnRef idx="2">
+            <a:schemeClr val="accent1">
+              <a:shade val="50000"/>
+            </a:schemeClr>
+          </a:lnRef>
+          <a:fillRef idx="1">
+            <a:schemeClr val="accent1"/>
+          </a:fillRef>
+          <a:effectRef idx="0">
+            <a:schemeClr val="accent1"/>
+          </a:effectRef>
+          <a:fontRef idx="minor">
+            <a:schemeClr val="lt1"/>
+          </a:fontRef>
+        </p:style>
+        <p:txBody>
+          <a:bodyPr rtlCol="0" anchor="ctr"/>
+          <a:lstStyle/>
+          <a:p>
+            <a:pPr algn="ctr"/>
+            <a:endParaRPr lang="en-US" dirty="0"/>
+          </a:p>
+        </p:txBody>
+      </p:sp>
+      <p:sp useBgFill="1">
+        <p:nvSpPr>
+          <p:cNvPr id="13" name="Rectangle 12">
+            <a:extLst>
+              <a:ext uri="{FF2B5EF4-FFF2-40B4-BE49-F238E27FC236}">
+                <a16:creationId xmlns:a16="http://schemas.microsoft.com/office/drawing/2014/main" id="{10162E77-11AD-44A7-84EC-40C59EEFBD2E}"/>
+              </a:ext>
+              <a:ext uri="{C183D7F6-B498-43B3-948B-1728B52AA6E4}">
+                <adec:decorative xmlns:adec="http://schemas.microsoft.com/office/drawing/2017/decorative" val="1"/>
+              </a:ext>
+            </a:extLst>
+          </p:cNvPr>
+          <p:cNvSpPr>
+            <a:spLocks noGrp="1" noRot="1" noChangeAspect="1" noMove="1" noResize="1" noEditPoints="1" noAdjustHandles="1" noChangeArrowheads="1" noChangeShapeType="1" noTextEdit="1"/>
+          </p:cNvSpPr>
+          <p:nvPr>
+            <p:extLst>
+              <p:ext uri="{386F3935-93C4-4BCD-93E2-E3B085C9AB24}">
+                <p16:designElem xmlns:p16="http://schemas.microsoft.com/office/powerpoint/2015/main" val="1"/>
+              </p:ext>
+            </p:extLst>
+          </p:nvPr>
+        </p:nvSpPr>
+        <p:spPr>
+          <a:xfrm>
+            <a:off x="0" y="0"/>
+            <a:ext cx="12192001" cy="6334316"/>
+          </a:xfrm>
+          <a:prstGeom prst="rect">
+            <a:avLst/>
+          </a:prstGeom>
+          <a:ln>
+            <a:noFill/>
+          </a:ln>
+        </p:spPr>
+        <p:style>
+          <a:lnRef idx="2">
+            <a:schemeClr val="accent1">
+              <a:shade val="50000"/>
+            </a:schemeClr>
+          </a:lnRef>
+          <a:fillRef idx="1">
+            <a:schemeClr val="accent1"/>
+          </a:fillRef>
+          <a:effectRef idx="0">
+            <a:schemeClr val="accent1"/>
+          </a:effectRef>
+          <a:fontRef idx="minor">
+            <a:schemeClr val="lt1"/>
+          </a:fontRef>
+        </p:style>
+        <p:txBody>
+          <a:bodyPr rtlCol="0" anchor="ctr"/>
+          <a:lstStyle/>
+          <a:p>
+            <a:pPr algn="ctr"/>
+            <a:endParaRPr lang="en-US" dirty="0"/>
+          </a:p>
+        </p:txBody>
+      </p:sp>
+      <p:sp>
+        <p:nvSpPr>
+          <p:cNvPr id="2" name="Title 1">
+            <a:extLst>
+              <a:ext uri="{FF2B5EF4-FFF2-40B4-BE49-F238E27FC236}">
+                <a16:creationId xmlns:a16="http://schemas.microsoft.com/office/drawing/2014/main" id="{58939E06-B884-48E2-A024-042AA6CB08FA}"/>
+              </a:ext>
+            </a:extLst>
+          </p:cNvPr>
+          <p:cNvSpPr>
+            <a:spLocks noGrp="1"/>
+          </p:cNvSpPr>
+          <p:nvPr>
+            <p:ph type="title"/>
+          </p:nvPr>
+        </p:nvSpPr>
+        <p:spPr>
+          <a:xfrm>
+            <a:off x="5181601" y="634946"/>
+            <a:ext cx="6368142" cy="1450757"/>
+          </a:xfrm>
+        </p:spPr>
+        <p:txBody>
+          <a:bodyPr>
+            <a:normAutofit/>
+          </a:bodyPr>
+          <a:lstStyle/>
+          <a:p>
+            <a:r>
+              <a:rPr lang="en-US" dirty="0"/>
+              <a:t>Key Questions</a:t>
+            </a:r>
+          </a:p>
+        </p:txBody>
+      </p:sp>
+      <p:cxnSp>
+        <p:nvCxnSpPr>
+          <p:cNvPr id="15" name="Straight Connector 14">
+            <a:extLst>
+              <a:ext uri="{FF2B5EF4-FFF2-40B4-BE49-F238E27FC236}">
+                <a16:creationId xmlns:a16="http://schemas.microsoft.com/office/drawing/2014/main" id="{5AB158E9-1B40-4CD6-95F0-95CA11DF7B7A}"/>
+              </a:ext>
+              <a:ext uri="{C183D7F6-B498-43B3-948B-1728B52AA6E4}">
+                <adec:decorative xmlns:adec="http://schemas.microsoft.com/office/drawing/2017/decorative" val="1"/>
+              </a:ext>
+            </a:extLst>
+          </p:cNvPr>
+          <p:cNvCxnSpPr>
+            <a:cxnSpLocks noGrp="1" noRot="1" noChangeAspect="1" noMove="1" noResize="1" noEditPoints="1" noAdjustHandles="1" noChangeArrowheads="1" noChangeShapeType="1"/>
+          </p:cNvCxnSpPr>
+          <p:nvPr>
+            <p:extLst>
+              <p:ext uri="{386F3935-93C4-4BCD-93E2-E3B085C9AB24}">
+                <p16:designElem xmlns:p16="http://schemas.microsoft.com/office/powerpoint/2015/main" val="1"/>
+              </p:ext>
+            </p:extLst>
+          </p:nvPr>
+        </p:nvCxnSpPr>
+        <p:spPr>
+          <a:xfrm>
+            <a:off x="5287617" y="2085703"/>
+            <a:ext cx="6170686" cy="0"/>
+          </a:xfrm>
+          <a:prstGeom prst="line">
+            <a:avLst/>
+          </a:prstGeom>
+          <a:ln w="6350">
+            <a:solidFill>
+              <a:schemeClr val="tx1">
+                <a:lumMod val="50000"/>
+                <a:lumOff val="50000"/>
+                <a:alpha val="90000"/>
+              </a:schemeClr>
+            </a:solidFill>
+          </a:ln>
+        </p:spPr>
+        <p:style>
+          <a:lnRef idx="1">
+            <a:schemeClr val="accent1"/>
+          </a:lnRef>
+          <a:fillRef idx="0">
+            <a:schemeClr val="accent1"/>
+          </a:fillRef>
+          <a:effectRef idx="0">
+            <a:schemeClr val="accent1"/>
+          </a:effectRef>
+          <a:fontRef idx="minor">
+            <a:schemeClr val="tx1"/>
+          </a:fontRef>
+        </p:style>
+      </p:cxnSp>
+      <p:graphicFrame>
+        <p:nvGraphicFramePr>
+          <p:cNvPr id="6" name="Content Placeholder 2" descr="icon circle label list SmartArt">
+            <a:extLst>
+              <a:ext uri="{FF2B5EF4-FFF2-40B4-BE49-F238E27FC236}">
+                <a16:creationId xmlns:a16="http://schemas.microsoft.com/office/drawing/2014/main" id="{6AD0D85D-BF36-4325-B97D-1085C7E5B130}"/>
+              </a:ext>
+            </a:extLst>
+          </p:cNvPr>
+          <p:cNvGraphicFramePr>
+            <a:graphicFrameLocks noGrp="1"/>
+          </p:cNvGraphicFramePr>
+          <p:nvPr>
+            <p:ph idx="1"/>
+            <p:extLst>
+              <p:ext uri="{D42A27DB-BD31-4B8C-83A1-F6EECF244321}">
+                <p14:modId xmlns:p14="http://schemas.microsoft.com/office/powerpoint/2010/main" val="2699180334"/>
+              </p:ext>
+            </p:extLst>
+          </p:nvPr>
+        </p:nvGraphicFramePr>
+        <p:xfrm>
+          <a:off x="5181601" y="2198914"/>
+          <a:ext cx="6368142" cy="3670180"/>
+        </p:xfrm>
+        <a:graphic>
+          <a:graphicData uri="http://schemas.openxmlformats.org/drawingml/2006/diagram">
+            <dgm:relIds xmlns:dgm="http://schemas.openxmlformats.org/drawingml/2006/diagram" xmlns:r="http://schemas.openxmlformats.org/officeDocument/2006/relationships" r:dm="rId2" r:lo="rId3" r:qs="rId4" r:cs="rId5"/>
+          </a:graphicData>
+        </a:graphic>
+      </p:graphicFrame>
+      <p:pic>
+        <p:nvPicPr>
+          <p:cNvPr id="5" name="Picture 4" descr="A picture containing tree, outdoor, conifer, slope&#10;&#10;Description automatically generated">
+            <a:extLst>
+              <a:ext uri="{FF2B5EF4-FFF2-40B4-BE49-F238E27FC236}">
+                <a16:creationId xmlns:a16="http://schemas.microsoft.com/office/drawing/2014/main" id="{0E3A3E54-0FC0-4311-A9BA-1C6194BEE8BC}"/>
+              </a:ext>
+            </a:extLst>
+          </p:cNvPr>
+          <p:cNvPicPr>
+            <a:picLocks noChangeAspect="1"/>
+          </p:cNvPicPr>
+          <p:nvPr/>
+        </p:nvPicPr>
+        <p:blipFill>
+          <a:blip r:embed="rId7"/>
+          <a:stretch>
+            <a:fillRect/>
+          </a:stretch>
+        </p:blipFill>
+        <p:spPr>
+          <a:xfrm>
+            <a:off x="-18080" y="-1"/>
+            <a:ext cx="4572000" cy="6858000"/>
+          </a:xfrm>
+          <a:prstGeom prst="rect">
+            <a:avLst/>
+          </a:prstGeom>
+        </p:spPr>
+      </p:pic>
+    </p:spTree>
+    <p:extLst>
+      <p:ext uri="{BB962C8B-B14F-4D97-AF65-F5344CB8AC3E}">
+        <p14:creationId xmlns:p14="http://schemas.microsoft.com/office/powerpoint/2010/main" val="1843192287"/>
+      </p:ext>
+    </p:extLst>
+  </p:cSld>
+  <p:clrMapOvr>
+    <a:masterClrMapping/>
+  </p:clrMapOvr>
+</p:sld>
+</file>
+
+<file path=ppt/slides/slide3.xml><?xml version="1.0" encoding="utf-8"?>
+<p:sld xmlns:a="http://schemas.openxmlformats.org/drawingml/2006/main" xmlns:r="http://schemas.openxmlformats.org/officeDocument/2006/relationships" xmlns:p="http://schemas.openxmlformats.org/presentationml/2006/main">
+  <p:cSld>
     <p:spTree>
       <p:nvGrpSpPr>
         <p:cNvPr id="1" name=""/>
@@ -7425,7 +10545,7 @@
           <a:p>
             <a:r>
               <a:rPr lang="en-US" dirty="0"/>
-              <a:t>Basic Summary</a:t>
+              <a:t>The Data</a:t>
             </a:r>
           </a:p>
         </p:txBody>
@@ -7453,8 +10573,11 @@
           <a:p>
             <a:r>
               <a:rPr lang="en-US" dirty="0"/>
-              <a:t>What is this?</a:t>
+              <a:t>List data sources/datasets w/ a few notes</a:t>
             </a:r>
+          </a:p>
+          <a:p>
+            <a:endParaRPr lang="en-US" dirty="0"/>
           </a:p>
         </p:txBody>
       </p:sp>
@@ -7481,7 +10604,7 @@
           <a:p>
             <a:r>
               <a:rPr lang="en-US" dirty="0"/>
-              <a:t>This is available for subtext</a:t>
+              <a:t>Historical California Wildfire data is not easily accessible.</a:t>
             </a:r>
           </a:p>
         </p:txBody>
@@ -7499,7 +10622,892 @@
 </p:sld>
 </file>
 
-<file path=ppt/slides/slide3.xml><?xml version="1.0" encoding="utf-8"?>
+<file path=ppt/slides/slide4.xml><?xml version="1.0" encoding="utf-8"?>
+<p:sld xmlns:a="http://schemas.openxmlformats.org/drawingml/2006/main" xmlns:r="http://schemas.openxmlformats.org/officeDocument/2006/relationships" xmlns:p="http://schemas.openxmlformats.org/presentationml/2006/main">
+  <p:cSld>
+    <p:spTree>
+      <p:nvGrpSpPr>
+        <p:cNvPr id="1" name=""/>
+        <p:cNvGrpSpPr/>
+        <p:nvPr/>
+      </p:nvGrpSpPr>
+      <p:grpSpPr>
+        <a:xfrm>
+          <a:off x="0" y="0"/>
+          <a:ext cx="0" cy="0"/>
+          <a:chOff x="0" y="0"/>
+          <a:chExt cx="0" cy="0"/>
+        </a:xfrm>
+      </p:grpSpPr>
+      <p:pic>
+        <p:nvPicPr>
+          <p:cNvPr id="51" name="Picture 50">
+            <a:extLst>
+              <a:ext uri="{FF2B5EF4-FFF2-40B4-BE49-F238E27FC236}">
+                <a16:creationId xmlns:a16="http://schemas.microsoft.com/office/drawing/2014/main" id="{1747218C-47E2-4F39-AA78-2CC9DCFB68E3}"/>
+              </a:ext>
+            </a:extLst>
+          </p:cNvPr>
+          <p:cNvPicPr>
+            <a:picLocks noChangeAspect="1"/>
+          </p:cNvPicPr>
+          <p:nvPr/>
+        </p:nvPicPr>
+        <p:blipFill>
+          <a:blip r:embed="rId2"/>
+          <a:stretch>
+            <a:fillRect/>
+          </a:stretch>
+        </p:blipFill>
+        <p:spPr>
+          <a:xfrm>
+            <a:off x="1361444" y="30598"/>
+            <a:ext cx="5557541" cy="3741174"/>
+          </a:xfrm>
+          <a:prstGeom prst="rect">
+            <a:avLst/>
+          </a:prstGeom>
+        </p:spPr>
+      </p:pic>
+      <p:sp>
+        <p:nvSpPr>
+          <p:cNvPr id="5" name="Title 4">
+            <a:extLst>
+              <a:ext uri="{FF2B5EF4-FFF2-40B4-BE49-F238E27FC236}">
+                <a16:creationId xmlns:a16="http://schemas.microsoft.com/office/drawing/2014/main" id="{7227A022-1152-4370-BE9F-B3D78FE97089}"/>
+              </a:ext>
+            </a:extLst>
+          </p:cNvPr>
+          <p:cNvSpPr>
+            <a:spLocks noGrp="1"/>
+          </p:cNvSpPr>
+          <p:nvPr>
+            <p:ph type="title" idx="4294967295"/>
+          </p:nvPr>
+        </p:nvSpPr>
+        <p:spPr>
+          <a:xfrm>
+            <a:off x="0" y="0"/>
+            <a:ext cx="4699000" cy="598041"/>
+          </a:xfrm>
+        </p:spPr>
+        <p:txBody>
+          <a:bodyPr>
+            <a:normAutofit/>
+          </a:bodyPr>
+          <a:lstStyle/>
+          <a:p>
+            <a:r>
+              <a:rPr lang="en-US" sz="3200" dirty="0"/>
+              <a:t>Solution Architecture</a:t>
+            </a:r>
+          </a:p>
+        </p:txBody>
+      </p:sp>
+      <p:pic>
+        <p:nvPicPr>
+          <p:cNvPr id="3" name="Picture 2">
+            <a:extLst>
+              <a:ext uri="{FF2B5EF4-FFF2-40B4-BE49-F238E27FC236}">
+                <a16:creationId xmlns:a16="http://schemas.microsoft.com/office/drawing/2014/main" id="{27C0BE57-0A19-4EBA-8DBA-A1D02184013D}"/>
+              </a:ext>
+            </a:extLst>
+          </p:cNvPr>
+          <p:cNvPicPr>
+            <a:picLocks noChangeAspect="1"/>
+          </p:cNvPicPr>
+          <p:nvPr/>
+        </p:nvPicPr>
+        <p:blipFill>
+          <a:blip r:embed="rId3"/>
+          <a:stretch>
+            <a:fillRect/>
+          </a:stretch>
+        </p:blipFill>
+        <p:spPr>
+          <a:xfrm>
+            <a:off x="177391" y="2733948"/>
+            <a:ext cx="1127858" cy="1204064"/>
+          </a:xfrm>
+          <a:prstGeom prst="rect">
+            <a:avLst/>
+          </a:prstGeom>
+        </p:spPr>
+      </p:pic>
+      <p:cxnSp>
+        <p:nvCxnSpPr>
+          <p:cNvPr id="12" name="Straight Arrow Connector 11">
+            <a:extLst>
+              <a:ext uri="{FF2B5EF4-FFF2-40B4-BE49-F238E27FC236}">
+                <a16:creationId xmlns:a16="http://schemas.microsoft.com/office/drawing/2014/main" id="{F46CB13D-10E1-4346-91FD-3FE0A36DBBA1}"/>
+              </a:ext>
+            </a:extLst>
+          </p:cNvPr>
+          <p:cNvCxnSpPr>
+            <a:cxnSpLocks/>
+            <a:stCxn id="3" idx="3"/>
+          </p:cNvCxnSpPr>
+          <p:nvPr/>
+        </p:nvCxnSpPr>
+        <p:spPr>
+          <a:xfrm flipV="1">
+            <a:off x="1305249" y="2571328"/>
+            <a:ext cx="1999638" cy="764652"/>
+          </a:xfrm>
+          <a:prstGeom prst="straightConnector1">
+            <a:avLst/>
+          </a:prstGeom>
+          <a:ln>
+            <a:solidFill>
+              <a:schemeClr val="tx2"/>
+            </a:solidFill>
+            <a:tailEnd type="triangle" w="lg" len="lg"/>
+          </a:ln>
+        </p:spPr>
+        <p:style>
+          <a:lnRef idx="1">
+            <a:schemeClr val="dk1"/>
+          </a:lnRef>
+          <a:fillRef idx="0">
+            <a:schemeClr val="dk1"/>
+          </a:fillRef>
+          <a:effectRef idx="0">
+            <a:schemeClr val="dk1"/>
+          </a:effectRef>
+          <a:fontRef idx="minor">
+            <a:schemeClr val="tx1"/>
+          </a:fontRef>
+        </p:style>
+      </p:cxnSp>
+      <p:sp>
+        <p:nvSpPr>
+          <p:cNvPr id="16" name="Rectangle 15">
+            <a:extLst>
+              <a:ext uri="{FF2B5EF4-FFF2-40B4-BE49-F238E27FC236}">
+                <a16:creationId xmlns:a16="http://schemas.microsoft.com/office/drawing/2014/main" id="{F3E982B8-BDAC-48AA-A8A4-59526A71CC38}"/>
+              </a:ext>
+            </a:extLst>
+          </p:cNvPr>
+          <p:cNvSpPr/>
+          <p:nvPr/>
+        </p:nvSpPr>
+        <p:spPr>
+          <a:xfrm>
+            <a:off x="3302333" y="1203758"/>
+            <a:ext cx="2368325" cy="1814669"/>
+          </a:xfrm>
+          <a:prstGeom prst="rect">
+            <a:avLst/>
+          </a:prstGeom>
+          <a:ln/>
+        </p:spPr>
+        <p:style>
+          <a:lnRef idx="2">
+            <a:schemeClr val="accent6"/>
+          </a:lnRef>
+          <a:fillRef idx="1">
+            <a:schemeClr val="lt1"/>
+          </a:fillRef>
+          <a:effectRef idx="0">
+            <a:schemeClr val="accent6"/>
+          </a:effectRef>
+          <a:fontRef idx="minor">
+            <a:schemeClr val="dk1"/>
+          </a:fontRef>
+        </p:style>
+        <p:txBody>
+          <a:bodyPr rtlCol="0" anchor="ctr"/>
+          <a:lstStyle/>
+          <a:p>
+            <a:pPr algn="ctr"/>
+            <a:endParaRPr lang="en-US"/>
+          </a:p>
+        </p:txBody>
+      </p:sp>
+      <p:grpSp>
+        <p:nvGrpSpPr>
+          <p:cNvPr id="13" name="Group 12">
+            <a:extLst>
+              <a:ext uri="{FF2B5EF4-FFF2-40B4-BE49-F238E27FC236}">
+                <a16:creationId xmlns:a16="http://schemas.microsoft.com/office/drawing/2014/main" id="{11787C29-A7BC-4D68-8E77-88AC448AACCF}"/>
+              </a:ext>
+            </a:extLst>
+          </p:cNvPr>
+          <p:cNvGrpSpPr/>
+          <p:nvPr/>
+        </p:nvGrpSpPr>
+        <p:grpSpPr>
+          <a:xfrm>
+            <a:off x="3385565" y="1207269"/>
+            <a:ext cx="2663292" cy="1468337"/>
+            <a:chOff x="5770534" y="-65000"/>
+            <a:chExt cx="3410919" cy="1847850"/>
+          </a:xfrm>
+        </p:grpSpPr>
+        <p:pic>
+          <p:nvPicPr>
+            <p:cNvPr id="14" name="Picture 24" descr="Image result for postgresql logo">
+              <a:extLst>
+                <a:ext uri="{FF2B5EF4-FFF2-40B4-BE49-F238E27FC236}">
+                  <a16:creationId xmlns:a16="http://schemas.microsoft.com/office/drawing/2014/main" id="{FE14265E-3777-4617-A346-25BC2121BC82}"/>
+                </a:ext>
+              </a:extLst>
+            </p:cNvPr>
+            <p:cNvPicPr>
+              <a:picLocks noChangeAspect="1" noChangeArrowheads="1"/>
+            </p:cNvPicPr>
+            <p:nvPr/>
+          </p:nvPicPr>
+          <p:blipFill>
+            <a:blip r:embed="rId4">
+              <a:extLst>
+                <a:ext uri="{28A0092B-C50C-407E-A947-70E740481C1C}">
+                  <a14:useLocalDpi xmlns:a14="http://schemas.microsoft.com/office/drawing/2010/main" val="0"/>
+                </a:ext>
+              </a:extLst>
+            </a:blip>
+            <a:srcRect/>
+            <a:stretch>
+              <a:fillRect/>
+            </a:stretch>
+          </p:blipFill>
+          <p:spPr bwMode="auto">
+            <a:xfrm>
+              <a:off x="5770534" y="-65000"/>
+              <a:ext cx="2114550" cy="1847850"/>
+            </a:xfrm>
+            <a:prstGeom prst="rect">
+              <a:avLst/>
+            </a:prstGeom>
+            <a:noFill/>
+            <a:extLst>
+              <a:ext uri="{909E8E84-426E-40DD-AFC4-6F175D3DCCD1}">
+                <a14:hiddenFill xmlns:a14="http://schemas.microsoft.com/office/drawing/2010/main">
+                  <a:solidFill>
+                    <a:srgbClr val="FFFFFF"/>
+                  </a:solidFill>
+                </a14:hiddenFill>
+              </a:ext>
+            </a:extLst>
+          </p:spPr>
+        </p:pic>
+        <p:pic>
+          <p:nvPicPr>
+            <p:cNvPr id="15" name="Picture 36" descr="Image result for sql logo">
+              <a:extLst>
+                <a:ext uri="{FF2B5EF4-FFF2-40B4-BE49-F238E27FC236}">
+                  <a16:creationId xmlns:a16="http://schemas.microsoft.com/office/drawing/2014/main" id="{41D5A20A-E783-4692-9EA6-1F9E9B082944}"/>
+                </a:ext>
+              </a:extLst>
+            </p:cNvPr>
+            <p:cNvPicPr>
+              <a:picLocks noChangeAspect="1" noChangeArrowheads="1"/>
+            </p:cNvPicPr>
+            <p:nvPr/>
+          </p:nvPicPr>
+          <p:blipFill>
+            <a:blip r:embed="rId5">
+              <a:extLst>
+                <a:ext uri="{BEBA8EAE-BF5A-486C-A8C5-ECC9F3942E4B}">
+                  <a14:imgProps xmlns:a14="http://schemas.microsoft.com/office/drawing/2010/main">
+                    <a14:imgLayer r:embed="rId6">
+                      <a14:imgEffect>
+                        <a14:backgroundRemoval t="10000" b="90000" l="10000" r="90000">
+                          <a14:foregroundMark x1="33766" y1="12195" x2="33766" y2="12195"/>
+                          <a14:foregroundMark x1="52922" y1="29878" x2="52922" y2="29878"/>
+                          <a14:foregroundMark x1="57792" y1="50610" x2="57792" y2="50610"/>
+                          <a14:foregroundMark x1="56494" y1="67073" x2="56494" y2="67073"/>
+                          <a14:foregroundMark x1="33117" y1="62195" x2="33117" y2="62195"/>
+                          <a14:foregroundMark x1="35065" y1="82317" x2="35065" y2="82317"/>
+                          <a14:foregroundMark x1="25649" y1="27439" x2="25649" y2="27439"/>
+                        </a14:backgroundRemoval>
+                      </a14:imgEffect>
+                    </a14:imgLayer>
+                  </a14:imgProps>
+                </a:ext>
+                <a:ext uri="{28A0092B-C50C-407E-A947-70E740481C1C}">
+                  <a14:useLocalDpi xmlns:a14="http://schemas.microsoft.com/office/drawing/2010/main" val="0"/>
+                </a:ext>
+              </a:extLst>
+            </a:blip>
+            <a:srcRect/>
+            <a:stretch>
+              <a:fillRect/>
+            </a:stretch>
+          </p:blipFill>
+          <p:spPr bwMode="auto">
+            <a:xfrm>
+              <a:off x="7141992" y="289263"/>
+              <a:ext cx="2039461" cy="1085947"/>
+            </a:xfrm>
+            <a:prstGeom prst="rect">
+              <a:avLst/>
+            </a:prstGeom>
+            <a:noFill/>
+            <a:extLst>
+              <a:ext uri="{909E8E84-426E-40DD-AFC4-6F175D3DCCD1}">
+                <a14:hiddenFill xmlns:a14="http://schemas.microsoft.com/office/drawing/2010/main">
+                  <a:solidFill>
+                    <a:srgbClr val="FFFFFF"/>
+                  </a:solidFill>
+                </a14:hiddenFill>
+              </a:ext>
+            </a:extLst>
+          </p:spPr>
+        </p:pic>
+      </p:grpSp>
+      <p:grpSp>
+        <p:nvGrpSpPr>
+          <p:cNvPr id="41" name="Group 40">
+            <a:extLst>
+              <a:ext uri="{FF2B5EF4-FFF2-40B4-BE49-F238E27FC236}">
+                <a16:creationId xmlns:a16="http://schemas.microsoft.com/office/drawing/2014/main" id="{352E076E-D14A-49D1-A012-9E30DCFFAEB8}"/>
+              </a:ext>
+            </a:extLst>
+          </p:cNvPr>
+          <p:cNvGrpSpPr/>
+          <p:nvPr/>
+        </p:nvGrpSpPr>
+        <p:grpSpPr>
+          <a:xfrm>
+            <a:off x="3447509" y="4232007"/>
+            <a:ext cx="1759975" cy="1759975"/>
+            <a:chOff x="2910348" y="3771772"/>
+            <a:chExt cx="1759975" cy="1759975"/>
+          </a:xfrm>
+        </p:grpSpPr>
+        <p:pic>
+          <p:nvPicPr>
+            <p:cNvPr id="19" name="Graphic 18" descr="Paper with solid fill">
+              <a:extLst>
+                <a:ext uri="{FF2B5EF4-FFF2-40B4-BE49-F238E27FC236}">
+                  <a16:creationId xmlns:a16="http://schemas.microsoft.com/office/drawing/2014/main" id="{93CD1974-1831-4EC1-B0AF-E6D3AE6273F3}"/>
+                </a:ext>
+              </a:extLst>
+            </p:cNvPr>
+            <p:cNvPicPr>
+              <a:picLocks noChangeAspect="1"/>
+            </p:cNvPicPr>
+            <p:nvPr/>
+          </p:nvPicPr>
+          <p:blipFill>
+            <a:blip r:embed="rId7">
+              <a:extLst>
+                <a:ext uri="{96DAC541-7B7A-43D3-8B79-37D633B846F1}">
+                  <asvg:svgBlip xmlns:asvg="http://schemas.microsoft.com/office/drawing/2016/SVG/main" r:embed="rId8"/>
+                </a:ext>
+              </a:extLst>
+            </a:blip>
+            <a:stretch>
+              <a:fillRect/>
+            </a:stretch>
+          </p:blipFill>
+          <p:spPr>
+            <a:xfrm>
+              <a:off x="2910348" y="3771772"/>
+              <a:ext cx="1759975" cy="1759975"/>
+            </a:xfrm>
+            <a:prstGeom prst="rect">
+              <a:avLst/>
+            </a:prstGeom>
+          </p:spPr>
+        </p:pic>
+        <p:pic>
+          <p:nvPicPr>
+            <p:cNvPr id="21" name="Picture 20">
+              <a:extLst>
+                <a:ext uri="{FF2B5EF4-FFF2-40B4-BE49-F238E27FC236}">
+                  <a16:creationId xmlns:a16="http://schemas.microsoft.com/office/drawing/2014/main" id="{1DD032D9-16FD-43DF-9E00-76B6AFB84B3D}"/>
+                </a:ext>
+              </a:extLst>
+            </p:cNvPr>
+            <p:cNvPicPr>
+              <a:picLocks noChangeAspect="1"/>
+            </p:cNvPicPr>
+            <p:nvPr/>
+          </p:nvPicPr>
+          <p:blipFill>
+            <a:blip r:embed="rId9"/>
+            <a:stretch>
+              <a:fillRect/>
+            </a:stretch>
+          </p:blipFill>
+          <p:spPr>
+            <a:xfrm>
+              <a:off x="3359871" y="4572000"/>
+              <a:ext cx="853703" cy="690495"/>
+            </a:xfrm>
+            <a:prstGeom prst="rect">
+              <a:avLst/>
+            </a:prstGeom>
+            <a:solidFill>
+              <a:schemeClr val="bg2">
+                <a:lumMod val="75000"/>
+              </a:schemeClr>
+            </a:solidFill>
+          </p:spPr>
+        </p:pic>
+      </p:grpSp>
+      <p:sp>
+        <p:nvSpPr>
+          <p:cNvPr id="29" name="TextBox 28">
+            <a:extLst>
+              <a:ext uri="{FF2B5EF4-FFF2-40B4-BE49-F238E27FC236}">
+                <a16:creationId xmlns:a16="http://schemas.microsoft.com/office/drawing/2014/main" id="{F6C37510-B9B6-4A0C-951E-9B60FCDDBD34}"/>
+              </a:ext>
+            </a:extLst>
+          </p:cNvPr>
+          <p:cNvSpPr txBox="1"/>
+          <p:nvPr/>
+        </p:nvSpPr>
+        <p:spPr>
+          <a:xfrm>
+            <a:off x="2072620" y="1923296"/>
+            <a:ext cx="1231382" cy="523220"/>
+          </a:xfrm>
+          <a:prstGeom prst="rect">
+            <a:avLst/>
+          </a:prstGeom>
+          <a:ln>
+            <a:noFill/>
+          </a:ln>
+        </p:spPr>
+        <p:style>
+          <a:lnRef idx="2">
+            <a:schemeClr val="accent6"/>
+          </a:lnRef>
+          <a:fillRef idx="1">
+            <a:schemeClr val="lt1"/>
+          </a:fillRef>
+          <a:effectRef idx="0">
+            <a:schemeClr val="accent6"/>
+          </a:effectRef>
+          <a:fontRef idx="minor">
+            <a:schemeClr val="dk1"/>
+          </a:fontRef>
+        </p:style>
+        <p:txBody>
+          <a:bodyPr wrap="square" rtlCol="0">
+            <a:spAutoFit/>
+          </a:bodyPr>
+          <a:lstStyle/>
+          <a:p>
+            <a:pPr algn="r"/>
+            <a:r>
+              <a:rPr lang="en-US" sz="1400" dirty="0"/>
+              <a:t>All ETL done on PostgreSQL</a:t>
+            </a:r>
+          </a:p>
+        </p:txBody>
+      </p:sp>
+      <p:cxnSp>
+        <p:nvCxnSpPr>
+          <p:cNvPr id="22" name="Straight Arrow Connector 21">
+            <a:extLst>
+              <a:ext uri="{FF2B5EF4-FFF2-40B4-BE49-F238E27FC236}">
+                <a16:creationId xmlns:a16="http://schemas.microsoft.com/office/drawing/2014/main" id="{803504AF-B469-489F-AF28-E29AF2810757}"/>
+              </a:ext>
+            </a:extLst>
+          </p:cNvPr>
+          <p:cNvCxnSpPr>
+            <a:cxnSpLocks/>
+          </p:cNvCxnSpPr>
+          <p:nvPr/>
+        </p:nvCxnSpPr>
+        <p:spPr>
+          <a:xfrm>
+            <a:off x="1290936" y="3938012"/>
+            <a:ext cx="2396161" cy="1134271"/>
+          </a:xfrm>
+          <a:prstGeom prst="straightConnector1">
+            <a:avLst/>
+          </a:prstGeom>
+          <a:ln>
+            <a:solidFill>
+              <a:schemeClr val="tx2"/>
+            </a:solidFill>
+            <a:tailEnd type="triangle" w="lg" len="lg"/>
+          </a:ln>
+        </p:spPr>
+        <p:style>
+          <a:lnRef idx="1">
+            <a:schemeClr val="dk1"/>
+          </a:lnRef>
+          <a:fillRef idx="0">
+            <a:schemeClr val="dk1"/>
+          </a:fillRef>
+          <a:effectRef idx="0">
+            <a:schemeClr val="dk1"/>
+          </a:effectRef>
+          <a:fontRef idx="minor">
+            <a:schemeClr val="tx1"/>
+          </a:fontRef>
+        </p:style>
+      </p:cxnSp>
+      <p:pic>
+        <p:nvPicPr>
+          <p:cNvPr id="25" name="Picture 22" descr="Image result for web design">
+            <a:extLst>
+              <a:ext uri="{FF2B5EF4-FFF2-40B4-BE49-F238E27FC236}">
+                <a16:creationId xmlns:a16="http://schemas.microsoft.com/office/drawing/2014/main" id="{1D2C2892-F768-42C8-98DD-705F7930F6D3}"/>
+              </a:ext>
+            </a:extLst>
+          </p:cNvPr>
+          <p:cNvPicPr>
+            <a:picLocks noChangeAspect="1" noChangeArrowheads="1"/>
+          </p:cNvPicPr>
+          <p:nvPr/>
+        </p:nvPicPr>
+        <p:blipFill>
+          <a:blip r:embed="rId10">
+            <a:extLst>
+              <a:ext uri="{28A0092B-C50C-407E-A947-70E740481C1C}">
+                <a14:useLocalDpi xmlns:a14="http://schemas.microsoft.com/office/drawing/2010/main" val="0"/>
+              </a:ext>
+            </a:extLst>
+          </a:blip>
+          <a:srcRect/>
+          <a:stretch>
+            <a:fillRect/>
+          </a:stretch>
+        </p:blipFill>
+        <p:spPr bwMode="auto">
+          <a:xfrm>
+            <a:off x="9254763" y="2228059"/>
+            <a:ext cx="2741923" cy="2335712"/>
+          </a:xfrm>
+          <a:prstGeom prst="rect">
+            <a:avLst/>
+          </a:prstGeom>
+          <a:noFill/>
+          <a:extLst>
+            <a:ext uri="{909E8E84-426E-40DD-AFC4-6F175D3DCCD1}">
+              <a14:hiddenFill xmlns:a14="http://schemas.microsoft.com/office/drawing/2010/main">
+                <a:solidFill>
+                  <a:srgbClr val="FFFFFF"/>
+                </a:solidFill>
+              </a14:hiddenFill>
+            </a:ext>
+          </a:extLst>
+        </p:spPr>
+      </p:pic>
+      <p:pic>
+        <p:nvPicPr>
+          <p:cNvPr id="28" name="Picture 27">
+            <a:extLst>
+              <a:ext uri="{FF2B5EF4-FFF2-40B4-BE49-F238E27FC236}">
+                <a16:creationId xmlns:a16="http://schemas.microsoft.com/office/drawing/2014/main" id="{A5D0A3F9-26A8-40FF-81D6-2F96FB119A99}"/>
+              </a:ext>
+            </a:extLst>
+          </p:cNvPr>
+          <p:cNvPicPr>
+            <a:picLocks noChangeAspect="1"/>
+          </p:cNvPicPr>
+          <p:nvPr/>
+        </p:nvPicPr>
+        <p:blipFill>
+          <a:blip r:embed="rId11"/>
+          <a:stretch>
+            <a:fillRect/>
+          </a:stretch>
+        </p:blipFill>
+        <p:spPr>
+          <a:xfrm>
+            <a:off x="6773843" y="3158664"/>
+            <a:ext cx="1863478" cy="540671"/>
+          </a:xfrm>
+          <a:prstGeom prst="rect">
+            <a:avLst/>
+          </a:prstGeom>
+        </p:spPr>
+      </p:pic>
+      <p:sp>
+        <p:nvSpPr>
+          <p:cNvPr id="30" name="TextBox 29">
+            <a:extLst>
+              <a:ext uri="{FF2B5EF4-FFF2-40B4-BE49-F238E27FC236}">
+                <a16:creationId xmlns:a16="http://schemas.microsoft.com/office/drawing/2014/main" id="{F07F6801-9091-493A-839C-5A1E1917EB9F}"/>
+              </a:ext>
+            </a:extLst>
+          </p:cNvPr>
+          <p:cNvSpPr txBox="1"/>
+          <p:nvPr/>
+        </p:nvSpPr>
+        <p:spPr>
+          <a:xfrm>
+            <a:off x="5679671" y="1648335"/>
+            <a:ext cx="1863477" cy="523220"/>
+          </a:xfrm>
+          <a:prstGeom prst="rect">
+            <a:avLst/>
+          </a:prstGeom>
+          <a:ln>
+            <a:gradFill>
+              <a:gsLst>
+                <a:gs pos="0">
+                  <a:schemeClr val="accent1">
+                    <a:lumMod val="5000"/>
+                    <a:lumOff val="95000"/>
+                  </a:schemeClr>
+                </a:gs>
+                <a:gs pos="74000">
+                  <a:schemeClr val="accent1">
+                    <a:lumMod val="45000"/>
+                    <a:lumOff val="55000"/>
+                  </a:schemeClr>
+                </a:gs>
+                <a:gs pos="83000">
+                  <a:schemeClr val="accent1">
+                    <a:lumMod val="45000"/>
+                    <a:lumOff val="55000"/>
+                  </a:schemeClr>
+                </a:gs>
+                <a:gs pos="100000">
+                  <a:schemeClr val="accent1">
+                    <a:lumMod val="30000"/>
+                    <a:lumOff val="70000"/>
+                  </a:schemeClr>
+                </a:gs>
+              </a:gsLst>
+              <a:lin ang="5400000" scaled="1"/>
+            </a:gradFill>
+          </a:ln>
+        </p:spPr>
+        <p:style>
+          <a:lnRef idx="2">
+            <a:schemeClr val="accent6"/>
+          </a:lnRef>
+          <a:fillRef idx="1">
+            <a:schemeClr val="lt1"/>
+          </a:fillRef>
+          <a:effectRef idx="0">
+            <a:schemeClr val="accent6"/>
+          </a:effectRef>
+          <a:fontRef idx="minor">
+            <a:schemeClr val="dk1"/>
+          </a:fontRef>
+        </p:style>
+        <p:txBody>
+          <a:bodyPr wrap="square" rtlCol="0">
+            <a:spAutoFit/>
+          </a:bodyPr>
+          <a:lstStyle/>
+          <a:p>
+            <a:r>
+              <a:rPr lang="en-US" sz="1400" dirty="0"/>
+              <a:t>NodeJS API serving up query endpoints </a:t>
+            </a:r>
+          </a:p>
+        </p:txBody>
+      </p:sp>
+      <p:cxnSp>
+        <p:nvCxnSpPr>
+          <p:cNvPr id="31" name="Straight Arrow Connector 30">
+            <a:extLst>
+              <a:ext uri="{FF2B5EF4-FFF2-40B4-BE49-F238E27FC236}">
+                <a16:creationId xmlns:a16="http://schemas.microsoft.com/office/drawing/2014/main" id="{97938949-5FF3-45FC-9CF1-22926C06D01C}"/>
+              </a:ext>
+            </a:extLst>
+          </p:cNvPr>
+          <p:cNvCxnSpPr>
+            <a:cxnSpLocks/>
+          </p:cNvCxnSpPr>
+          <p:nvPr/>
+        </p:nvCxnSpPr>
+        <p:spPr>
+          <a:xfrm>
+            <a:off x="5679965" y="2171555"/>
+            <a:ext cx="1995417" cy="1033045"/>
+          </a:xfrm>
+          <a:prstGeom prst="straightConnector1">
+            <a:avLst/>
+          </a:prstGeom>
+          <a:ln>
+            <a:solidFill>
+              <a:schemeClr val="tx2"/>
+            </a:solidFill>
+            <a:tailEnd type="triangle" w="lg" len="lg"/>
+          </a:ln>
+        </p:spPr>
+        <p:style>
+          <a:lnRef idx="1">
+            <a:schemeClr val="dk1"/>
+          </a:lnRef>
+          <a:fillRef idx="0">
+            <a:schemeClr val="dk1"/>
+          </a:fillRef>
+          <a:effectRef idx="0">
+            <a:schemeClr val="dk1"/>
+          </a:effectRef>
+          <a:fontRef idx="minor">
+            <a:schemeClr val="tx1"/>
+          </a:fontRef>
+        </p:style>
+      </p:cxnSp>
+      <p:cxnSp>
+        <p:nvCxnSpPr>
+          <p:cNvPr id="37" name="Straight Arrow Connector 36">
+            <a:extLst>
+              <a:ext uri="{FF2B5EF4-FFF2-40B4-BE49-F238E27FC236}">
+                <a16:creationId xmlns:a16="http://schemas.microsoft.com/office/drawing/2014/main" id="{78306498-B9C6-4B13-95D5-50281C2B63FB}"/>
+              </a:ext>
+            </a:extLst>
+          </p:cNvPr>
+          <p:cNvCxnSpPr>
+            <a:cxnSpLocks/>
+          </p:cNvCxnSpPr>
+          <p:nvPr/>
+        </p:nvCxnSpPr>
+        <p:spPr>
+          <a:xfrm flipV="1">
+            <a:off x="4800642" y="3771772"/>
+            <a:ext cx="2904940" cy="1260463"/>
+          </a:xfrm>
+          <a:prstGeom prst="straightConnector1">
+            <a:avLst/>
+          </a:prstGeom>
+          <a:ln>
+            <a:solidFill>
+              <a:schemeClr val="tx2"/>
+            </a:solidFill>
+            <a:tailEnd type="triangle" w="lg" len="lg"/>
+          </a:ln>
+        </p:spPr>
+        <p:style>
+          <a:lnRef idx="1">
+            <a:schemeClr val="dk1"/>
+          </a:lnRef>
+          <a:fillRef idx="0">
+            <a:schemeClr val="dk1"/>
+          </a:fillRef>
+          <a:effectRef idx="0">
+            <a:schemeClr val="dk1"/>
+          </a:effectRef>
+          <a:fontRef idx="minor">
+            <a:schemeClr val="tx1"/>
+          </a:fontRef>
+        </p:style>
+      </p:cxnSp>
+      <p:pic>
+        <p:nvPicPr>
+          <p:cNvPr id="47" name="Picture 46">
+            <a:extLst>
+              <a:ext uri="{FF2B5EF4-FFF2-40B4-BE49-F238E27FC236}">
+                <a16:creationId xmlns:a16="http://schemas.microsoft.com/office/drawing/2014/main" id="{9C47960E-5B80-452E-9C0E-4180013062D4}"/>
+              </a:ext>
+            </a:extLst>
+          </p:cNvPr>
+          <p:cNvPicPr>
+            <a:picLocks noChangeAspect="1"/>
+          </p:cNvPicPr>
+          <p:nvPr/>
+        </p:nvPicPr>
+        <p:blipFill>
+          <a:blip r:embed="rId12"/>
+          <a:stretch>
+            <a:fillRect/>
+          </a:stretch>
+        </p:blipFill>
+        <p:spPr>
+          <a:xfrm>
+            <a:off x="7979886" y="2261532"/>
+            <a:ext cx="1759975" cy="676562"/>
+          </a:xfrm>
+          <a:prstGeom prst="rect">
+            <a:avLst/>
+          </a:prstGeom>
+          <a:ln>
+            <a:solidFill>
+              <a:schemeClr val="accent6">
+                <a:lumMod val="60000"/>
+                <a:lumOff val="40000"/>
+              </a:schemeClr>
+            </a:solidFill>
+          </a:ln>
+        </p:spPr>
+      </p:pic>
+      <p:pic>
+        <p:nvPicPr>
+          <p:cNvPr id="53" name="Picture 52">
+            <a:extLst>
+              <a:ext uri="{FF2B5EF4-FFF2-40B4-BE49-F238E27FC236}">
+                <a16:creationId xmlns:a16="http://schemas.microsoft.com/office/drawing/2014/main" id="{7ECA3698-0124-449D-8BB1-9A15895E83A4}"/>
+              </a:ext>
+            </a:extLst>
+          </p:cNvPr>
+          <p:cNvPicPr>
+            <a:picLocks noChangeAspect="1"/>
+          </p:cNvPicPr>
+          <p:nvPr/>
+        </p:nvPicPr>
+        <p:blipFill>
+          <a:blip r:embed="rId13"/>
+          <a:stretch>
+            <a:fillRect/>
+          </a:stretch>
+        </p:blipFill>
+        <p:spPr>
+          <a:xfrm>
+            <a:off x="8027774" y="4101390"/>
+            <a:ext cx="2055671" cy="596490"/>
+          </a:xfrm>
+          <a:prstGeom prst="rect">
+            <a:avLst/>
+          </a:prstGeom>
+          <a:ln>
+            <a:solidFill>
+              <a:schemeClr val="accent6">
+                <a:lumMod val="60000"/>
+                <a:lumOff val="40000"/>
+              </a:schemeClr>
+            </a:solidFill>
+          </a:ln>
+        </p:spPr>
+      </p:pic>
+      <p:pic>
+        <p:nvPicPr>
+          <p:cNvPr id="55" name="Picture 54">
+            <a:extLst>
+              <a:ext uri="{FF2B5EF4-FFF2-40B4-BE49-F238E27FC236}">
+                <a16:creationId xmlns:a16="http://schemas.microsoft.com/office/drawing/2014/main" id="{8EE757FD-5604-437A-B337-A85620771EE9}"/>
+              </a:ext>
+            </a:extLst>
+          </p:cNvPr>
+          <p:cNvPicPr>
+            <a:picLocks noChangeAspect="1"/>
+          </p:cNvPicPr>
+          <p:nvPr/>
+        </p:nvPicPr>
+        <p:blipFill>
+          <a:blip r:embed="rId14"/>
+          <a:stretch>
+            <a:fillRect/>
+          </a:stretch>
+        </p:blipFill>
+        <p:spPr>
+          <a:xfrm>
+            <a:off x="4645671" y="596749"/>
+            <a:ext cx="730822" cy="460674"/>
+          </a:xfrm>
+          <a:prstGeom prst="rect">
+            <a:avLst/>
+          </a:prstGeom>
+        </p:spPr>
+      </p:pic>
+    </p:spTree>
+    <p:extLst>
+      <p:ext uri="{BB962C8B-B14F-4D97-AF65-F5344CB8AC3E}">
+        <p14:creationId xmlns:p14="http://schemas.microsoft.com/office/powerpoint/2010/main" val="3816694138"/>
+      </p:ext>
+    </p:extLst>
+  </p:cSld>
+  <p:clrMapOvr>
+    <a:masterClrMapping/>
+  </p:clrMapOvr>
+</p:sld>
+</file>
+
+<file path=ppt/slides/slide5.xml><?xml version="1.0" encoding="utf-8"?>
 <p:sld xmlns:a="http://schemas.openxmlformats.org/drawingml/2006/main" xmlns:r="http://schemas.openxmlformats.org/officeDocument/2006/relationships" xmlns:p="http://schemas.openxmlformats.org/presentationml/2006/main">
   <p:cSld>
     <p:spTree>
@@ -7518,10 +11526,10 @@
       </p:grpSpPr>
       <p:sp>
         <p:nvSpPr>
-          <p:cNvPr id="2" name="Title 1">
+          <p:cNvPr id="3" name="Title 2">
             <a:extLst>
               <a:ext uri="{FF2B5EF4-FFF2-40B4-BE49-F238E27FC236}">
-                <a16:creationId xmlns:a16="http://schemas.microsoft.com/office/drawing/2014/main" id="{8D57C5A5-CBB5-4C4A-BEDB-9037DBE388CF}"/>
+                <a16:creationId xmlns:a16="http://schemas.microsoft.com/office/drawing/2014/main" id="{0A1D0DE9-3F52-4157-8EC7-0CC2CE030FA4}"/>
               </a:ext>
             </a:extLst>
           </p:cNvPr>
@@ -7537,16 +11545,19 @@
           <a:bodyPr/>
           <a:lstStyle/>
           <a:p>
-            <a:endParaRPr lang="en-US"/>
+            <a:r>
+              <a:rPr lang="en-US" dirty="0"/>
+              <a:t>Quick Demo</a:t>
+            </a:r>
           </a:p>
         </p:txBody>
       </p:sp>
       <p:sp>
         <p:nvSpPr>
-          <p:cNvPr id="3" name="Content Placeholder 2">
+          <p:cNvPr id="4" name="Text Placeholder 3">
             <a:extLst>
               <a:ext uri="{FF2B5EF4-FFF2-40B4-BE49-F238E27FC236}">
-                <a16:creationId xmlns:a16="http://schemas.microsoft.com/office/drawing/2014/main" id="{6D49CE72-5519-47E2-8361-4050226839E6}"/>
+                <a16:creationId xmlns:a16="http://schemas.microsoft.com/office/drawing/2014/main" id="{C07D2A2F-544A-4F0E-BDFF-BA8A55F71D0E}"/>
               </a:ext>
             </a:extLst>
           </p:cNvPr>
@@ -7554,7 +11565,7 @@
             <a:spLocks noGrp="1"/>
           </p:cNvSpPr>
           <p:nvPr>
-            <p:ph idx="1"/>
+            <p:ph type="body" idx="1"/>
           </p:nvPr>
         </p:nvSpPr>
         <p:spPr/>
@@ -7562,39 +11573,17 @@
           <a:bodyPr/>
           <a:lstStyle/>
           <a:p>
-            <a:endParaRPr lang="en-US"/>
-          </a:p>
-        </p:txBody>
-      </p:sp>
-      <p:sp>
-        <p:nvSpPr>
-          <p:cNvPr id="4" name="Text Placeholder 3">
-            <a:extLst>
-              <a:ext uri="{FF2B5EF4-FFF2-40B4-BE49-F238E27FC236}">
-                <a16:creationId xmlns:a16="http://schemas.microsoft.com/office/drawing/2014/main" id="{0C7B0738-59FA-4F72-AAEF-2A53455D6DC4}"/>
-              </a:ext>
-            </a:extLst>
-          </p:cNvPr>
-          <p:cNvSpPr>
-            <a:spLocks noGrp="1"/>
-          </p:cNvSpPr>
-          <p:nvPr>
-            <p:ph type="body" sz="half" idx="2"/>
-          </p:nvPr>
-        </p:nvSpPr>
-        <p:spPr/>
-        <p:txBody>
-          <a:bodyPr/>
-          <a:lstStyle/>
-          <a:p>
-            <a:endParaRPr lang="en-US"/>
+            <a:r>
+              <a:rPr lang="en-US" dirty="0"/>
+              <a:t>California Wildfire Dashboard</a:t>
+            </a:r>
           </a:p>
         </p:txBody>
       </p:sp>
     </p:spTree>
     <p:extLst>
       <p:ext uri="{BB962C8B-B14F-4D97-AF65-F5344CB8AC3E}">
-        <p14:creationId xmlns:p14="http://schemas.microsoft.com/office/powerpoint/2010/main" val="3423353905"/>
+        <p14:creationId xmlns:p14="http://schemas.microsoft.com/office/powerpoint/2010/main" val="3510363838"/>
       </p:ext>
     </p:extLst>
   </p:cSld>
@@ -7604,7 +11593,7 @@
 </p:sld>
 </file>
 
-<file path=ppt/slides/slide4.xml><?xml version="1.0" encoding="utf-8"?>
+<file path=ppt/slides/slide6.xml><?xml version="1.0" encoding="utf-8"?>
 <p:sld xmlns:a="http://schemas.openxmlformats.org/drawingml/2006/main" xmlns:r="http://schemas.openxmlformats.org/officeDocument/2006/relationships" xmlns:p="http://schemas.openxmlformats.org/presentationml/2006/main">
   <p:cSld>
     <p:bg>
@@ -7779,7 +11768,7 @@
           <a:p>
             <a:r>
               <a:rPr lang="en-US" dirty="0"/>
-              <a:t>Title Lorem Ipsum Dolor</a:t>
+              <a:t>Findings</a:t>
             </a:r>
           </a:p>
         </p:txBody>
@@ -7854,11 +11843,6 @@
           </p:cNvGraphicFramePr>
           <p:nvPr>
             <p:ph idx="1"/>
-            <p:extLst>
-              <p:ext uri="{D42A27DB-BD31-4B8C-83A1-F6EECF244321}">
-                <p14:modId xmlns:p14="http://schemas.microsoft.com/office/powerpoint/2010/main" val="4213993164"/>
-              </p:ext>
-            </p:extLst>
           </p:nvPr>
         </p:nvGraphicFramePr>
         <p:xfrm>
@@ -7904,7 +11888,147 @@
     </p:spTree>
     <p:extLst>
       <p:ext uri="{BB962C8B-B14F-4D97-AF65-F5344CB8AC3E}">
-        <p14:creationId xmlns:p14="http://schemas.microsoft.com/office/powerpoint/2010/main" val="1843192287"/>
+        <p14:creationId xmlns:p14="http://schemas.microsoft.com/office/powerpoint/2010/main" val="2689789470"/>
+      </p:ext>
+    </p:extLst>
+  </p:cSld>
+  <p:clrMapOvr>
+    <a:masterClrMapping/>
+  </p:clrMapOvr>
+</p:sld>
+</file>
+
+<file path=ppt/slides/slide7.xml><?xml version="1.0" encoding="utf-8"?>
+<p:sld xmlns:a="http://schemas.openxmlformats.org/drawingml/2006/main" xmlns:r="http://schemas.openxmlformats.org/officeDocument/2006/relationships" xmlns:p="http://schemas.openxmlformats.org/presentationml/2006/main">
+  <p:cSld>
+    <p:spTree>
+      <p:nvGrpSpPr>
+        <p:cNvPr id="1" name=""/>
+        <p:cNvGrpSpPr/>
+        <p:nvPr/>
+      </p:nvGrpSpPr>
+      <p:grpSpPr>
+        <a:xfrm>
+          <a:off x="0" y="0"/>
+          <a:ext cx="0" cy="0"/>
+          <a:chOff x="0" y="0"/>
+          <a:chExt cx="0" cy="0"/>
+        </a:xfrm>
+      </p:grpSpPr>
+      <p:sp>
+        <p:nvSpPr>
+          <p:cNvPr id="2" name="Title 1">
+            <a:extLst>
+              <a:ext uri="{FF2B5EF4-FFF2-40B4-BE49-F238E27FC236}">
+                <a16:creationId xmlns:a16="http://schemas.microsoft.com/office/drawing/2014/main" id="{8D57C5A5-CBB5-4C4A-BEDB-9037DBE388CF}"/>
+              </a:ext>
+            </a:extLst>
+          </p:cNvPr>
+          <p:cNvSpPr>
+            <a:spLocks noGrp="1"/>
+          </p:cNvSpPr>
+          <p:nvPr>
+            <p:ph type="title"/>
+          </p:nvPr>
+        </p:nvSpPr>
+        <p:spPr/>
+        <p:txBody>
+          <a:bodyPr/>
+          <a:lstStyle/>
+          <a:p>
+            <a:r>
+              <a:rPr lang="en-US" dirty="0"/>
+              <a:t>Limitations</a:t>
+            </a:r>
+          </a:p>
+        </p:txBody>
+      </p:sp>
+      <p:sp>
+        <p:nvSpPr>
+          <p:cNvPr id="3" name="Content Placeholder 2">
+            <a:extLst>
+              <a:ext uri="{FF2B5EF4-FFF2-40B4-BE49-F238E27FC236}">
+                <a16:creationId xmlns:a16="http://schemas.microsoft.com/office/drawing/2014/main" id="{6D49CE72-5519-47E2-8361-4050226839E6}"/>
+              </a:ext>
+            </a:extLst>
+          </p:cNvPr>
+          <p:cNvSpPr>
+            <a:spLocks noGrp="1"/>
+          </p:cNvSpPr>
+          <p:nvPr>
+            <p:ph idx="1"/>
+          </p:nvPr>
+        </p:nvSpPr>
+        <p:spPr/>
+        <p:txBody>
+          <a:bodyPr/>
+          <a:lstStyle/>
+          <a:p>
+            <a:r>
+              <a:rPr lang="en-US" dirty="0"/>
+              <a:t>Data Availability</a:t>
+            </a:r>
+          </a:p>
+          <a:p>
+            <a:pPr lvl="1"/>
+            <a:r>
+              <a:rPr lang="en-US" dirty="0"/>
+              <a:t>NIFC (National Interagency Fire Center</a:t>
+            </a:r>
+          </a:p>
+          <a:p>
+            <a:pPr lvl="1"/>
+            <a:r>
+              <a:rPr lang="en-US" dirty="0"/>
+              <a:t>Data management &amp; hosting was completely changed in 2020 </a:t>
+            </a:r>
+          </a:p>
+          <a:p>
+            <a:pPr marL="201168" lvl="1" indent="0">
+              <a:buNone/>
+            </a:pPr>
+            <a:endParaRPr lang="en-US" dirty="0"/>
+          </a:p>
+          <a:p>
+            <a:endParaRPr lang="en-US" dirty="0"/>
+          </a:p>
+          <a:p>
+            <a:endParaRPr lang="en-US" dirty="0"/>
+          </a:p>
+        </p:txBody>
+      </p:sp>
+      <p:sp>
+        <p:nvSpPr>
+          <p:cNvPr id="4" name="Text Placeholder 3">
+            <a:extLst>
+              <a:ext uri="{FF2B5EF4-FFF2-40B4-BE49-F238E27FC236}">
+                <a16:creationId xmlns:a16="http://schemas.microsoft.com/office/drawing/2014/main" id="{0C7B0738-59FA-4F72-AAEF-2A53455D6DC4}"/>
+              </a:ext>
+            </a:extLst>
+          </p:cNvPr>
+          <p:cNvSpPr>
+            <a:spLocks noGrp="1"/>
+          </p:cNvSpPr>
+          <p:nvPr>
+            <p:ph type="body" sz="half" idx="2"/>
+          </p:nvPr>
+        </p:nvSpPr>
+        <p:spPr/>
+        <p:txBody>
+          <a:bodyPr/>
+          <a:lstStyle/>
+          <a:p>
+            <a:r>
+              <a:rPr lang="en-US" dirty="0"/>
+              <a:t>Data &amp; Time</a:t>
+            </a:r>
+          </a:p>
+        </p:txBody>
+      </p:sp>
+    </p:spTree>
+    <p:extLst>
+      <p:ext uri="{BB962C8B-B14F-4D97-AF65-F5344CB8AC3E}">
+        <p14:creationId xmlns:p14="http://schemas.microsoft.com/office/powerpoint/2010/main" val="3423353905"/>
       </p:ext>
     </p:extLst>
   </p:cSld>

</xml_diff>